<commit_message>
added plots and updated presentation
</commit_message>
<xml_diff>
--- a/Presentation1.pptx
+++ b/Presentation1.pptx
@@ -4,13 +4,17 @@
   <p:sldMasterIdLst>
     <p:sldMasterId id="2147483648" r:id="rId1"/>
   </p:sldMasterIdLst>
+  <p:notesMasterIdLst>
+    <p:notesMasterId r:id="rId9"/>
+  </p:notesMasterIdLst>
   <p:sldIdLst>
-    <p:sldId id="258" r:id="rId2"/>
+    <p:sldId id="264" r:id="rId2"/>
     <p:sldId id="259" r:id="rId3"/>
-    <p:sldId id="263" r:id="rId4"/>
-    <p:sldId id="261" r:id="rId5"/>
-    <p:sldId id="262" r:id="rId6"/>
-    <p:sldId id="260" r:id="rId7"/>
+    <p:sldId id="261" r:id="rId4"/>
+    <p:sldId id="268" r:id="rId5"/>
+    <p:sldId id="265" r:id="rId6"/>
+    <p:sldId id="267" r:id="rId7"/>
+    <p:sldId id="266" r:id="rId8"/>
   </p:sldIdLst>
   <p:sldSz cx="12192000" cy="6858000"/>
   <p:notesSz cx="6858000" cy="9144000"/>
@@ -117,6 +121,356 @@
 </p:presentation>
 </file>
 
+<file path=ppt/notesMasters/notesMaster1.xml><?xml version="1.0" encoding="utf-8"?>
+<p:notesMaster xmlns:a="http://schemas.openxmlformats.org/drawingml/2006/main" xmlns:r="http://schemas.openxmlformats.org/officeDocument/2006/relationships" xmlns:p="http://schemas.openxmlformats.org/presentationml/2006/main">
+  <p:cSld>
+    <p:bg>
+      <p:bgRef idx="1001">
+        <a:schemeClr val="bg1"/>
+      </p:bgRef>
+    </p:bg>
+    <p:spTree>
+      <p:nvGrpSpPr>
+        <p:cNvPr id="1" name=""/>
+        <p:cNvGrpSpPr/>
+        <p:nvPr/>
+      </p:nvGrpSpPr>
+      <p:grpSpPr>
+        <a:xfrm>
+          <a:off x="0" y="0"/>
+          <a:ext cx="0" cy="0"/>
+          <a:chOff x="0" y="0"/>
+          <a:chExt cx="0" cy="0"/>
+        </a:xfrm>
+      </p:grpSpPr>
+      <p:sp>
+        <p:nvSpPr>
+          <p:cNvPr id="2" name="Header Placeholder 1"/>
+          <p:cNvSpPr>
+            <a:spLocks noGrp="1"/>
+          </p:cNvSpPr>
+          <p:nvPr>
+            <p:ph type="hdr" sz="quarter"/>
+          </p:nvPr>
+        </p:nvSpPr>
+        <p:spPr>
+          <a:xfrm>
+            <a:off x="0" y="0"/>
+            <a:ext cx="2971800" cy="458788"/>
+          </a:xfrm>
+          <a:prstGeom prst="rect">
+            <a:avLst/>
+          </a:prstGeom>
+        </p:spPr>
+        <p:txBody>
+          <a:bodyPr vert="horz" lIns="91440" tIns="45720" rIns="91440" bIns="45720" rtlCol="0"/>
+          <a:lstStyle>
+            <a:lvl1pPr algn="l">
+              <a:defRPr sz="1200"/>
+            </a:lvl1pPr>
+          </a:lstStyle>
+          <a:p>
+            <a:endParaRPr lang="en-ID"/>
+          </a:p>
+        </p:txBody>
+      </p:sp>
+      <p:sp>
+        <p:nvSpPr>
+          <p:cNvPr id="3" name="Date Placeholder 2"/>
+          <p:cNvSpPr>
+            <a:spLocks noGrp="1"/>
+          </p:cNvSpPr>
+          <p:nvPr>
+            <p:ph type="dt" idx="1"/>
+          </p:nvPr>
+        </p:nvSpPr>
+        <p:spPr>
+          <a:xfrm>
+            <a:off x="3884613" y="0"/>
+            <a:ext cx="2971800" cy="458788"/>
+          </a:xfrm>
+          <a:prstGeom prst="rect">
+            <a:avLst/>
+          </a:prstGeom>
+        </p:spPr>
+        <p:txBody>
+          <a:bodyPr vert="horz" lIns="91440" tIns="45720" rIns="91440" bIns="45720" rtlCol="0"/>
+          <a:lstStyle>
+            <a:lvl1pPr algn="r">
+              <a:defRPr sz="1200"/>
+            </a:lvl1pPr>
+          </a:lstStyle>
+          <a:p>
+            <a:fld id="{77704DBA-E862-417F-AD62-956093F1CA91}" type="datetimeFigureOut">
+              <a:rPr lang="en-ID" smtClean="0"/>
+              <a:t>19/10/2024</a:t>
+            </a:fld>
+            <a:endParaRPr lang="en-ID"/>
+          </a:p>
+        </p:txBody>
+      </p:sp>
+      <p:sp>
+        <p:nvSpPr>
+          <p:cNvPr id="4" name="Slide Image Placeholder 3"/>
+          <p:cNvSpPr>
+            <a:spLocks noGrp="1" noRot="1" noChangeAspect="1"/>
+          </p:cNvSpPr>
+          <p:nvPr>
+            <p:ph type="sldImg" idx="2"/>
+          </p:nvPr>
+        </p:nvSpPr>
+        <p:spPr>
+          <a:xfrm>
+            <a:off x="685800" y="1143000"/>
+            <a:ext cx="5486400" cy="3086100"/>
+          </a:xfrm>
+          <a:prstGeom prst="rect">
+            <a:avLst/>
+          </a:prstGeom>
+          <a:noFill/>
+          <a:ln w="12700">
+            <a:solidFill>
+              <a:prstClr val="black"/>
+            </a:solidFill>
+          </a:ln>
+        </p:spPr>
+        <p:txBody>
+          <a:bodyPr vert="horz" lIns="91440" tIns="45720" rIns="91440" bIns="45720" rtlCol="0" anchor="ctr"/>
+          <a:lstStyle/>
+          <a:p>
+            <a:endParaRPr lang="en-ID"/>
+          </a:p>
+        </p:txBody>
+      </p:sp>
+      <p:sp>
+        <p:nvSpPr>
+          <p:cNvPr id="5" name="Notes Placeholder 4"/>
+          <p:cNvSpPr>
+            <a:spLocks noGrp="1"/>
+          </p:cNvSpPr>
+          <p:nvPr>
+            <p:ph type="body" sz="quarter" idx="3"/>
+          </p:nvPr>
+        </p:nvSpPr>
+        <p:spPr>
+          <a:xfrm>
+            <a:off x="685800" y="4400550"/>
+            <a:ext cx="5486400" cy="3600450"/>
+          </a:xfrm>
+          <a:prstGeom prst="rect">
+            <a:avLst/>
+          </a:prstGeom>
+        </p:spPr>
+        <p:txBody>
+          <a:bodyPr vert="horz" lIns="91440" tIns="45720" rIns="91440" bIns="45720" rtlCol="0"/>
+          <a:lstStyle/>
+          <a:p>
+            <a:pPr lvl="0"/>
+            <a:r>
+              <a:rPr lang="en-US"/>
+              <a:t>Click to edit Master text styles</a:t>
+            </a:r>
+          </a:p>
+          <a:p>
+            <a:pPr lvl="1"/>
+            <a:r>
+              <a:rPr lang="en-US"/>
+              <a:t>Second level</a:t>
+            </a:r>
+          </a:p>
+          <a:p>
+            <a:pPr lvl="2"/>
+            <a:r>
+              <a:rPr lang="en-US"/>
+              <a:t>Third level</a:t>
+            </a:r>
+          </a:p>
+          <a:p>
+            <a:pPr lvl="3"/>
+            <a:r>
+              <a:rPr lang="en-US"/>
+              <a:t>Fourth level</a:t>
+            </a:r>
+          </a:p>
+          <a:p>
+            <a:pPr lvl="4"/>
+            <a:r>
+              <a:rPr lang="en-US"/>
+              <a:t>Fifth level</a:t>
+            </a:r>
+            <a:endParaRPr lang="en-ID"/>
+          </a:p>
+        </p:txBody>
+      </p:sp>
+      <p:sp>
+        <p:nvSpPr>
+          <p:cNvPr id="6" name="Footer Placeholder 5"/>
+          <p:cNvSpPr>
+            <a:spLocks noGrp="1"/>
+          </p:cNvSpPr>
+          <p:nvPr>
+            <p:ph type="ftr" sz="quarter" idx="4"/>
+          </p:nvPr>
+        </p:nvSpPr>
+        <p:spPr>
+          <a:xfrm>
+            <a:off x="0" y="8685213"/>
+            <a:ext cx="2971800" cy="458787"/>
+          </a:xfrm>
+          <a:prstGeom prst="rect">
+            <a:avLst/>
+          </a:prstGeom>
+        </p:spPr>
+        <p:txBody>
+          <a:bodyPr vert="horz" lIns="91440" tIns="45720" rIns="91440" bIns="45720" rtlCol="0" anchor="b"/>
+          <a:lstStyle>
+            <a:lvl1pPr algn="l">
+              <a:defRPr sz="1200"/>
+            </a:lvl1pPr>
+          </a:lstStyle>
+          <a:p>
+            <a:endParaRPr lang="en-ID"/>
+          </a:p>
+        </p:txBody>
+      </p:sp>
+      <p:sp>
+        <p:nvSpPr>
+          <p:cNvPr id="7" name="Slide Number Placeholder 6"/>
+          <p:cNvSpPr>
+            <a:spLocks noGrp="1"/>
+          </p:cNvSpPr>
+          <p:nvPr>
+            <p:ph type="sldNum" sz="quarter" idx="5"/>
+          </p:nvPr>
+        </p:nvSpPr>
+        <p:spPr>
+          <a:xfrm>
+            <a:off x="3884613" y="8685213"/>
+            <a:ext cx="2971800" cy="458787"/>
+          </a:xfrm>
+          <a:prstGeom prst="rect">
+            <a:avLst/>
+          </a:prstGeom>
+        </p:spPr>
+        <p:txBody>
+          <a:bodyPr vert="horz" lIns="91440" tIns="45720" rIns="91440" bIns="45720" rtlCol="0" anchor="b"/>
+          <a:lstStyle>
+            <a:lvl1pPr algn="r">
+              <a:defRPr sz="1200"/>
+            </a:lvl1pPr>
+          </a:lstStyle>
+          <a:p>
+            <a:fld id="{2C9D2EC0-BFC9-4F48-A087-584B9BB7F564}" type="slidenum">
+              <a:rPr lang="en-ID" smtClean="0"/>
+              <a:t>‹#›</a:t>
+            </a:fld>
+            <a:endParaRPr lang="en-ID"/>
+          </a:p>
+        </p:txBody>
+      </p:sp>
+    </p:spTree>
+    <p:extLst>
+      <p:ext uri="{BB962C8B-B14F-4D97-AF65-F5344CB8AC3E}">
+        <p14:creationId xmlns:p14="http://schemas.microsoft.com/office/powerpoint/2010/main" val="4283861582"/>
+      </p:ext>
+    </p:extLst>
+  </p:cSld>
+  <p:clrMap bg1="lt1" tx1="dk1" bg2="lt2" tx2="dk2" accent1="accent1" accent2="accent2" accent3="accent3" accent4="accent4" accent5="accent5" accent6="accent6" hlink="hlink" folHlink="folHlink"/>
+  <p:notesStyle>
+    <a:lvl1pPr marL="0" algn="l" defTabSz="914400" rtl="0" eaLnBrk="1" latinLnBrk="0" hangingPunct="1">
+      <a:defRPr sz="1200" kern="1200">
+        <a:solidFill>
+          <a:schemeClr val="tx1"/>
+        </a:solidFill>
+        <a:latin typeface="+mn-lt"/>
+        <a:ea typeface="+mn-ea"/>
+        <a:cs typeface="+mn-cs"/>
+      </a:defRPr>
+    </a:lvl1pPr>
+    <a:lvl2pPr marL="457200" algn="l" defTabSz="914400" rtl="0" eaLnBrk="1" latinLnBrk="0" hangingPunct="1">
+      <a:defRPr sz="1200" kern="1200">
+        <a:solidFill>
+          <a:schemeClr val="tx1"/>
+        </a:solidFill>
+        <a:latin typeface="+mn-lt"/>
+        <a:ea typeface="+mn-ea"/>
+        <a:cs typeface="+mn-cs"/>
+      </a:defRPr>
+    </a:lvl2pPr>
+    <a:lvl3pPr marL="914400" algn="l" defTabSz="914400" rtl="0" eaLnBrk="1" latinLnBrk="0" hangingPunct="1">
+      <a:defRPr sz="1200" kern="1200">
+        <a:solidFill>
+          <a:schemeClr val="tx1"/>
+        </a:solidFill>
+        <a:latin typeface="+mn-lt"/>
+        <a:ea typeface="+mn-ea"/>
+        <a:cs typeface="+mn-cs"/>
+      </a:defRPr>
+    </a:lvl3pPr>
+    <a:lvl4pPr marL="1371600" algn="l" defTabSz="914400" rtl="0" eaLnBrk="1" latinLnBrk="0" hangingPunct="1">
+      <a:defRPr sz="1200" kern="1200">
+        <a:solidFill>
+          <a:schemeClr val="tx1"/>
+        </a:solidFill>
+        <a:latin typeface="+mn-lt"/>
+        <a:ea typeface="+mn-ea"/>
+        <a:cs typeface="+mn-cs"/>
+      </a:defRPr>
+    </a:lvl4pPr>
+    <a:lvl5pPr marL="1828800" algn="l" defTabSz="914400" rtl="0" eaLnBrk="1" latinLnBrk="0" hangingPunct="1">
+      <a:defRPr sz="1200" kern="1200">
+        <a:solidFill>
+          <a:schemeClr val="tx1"/>
+        </a:solidFill>
+        <a:latin typeface="+mn-lt"/>
+        <a:ea typeface="+mn-ea"/>
+        <a:cs typeface="+mn-cs"/>
+      </a:defRPr>
+    </a:lvl5pPr>
+    <a:lvl6pPr marL="2286000" algn="l" defTabSz="914400" rtl="0" eaLnBrk="1" latinLnBrk="0" hangingPunct="1">
+      <a:defRPr sz="1200" kern="1200">
+        <a:solidFill>
+          <a:schemeClr val="tx1"/>
+        </a:solidFill>
+        <a:latin typeface="+mn-lt"/>
+        <a:ea typeface="+mn-ea"/>
+        <a:cs typeface="+mn-cs"/>
+      </a:defRPr>
+    </a:lvl6pPr>
+    <a:lvl7pPr marL="2743200" algn="l" defTabSz="914400" rtl="0" eaLnBrk="1" latinLnBrk="0" hangingPunct="1">
+      <a:defRPr sz="1200" kern="1200">
+        <a:solidFill>
+          <a:schemeClr val="tx1"/>
+        </a:solidFill>
+        <a:latin typeface="+mn-lt"/>
+        <a:ea typeface="+mn-ea"/>
+        <a:cs typeface="+mn-cs"/>
+      </a:defRPr>
+    </a:lvl7pPr>
+    <a:lvl8pPr marL="3200400" algn="l" defTabSz="914400" rtl="0" eaLnBrk="1" latinLnBrk="0" hangingPunct="1">
+      <a:defRPr sz="1200" kern="1200">
+        <a:solidFill>
+          <a:schemeClr val="tx1"/>
+        </a:solidFill>
+        <a:latin typeface="+mn-lt"/>
+        <a:ea typeface="+mn-ea"/>
+        <a:cs typeface="+mn-cs"/>
+      </a:defRPr>
+    </a:lvl8pPr>
+    <a:lvl9pPr marL="3657600" algn="l" defTabSz="914400" rtl="0" eaLnBrk="1" latinLnBrk="0" hangingPunct="1">
+      <a:defRPr sz="1200" kern="1200">
+        <a:solidFill>
+          <a:schemeClr val="tx1"/>
+        </a:solidFill>
+        <a:latin typeface="+mn-lt"/>
+        <a:ea typeface="+mn-ea"/>
+        <a:cs typeface="+mn-cs"/>
+      </a:defRPr>
+    </a:lvl9pPr>
+  </p:notesStyle>
+</p:notesMaster>
+</file>
+
 <file path=ppt/slideLayouts/slideLayout1.xml><?xml version="1.0" encoding="utf-8"?>
 <p:sldLayout xmlns:a="http://schemas.openxmlformats.org/drawingml/2006/main" xmlns:r="http://schemas.openxmlformats.org/officeDocument/2006/relationships" xmlns:p="http://schemas.openxmlformats.org/presentationml/2006/main" type="title" preserve="1">
   <p:cSld name="Title Slide">
@@ -266,7 +620,7 @@
           <a:p>
             <a:fld id="{B482AB83-0AB6-483E-883E-23F305AEAE74}" type="datetimeFigureOut">
               <a:rPr lang="en-ID" smtClean="0"/>
-              <a:t>14/10/2024</a:t>
+              <a:t>19/10/2024</a:t>
             </a:fld>
             <a:endParaRPr lang="en-ID"/>
           </a:p>
@@ -466,7 +820,7 @@
           <a:p>
             <a:fld id="{B482AB83-0AB6-483E-883E-23F305AEAE74}" type="datetimeFigureOut">
               <a:rPr lang="en-ID" smtClean="0"/>
-              <a:t>14/10/2024</a:t>
+              <a:t>19/10/2024</a:t>
             </a:fld>
             <a:endParaRPr lang="en-ID"/>
           </a:p>
@@ -676,7 +1030,7 @@
           <a:p>
             <a:fld id="{B482AB83-0AB6-483E-883E-23F305AEAE74}" type="datetimeFigureOut">
               <a:rPr lang="en-ID" smtClean="0"/>
-              <a:t>14/10/2024</a:t>
+              <a:t>19/10/2024</a:t>
             </a:fld>
             <a:endParaRPr lang="en-ID"/>
           </a:p>
@@ -876,7 +1230,7 @@
           <a:p>
             <a:fld id="{B482AB83-0AB6-483E-883E-23F305AEAE74}" type="datetimeFigureOut">
               <a:rPr lang="en-ID" smtClean="0"/>
-              <a:t>14/10/2024</a:t>
+              <a:t>19/10/2024</a:t>
             </a:fld>
             <a:endParaRPr lang="en-ID"/>
           </a:p>
@@ -1152,7 +1506,7 @@
           <a:p>
             <a:fld id="{B482AB83-0AB6-483E-883E-23F305AEAE74}" type="datetimeFigureOut">
               <a:rPr lang="en-ID" smtClean="0"/>
-              <a:t>14/10/2024</a:t>
+              <a:t>19/10/2024</a:t>
             </a:fld>
             <a:endParaRPr lang="en-ID"/>
           </a:p>
@@ -1420,7 +1774,7 @@
           <a:p>
             <a:fld id="{B482AB83-0AB6-483E-883E-23F305AEAE74}" type="datetimeFigureOut">
               <a:rPr lang="en-ID" smtClean="0"/>
-              <a:t>14/10/2024</a:t>
+              <a:t>19/10/2024</a:t>
             </a:fld>
             <a:endParaRPr lang="en-ID"/>
           </a:p>
@@ -1835,7 +2189,7 @@
           <a:p>
             <a:fld id="{B482AB83-0AB6-483E-883E-23F305AEAE74}" type="datetimeFigureOut">
               <a:rPr lang="en-ID" smtClean="0"/>
-              <a:t>14/10/2024</a:t>
+              <a:t>19/10/2024</a:t>
             </a:fld>
             <a:endParaRPr lang="en-ID"/>
           </a:p>
@@ -1977,7 +2331,7 @@
           <a:p>
             <a:fld id="{B482AB83-0AB6-483E-883E-23F305AEAE74}" type="datetimeFigureOut">
               <a:rPr lang="en-ID" smtClean="0"/>
-              <a:t>14/10/2024</a:t>
+              <a:t>19/10/2024</a:t>
             </a:fld>
             <a:endParaRPr lang="en-ID"/>
           </a:p>
@@ -2090,7 +2444,7 @@
           <a:p>
             <a:fld id="{B482AB83-0AB6-483E-883E-23F305AEAE74}" type="datetimeFigureOut">
               <a:rPr lang="en-ID" smtClean="0"/>
-              <a:t>14/10/2024</a:t>
+              <a:t>19/10/2024</a:t>
             </a:fld>
             <a:endParaRPr lang="en-ID"/>
           </a:p>
@@ -2403,7 +2757,7 @@
           <a:p>
             <a:fld id="{B482AB83-0AB6-483E-883E-23F305AEAE74}" type="datetimeFigureOut">
               <a:rPr lang="en-ID" smtClean="0"/>
-              <a:t>14/10/2024</a:t>
+              <a:t>19/10/2024</a:t>
             </a:fld>
             <a:endParaRPr lang="en-ID"/>
           </a:p>
@@ -2692,7 +3046,7 @@
           <a:p>
             <a:fld id="{B482AB83-0AB6-483E-883E-23F305AEAE74}" type="datetimeFigureOut">
               <a:rPr lang="en-ID" smtClean="0"/>
-              <a:t>14/10/2024</a:t>
+              <a:t>19/10/2024</a:t>
             </a:fld>
             <a:endParaRPr lang="en-ID"/>
           </a:p>
@@ -2935,7 +3289,7 @@
           <a:p>
             <a:fld id="{B482AB83-0AB6-483E-883E-23F305AEAE74}" type="datetimeFigureOut">
               <a:rPr lang="en-ID" smtClean="0"/>
-              <a:t>14/10/2024</a:t>
+              <a:t>19/10/2024</a:t>
             </a:fld>
             <a:endParaRPr lang="en-ID"/>
           </a:p>
@@ -3357,7 +3711,7 @@
           <p:cNvPr id="2" name="Title 1">
             <a:extLst>
               <a:ext uri="{FF2B5EF4-FFF2-40B4-BE49-F238E27FC236}">
-                <a16:creationId xmlns:a16="http://schemas.microsoft.com/office/drawing/2014/main" id="{36026DCC-0E79-7305-0E6F-2B2BDCCEFCF5}"/>
+                <a16:creationId xmlns:a16="http://schemas.microsoft.com/office/drawing/2014/main" id="{129CD960-55F2-46C8-4B09-B929FE99888E}"/>
               </a:ext>
             </a:extLst>
           </p:cNvPr>
@@ -3366,189 +3720,151 @@
           </p:cNvSpPr>
           <p:nvPr>
             <p:ph type="title"/>
-          </p:nvPr>
-        </p:nvSpPr>
-        <p:spPr/>
-        <p:txBody>
-          <a:bodyPr/>
-          <a:lstStyle/>
-          <a:p>
-            <a:r>
-              <a:rPr lang="en-ID" dirty="0"/>
-              <a:t>Background :</a:t>
-            </a:r>
-          </a:p>
-        </p:txBody>
-      </p:sp>
-      <p:sp>
-        <p:nvSpPr>
-          <p:cNvPr id="3" name="Content Placeholder 2">
-            <a:extLst>
-              <a:ext uri="{FF2B5EF4-FFF2-40B4-BE49-F238E27FC236}">
-                <a16:creationId xmlns:a16="http://schemas.microsoft.com/office/drawing/2014/main" id="{39507FDF-C91D-2B5A-7FF7-F96BAF5F3E97}"/>
-              </a:ext>
-            </a:extLst>
-          </p:cNvPr>
-          <p:cNvSpPr>
-            <a:spLocks noGrp="1"/>
-          </p:cNvSpPr>
-          <p:nvPr>
-            <p:ph idx="1"/>
           </p:nvPr>
         </p:nvSpPr>
         <p:spPr>
           <a:xfrm>
-            <a:off x="838200" y="1825625"/>
-            <a:ext cx="5718243" cy="4351338"/>
+            <a:off x="458822" y="287305"/>
+            <a:ext cx="9687128" cy="627096"/>
           </a:xfrm>
         </p:spPr>
         <p:txBody>
-          <a:bodyPr/>
-          <a:lstStyle/>
-          <a:p>
-            <a:r>
-              <a:rPr lang="en-ID" dirty="0"/>
-              <a:t>In a previous study, the presence of +1 alleles in microsatellites was identified through PCR sequencing of </a:t>
-            </a:r>
-            <a:r>
-              <a:rPr lang="en-ID" dirty="0" err="1"/>
-              <a:t>tumor</a:t>
-            </a:r>
-            <a:r>
-              <a:rPr lang="en-ID" dirty="0"/>
-              <a:t> samples from patients with CRC and EC.</a:t>
-            </a:r>
-          </a:p>
-          <a:p>
-            <a:endParaRPr lang="en-ID" dirty="0"/>
-          </a:p>
-          <a:p>
-            <a:r>
-              <a:rPr lang="en-ID" dirty="0"/>
-              <a:t>Curiously, the relative frequency of these +1 alleles were significantly higher in MSS </a:t>
-            </a:r>
-            <a:r>
-              <a:rPr lang="en-ID" dirty="0" err="1"/>
-              <a:t>tumors</a:t>
-            </a:r>
-            <a:r>
-              <a:rPr lang="en-ID" dirty="0"/>
-              <a:t> compared to MSI </a:t>
-            </a:r>
-            <a:r>
-              <a:rPr lang="en-ID" dirty="0" err="1"/>
-              <a:t>tumors</a:t>
-            </a:r>
-            <a:r>
-              <a:rPr lang="en-ID" dirty="0"/>
-              <a:t>.</a:t>
-            </a:r>
-          </a:p>
-          <a:p>
-            <a:endParaRPr lang="en-ID" dirty="0"/>
-          </a:p>
-        </p:txBody>
-      </p:sp>
-      <p:pic>
-        <p:nvPicPr>
-          <p:cNvPr id="5" name="Picture 4">
-            <a:extLst>
-              <a:ext uri="{FF2B5EF4-FFF2-40B4-BE49-F238E27FC236}">
-                <a16:creationId xmlns:a16="http://schemas.microsoft.com/office/drawing/2014/main" id="{41E1DCBA-8FAA-B959-AD1A-5731CEBD77EB}"/>
-              </a:ext>
-            </a:extLst>
-          </p:cNvPr>
-          <p:cNvPicPr>
-            <a:picLocks noChangeAspect="1"/>
-          </p:cNvPicPr>
-          <p:nvPr/>
-        </p:nvPicPr>
-        <p:blipFill>
-          <a:blip r:embed="rId2"/>
-          <a:stretch>
-            <a:fillRect/>
-          </a:stretch>
-        </p:blipFill>
+          <a:bodyPr>
+            <a:normAutofit/>
+          </a:bodyPr>
+          <a:lstStyle/>
+          <a:p>
+            <a:r>
+              <a:rPr lang="en-ID" sz="3600" dirty="0"/>
+              <a:t>Background :</a:t>
+            </a:r>
+          </a:p>
+        </p:txBody>
+      </p:sp>
+      <p:sp>
+        <p:nvSpPr>
+          <p:cNvPr id="3" name="Content Placeholder 2">
+            <a:extLst>
+              <a:ext uri="{FF2B5EF4-FFF2-40B4-BE49-F238E27FC236}">
+                <a16:creationId xmlns:a16="http://schemas.microsoft.com/office/drawing/2014/main" id="{5F3923B0-462B-CCA0-1476-C909327439BE}"/>
+              </a:ext>
+            </a:extLst>
+          </p:cNvPr>
+          <p:cNvSpPr>
+            <a:spLocks noGrp="1"/>
+          </p:cNvSpPr>
+          <p:nvPr>
+            <p:ph idx="1"/>
+          </p:nvPr>
+        </p:nvSpPr>
         <p:spPr>
           <a:xfrm>
-            <a:off x="8466442" y="494388"/>
-            <a:ext cx="2486903" cy="4211604"/>
+            <a:off x="731196" y="1253331"/>
+            <a:ext cx="10515600" cy="4351338"/>
           </a:xfrm>
-          <a:prstGeom prst="rect">
-            <a:avLst/>
-          </a:prstGeom>
         </p:spPr>
-      </p:pic>
-      <p:sp>
-        <p:nvSpPr>
-          <p:cNvPr id="7" name="TextBox 6">
-            <a:extLst>
-              <a:ext uri="{FF2B5EF4-FFF2-40B4-BE49-F238E27FC236}">
-                <a16:creationId xmlns:a16="http://schemas.microsoft.com/office/drawing/2014/main" id="{00C7C0CE-80BA-23CB-9C8A-D7D6BD1812A8}"/>
-              </a:ext>
-            </a:extLst>
-          </p:cNvPr>
-          <p:cNvSpPr txBox="1"/>
-          <p:nvPr/>
-        </p:nvSpPr>
-        <p:spPr>
-          <a:xfrm>
-            <a:off x="8242571" y="4705992"/>
-            <a:ext cx="3949429" cy="923330"/>
-          </a:xfrm>
-          <a:prstGeom prst="rect">
-            <a:avLst/>
-          </a:prstGeom>
-          <a:noFill/>
-        </p:spPr>
-        <p:txBody>
-          <a:bodyPr wrap="square" rtlCol="0">
-            <a:spAutoFit/>
-          </a:bodyPr>
-          <a:lstStyle/>
-          <a:p>
-            <a:pPr algn="ctr"/>
-            <a:r>
-              <a:rPr lang="en-ID" dirty="0"/>
-              <a:t>Figure 1. Standardized ratios (MSI/MSS) of relative allele frequencies, grouped by allele length </a:t>
-            </a:r>
-          </a:p>
-        </p:txBody>
-      </p:sp>
-      <p:pic>
-        <p:nvPicPr>
-          <p:cNvPr id="9" name="Picture 8">
-            <a:extLst>
-              <a:ext uri="{FF2B5EF4-FFF2-40B4-BE49-F238E27FC236}">
-                <a16:creationId xmlns:a16="http://schemas.microsoft.com/office/drawing/2014/main" id="{46902565-DA3C-4138-24AD-8AA1424D417A}"/>
-              </a:ext>
-            </a:extLst>
-          </p:cNvPr>
-          <p:cNvPicPr>
-            <a:picLocks noChangeAspect="1"/>
-          </p:cNvPicPr>
-          <p:nvPr/>
-        </p:nvPicPr>
-        <p:blipFill>
-          <a:blip r:embed="rId3"/>
-          <a:stretch>
-            <a:fillRect/>
-          </a:stretch>
-        </p:blipFill>
-        <p:spPr>
-          <a:xfrm>
-            <a:off x="10975333" y="1825625"/>
-            <a:ext cx="1194678" cy="812874"/>
-          </a:xfrm>
-          <a:prstGeom prst="rect">
-            <a:avLst/>
-          </a:prstGeom>
-        </p:spPr>
-      </p:pic>
+        <p:txBody>
+          <a:bodyPr/>
+          <a:lstStyle/>
+          <a:p>
+            <a:r>
+              <a:rPr lang="en-ID" sz="2400" dirty="0"/>
+              <a:t>Microsatellite instability (MSI)</a:t>
+            </a:r>
+          </a:p>
+          <a:p>
+            <a:pPr lvl="1"/>
+            <a:r>
+              <a:rPr lang="en-ID" sz="2000" dirty="0"/>
+              <a:t>Increased frequency of length mutations in microsatellite regions</a:t>
+            </a:r>
+          </a:p>
+          <a:p>
+            <a:pPr lvl="1"/>
+            <a:r>
+              <a:rPr lang="en-ID" sz="2000" dirty="0"/>
+              <a:t>Usually caused by lack of mismatch repair (MMR)</a:t>
+            </a:r>
+          </a:p>
+          <a:p>
+            <a:endParaRPr lang="en-ID" sz="2400" dirty="0"/>
+          </a:p>
+          <a:p>
+            <a:r>
+              <a:rPr lang="en-ID" sz="2400" dirty="0"/>
+              <a:t>Aim : Can we predict MMR status via MSI ?</a:t>
+            </a:r>
+          </a:p>
+          <a:p>
+            <a:pPr lvl="1"/>
+            <a:r>
+              <a:rPr lang="en-ID" sz="2000" dirty="0"/>
+              <a:t>MSI measured by ↑ frequency of mutant alleles</a:t>
+            </a:r>
+          </a:p>
+          <a:p>
+            <a:pPr lvl="1"/>
+            <a:r>
+              <a:rPr lang="en-ID" sz="2000" dirty="0"/>
+              <a:t>High MSI </a:t>
+            </a:r>
+            <a:r>
+              <a:rPr lang="en-ID" sz="2000" b="0" i="0" u="none" strike="noStrike" dirty="0">
+                <a:effectLst/>
+              </a:rPr>
+              <a:t>→ </a:t>
+            </a:r>
+            <a:r>
+              <a:rPr lang="en-ID" sz="2000" b="0" i="0" u="none" strike="noStrike" dirty="0" err="1">
+                <a:effectLst/>
+              </a:rPr>
+              <a:t>MMRd</a:t>
+            </a:r>
+            <a:r>
+              <a:rPr lang="en-ID" sz="2000" b="0" i="0" u="none" strike="noStrike" dirty="0">
+                <a:effectLst/>
+              </a:rPr>
+              <a:t> </a:t>
+            </a:r>
+          </a:p>
+          <a:p>
+            <a:pPr lvl="1"/>
+            <a:endParaRPr lang="en-ID" sz="2000" dirty="0"/>
+          </a:p>
+          <a:p>
+            <a:r>
+              <a:rPr lang="en-ID" sz="2400" dirty="0"/>
+              <a:t>Problem :</a:t>
+            </a:r>
+          </a:p>
+          <a:p>
+            <a:pPr lvl="1"/>
+            <a:r>
+              <a:rPr lang="en-ID" sz="2000" dirty="0"/>
+              <a:t>Are some mutant alleles (+1, -1, etc..) more predictive than others?</a:t>
+            </a:r>
+          </a:p>
+          <a:p>
+            <a:endParaRPr lang="en-ID" dirty="0"/>
+          </a:p>
+          <a:p>
+            <a:endParaRPr lang="en-ID" dirty="0"/>
+          </a:p>
+          <a:p>
+            <a:endParaRPr lang="en-ID" dirty="0"/>
+          </a:p>
+          <a:p>
+            <a:endParaRPr lang="en-ID" dirty="0"/>
+          </a:p>
+          <a:p>
+            <a:endParaRPr lang="en-ID" dirty="0"/>
+          </a:p>
+        </p:txBody>
+      </p:sp>
     </p:spTree>
     <p:extLst>
       <p:ext uri="{BB962C8B-B14F-4D97-AF65-F5344CB8AC3E}">
-        <p14:creationId xmlns:p14="http://schemas.microsoft.com/office/powerpoint/2010/main" val="216531897"/>
+        <p14:creationId xmlns:p14="http://schemas.microsoft.com/office/powerpoint/2010/main" val="1660227001"/>
       </p:ext>
     </p:extLst>
   </p:cSld>
@@ -3591,14 +3907,21 @@
             <p:ph type="title"/>
           </p:nvPr>
         </p:nvSpPr>
-        <p:spPr/>
-        <p:txBody>
-          <a:bodyPr/>
-          <a:lstStyle/>
-          <a:p>
-            <a:r>
-              <a:rPr lang="en-ID" dirty="0"/>
-              <a:t>Problem :</a:t>
+        <p:spPr>
+          <a:xfrm>
+            <a:off x="458822" y="287305"/>
+            <a:ext cx="9687128" cy="627096"/>
+          </a:xfrm>
+        </p:spPr>
+        <p:txBody>
+          <a:bodyPr>
+            <a:normAutofit/>
+          </a:bodyPr>
+          <a:lstStyle/>
+          <a:p>
+            <a:r>
+              <a:rPr lang="en-ID" sz="3600" dirty="0"/>
+              <a:t>To Investigate :</a:t>
             </a:r>
           </a:p>
         </p:txBody>
@@ -3619,29 +3942,118 @@
             <p:ph idx="1"/>
           </p:nvPr>
         </p:nvSpPr>
-        <p:spPr/>
-        <p:txBody>
-          <a:bodyPr/>
-          <a:lstStyle/>
-          <a:p>
-            <a:r>
-              <a:rPr lang="en-ID" dirty="0"/>
-              <a:t>The +1 alleles were detected at a very low frequency, making it unclear whether they represent actual insertion mutations in the microsatellites or are simply a result of PCR artefacts.</a:t>
-            </a:r>
-          </a:p>
-          <a:p>
-            <a:endParaRPr lang="en-ID" dirty="0"/>
-          </a:p>
-          <a:p>
-            <a:r>
-              <a:rPr lang="en-ID" dirty="0"/>
-              <a:t>If it is the case that the majority of the +1 alleles observed are due to PCR artefacts, then it would be beneficial to exclude the +1 allele frequency from the training dataset (for classification)</a:t>
-            </a:r>
-          </a:p>
-          <a:p>
-            <a:endParaRPr lang="en-ID" dirty="0"/>
-          </a:p>
-          <a:p>
+        <p:spPr>
+          <a:xfrm>
+            <a:off x="731196" y="1253331"/>
+            <a:ext cx="10515600" cy="4351338"/>
+          </a:xfrm>
+        </p:spPr>
+        <p:txBody>
+          <a:bodyPr/>
+          <a:lstStyle/>
+          <a:p>
+            <a:r>
+              <a:rPr lang="en-ID" sz="2400" dirty="0"/>
+              <a:t>Low frequency of +1 alleles (~1%)</a:t>
+            </a:r>
+          </a:p>
+          <a:p>
+            <a:pPr lvl="1"/>
+            <a:r>
+              <a:rPr lang="en-ID" sz="2000" dirty="0"/>
+              <a:t>Higher in </a:t>
+            </a:r>
+            <a:r>
+              <a:rPr lang="en-ID" sz="2000" dirty="0" err="1"/>
+              <a:t>MMRp</a:t>
+            </a:r>
+            <a:r>
+              <a:rPr lang="en-ID" sz="2000" dirty="0"/>
+              <a:t> than </a:t>
+            </a:r>
+            <a:r>
+              <a:rPr lang="en-ID" sz="2000" dirty="0" err="1"/>
+              <a:t>MMRd</a:t>
+            </a:r>
+            <a:endParaRPr lang="en-ID" sz="2000" dirty="0"/>
+          </a:p>
+          <a:p>
+            <a:pPr lvl="1"/>
+            <a:r>
+              <a:rPr lang="en-ID" sz="2000" dirty="0"/>
+              <a:t>Genuine insertion mutations?</a:t>
+            </a:r>
+          </a:p>
+          <a:p>
+            <a:pPr lvl="1"/>
+            <a:r>
+              <a:rPr lang="en-ID" sz="2000" dirty="0"/>
+              <a:t>PCR artefacts?  </a:t>
+            </a:r>
+            <a:r>
+              <a:rPr lang="en-ID" sz="2000" b="0" i="0" u="none" strike="noStrike" dirty="0">
+                <a:effectLst/>
+              </a:rPr>
+              <a:t>→  not predictive of </a:t>
+            </a:r>
+            <a:r>
+              <a:rPr lang="en-ID" sz="2000" b="0" i="0" u="none" strike="noStrike" dirty="0" err="1">
+                <a:effectLst/>
+              </a:rPr>
+              <a:t>MMRd</a:t>
+            </a:r>
+            <a:endParaRPr lang="en-ID" sz="2000" b="0" i="0" u="none" strike="noStrike" dirty="0">
+              <a:effectLst/>
+            </a:endParaRPr>
+          </a:p>
+          <a:p>
+            <a:pPr lvl="1"/>
+            <a:endParaRPr lang="en-ID" sz="2000" dirty="0"/>
+          </a:p>
+          <a:p>
+            <a:pPr lvl="1"/>
+            <a:endParaRPr lang="en-ID" sz="2000" dirty="0"/>
+          </a:p>
+          <a:p>
+            <a:r>
+              <a:rPr lang="en-ID" sz="2400" dirty="0"/>
+              <a:t>Is there a correlation between the allele frequencies?</a:t>
+            </a:r>
+          </a:p>
+          <a:p>
+            <a:pPr lvl="1"/>
+            <a:r>
+              <a:rPr lang="en-ID" sz="2000" dirty="0"/>
+              <a:t>0 vs +1,  -1 vs +1 ?</a:t>
+            </a:r>
+          </a:p>
+          <a:p>
+            <a:pPr lvl="1"/>
+            <a:r>
+              <a:rPr lang="en-ID" sz="2000" dirty="0"/>
+              <a:t>Different behaviour between </a:t>
+            </a:r>
+            <a:r>
+              <a:rPr lang="en-ID" sz="2000" dirty="0" err="1"/>
+              <a:t>MMRp</a:t>
+            </a:r>
+            <a:r>
+              <a:rPr lang="en-ID" sz="2000" dirty="0"/>
+              <a:t> and </a:t>
+            </a:r>
+            <a:r>
+              <a:rPr lang="en-ID" sz="2000" dirty="0" err="1"/>
+              <a:t>MMRd</a:t>
+            </a:r>
+            <a:r>
+              <a:rPr lang="en-ID" sz="2000" dirty="0"/>
+              <a:t> ?</a:t>
+            </a:r>
+          </a:p>
+          <a:p>
+            <a:pPr marL="0" indent="0">
+              <a:buNone/>
+            </a:pPr>
             <a:endParaRPr lang="en-ID" dirty="0"/>
           </a:p>
         </p:txBody>
@@ -3681,7 +4093,7 @@
           <p:cNvPr id="2" name="Title 1">
             <a:extLst>
               <a:ext uri="{FF2B5EF4-FFF2-40B4-BE49-F238E27FC236}">
-                <a16:creationId xmlns:a16="http://schemas.microsoft.com/office/drawing/2014/main" id="{BCE08866-917D-06F1-2BCC-2E70274D2C44}"/>
+                <a16:creationId xmlns:a16="http://schemas.microsoft.com/office/drawing/2014/main" id="{5709C9F6-CD43-E4F8-16BB-6188EADA7D0E}"/>
               </a:ext>
             </a:extLst>
           </p:cNvPr>
@@ -3692,71 +4104,256 @@
             <p:ph type="title"/>
           </p:nvPr>
         </p:nvSpPr>
+        <p:spPr>
+          <a:xfrm>
+            <a:off x="993842" y="500062"/>
+            <a:ext cx="10515600" cy="1325563"/>
+          </a:xfrm>
+        </p:spPr>
+        <p:txBody>
+          <a:bodyPr/>
+          <a:lstStyle/>
+          <a:p>
+            <a:r>
+              <a:rPr lang="en-ID" dirty="0"/>
+              <a:t>Result (0 vs +1)</a:t>
+            </a:r>
+          </a:p>
+        </p:txBody>
+      </p:sp>
+      <p:sp>
+        <p:nvSpPr>
+          <p:cNvPr id="3" name="Content Placeholder 2">
+            <a:extLst>
+              <a:ext uri="{FF2B5EF4-FFF2-40B4-BE49-F238E27FC236}">
+                <a16:creationId xmlns:a16="http://schemas.microsoft.com/office/drawing/2014/main" id="{441C49D0-3606-85E9-72AF-849DA0814AD3}"/>
+              </a:ext>
+            </a:extLst>
+          </p:cNvPr>
+          <p:cNvSpPr>
+            <a:spLocks noGrp="1"/>
+          </p:cNvSpPr>
+          <p:nvPr>
+            <p:ph idx="1"/>
+          </p:nvPr>
+        </p:nvSpPr>
         <p:spPr/>
         <p:txBody>
           <a:bodyPr/>
           <a:lstStyle/>
           <a:p>
-            <a:r>
-              <a:rPr lang="en-US" dirty="0"/>
-              <a:t>Solution</a:t>
-            </a:r>
+            <a:pPr marL="0" indent="0">
+              <a:buNone/>
+            </a:pPr>
             <a:endParaRPr lang="en-ID" dirty="0"/>
           </a:p>
-        </p:txBody>
-      </p:sp>
-      <p:sp>
-        <p:nvSpPr>
-          <p:cNvPr id="3" name="Content Placeholder 2">
-            <a:extLst>
-              <a:ext uri="{FF2B5EF4-FFF2-40B4-BE49-F238E27FC236}">
-                <a16:creationId xmlns:a16="http://schemas.microsoft.com/office/drawing/2014/main" id="{7D108A90-8F61-93C8-ECF6-5ED3ACDE7E4D}"/>
-              </a:ext>
-            </a:extLst>
-          </p:cNvPr>
-          <p:cNvSpPr>
-            <a:spLocks noGrp="1"/>
-          </p:cNvSpPr>
-          <p:nvPr>
-            <p:ph idx="1"/>
-          </p:nvPr>
-        </p:nvSpPr>
-        <p:spPr/>
-        <p:txBody>
-          <a:bodyPr/>
-          <a:lstStyle/>
-          <a:p>
-            <a:r>
-              <a:rPr lang="en-ID" dirty="0"/>
-              <a:t>Spearman’s test was used to determine the correlation between the reference and +1 allele frequencies for each microsatellite marker in both MSS and MSI </a:t>
-            </a:r>
-            <a:r>
-              <a:rPr lang="en-ID" dirty="0" err="1"/>
-              <a:t>tumors</a:t>
-            </a:r>
+          <a:p>
             <a:endParaRPr lang="en-ID" dirty="0"/>
           </a:p>
-          <a:p>
-            <a:endParaRPr lang="en-ID" dirty="0"/>
-          </a:p>
-          <a:p>
-            <a:endParaRPr lang="en-ID" dirty="0"/>
-          </a:p>
-          <a:p>
-            <a:endParaRPr lang="en-ID" dirty="0"/>
-          </a:p>
-          <a:p>
-            <a:r>
-              <a:rPr lang="en-ID" dirty="0"/>
-              <a:t>???</a:t>
-            </a:r>
-          </a:p>
-        </p:txBody>
-      </p:sp>
+        </p:txBody>
+      </p:sp>
+      <p:sp>
+        <p:nvSpPr>
+          <p:cNvPr id="6" name="TextBox 5">
+            <a:extLst>
+              <a:ext uri="{FF2B5EF4-FFF2-40B4-BE49-F238E27FC236}">
+                <a16:creationId xmlns:a16="http://schemas.microsoft.com/office/drawing/2014/main" id="{4BC78215-EC87-78F4-E9BC-D5FDAEE7ACED}"/>
+              </a:ext>
+            </a:extLst>
+          </p:cNvPr>
+          <p:cNvSpPr txBox="1"/>
+          <p:nvPr/>
+        </p:nvSpPr>
+        <p:spPr>
+          <a:xfrm>
+            <a:off x="311756" y="2391311"/>
+            <a:ext cx="9659095" cy="3785652"/>
+          </a:xfrm>
+          <a:prstGeom prst="rect">
+            <a:avLst/>
+          </a:prstGeom>
+          <a:noFill/>
+        </p:spPr>
+        <p:txBody>
+          <a:bodyPr wrap="square" rtlCol="0">
+            <a:spAutoFit/>
+          </a:bodyPr>
+          <a:lstStyle/>
+          <a:p>
+            <a:pPr marL="342900" indent="-342900">
+              <a:buFont typeface="Arial" panose="020B0604020202020204" pitchFamily="34" charset="0"/>
+              <a:buChar char="•"/>
+            </a:pPr>
+            <a:r>
+              <a:rPr lang="en-ID" sz="2400" dirty="0"/>
+              <a:t>Different </a:t>
+            </a:r>
+            <a:r>
+              <a:rPr lang="en-ID" sz="2400" dirty="0" err="1"/>
+              <a:t>behavior</a:t>
+            </a:r>
+            <a:r>
+              <a:rPr lang="en-ID" sz="2400" dirty="0"/>
+              <a:t> in </a:t>
+            </a:r>
+            <a:r>
+              <a:rPr lang="en-ID" sz="2400" dirty="0" err="1"/>
+              <a:t>MMRp</a:t>
+            </a:r>
+            <a:r>
+              <a:rPr lang="en-ID" sz="2400" dirty="0"/>
+              <a:t> and </a:t>
+            </a:r>
+            <a:r>
+              <a:rPr lang="en-ID" sz="2400" dirty="0" err="1"/>
+              <a:t>MMRd</a:t>
+            </a:r>
+            <a:endParaRPr lang="en-ID" sz="2400" dirty="0"/>
+          </a:p>
+          <a:p>
+            <a:pPr marL="342900" indent="-342900">
+              <a:buFont typeface="Arial" panose="020B0604020202020204" pitchFamily="34" charset="0"/>
+              <a:buChar char="•"/>
+            </a:pPr>
+            <a:endParaRPr lang="en-ID" sz="2400" dirty="0"/>
+          </a:p>
+          <a:p>
+            <a:pPr marL="342900" indent="-342900">
+              <a:buFont typeface="Arial" panose="020B0604020202020204" pitchFamily="34" charset="0"/>
+              <a:buChar char="•"/>
+            </a:pPr>
+            <a:r>
+              <a:rPr lang="en-ID" sz="2400" dirty="0"/>
+              <a:t>Negative correlation in </a:t>
+            </a:r>
+            <a:r>
+              <a:rPr lang="en-ID" sz="2400" dirty="0" err="1"/>
+              <a:t>MMRp</a:t>
+            </a:r>
+            <a:endParaRPr lang="en-ID" sz="2400" dirty="0"/>
+          </a:p>
+          <a:p>
+            <a:pPr marL="800100" lvl="1" indent="-342900">
+              <a:buFont typeface="Arial" panose="020B0604020202020204" pitchFamily="34" charset="0"/>
+              <a:buChar char="•"/>
+            </a:pPr>
+            <a:r>
+              <a:rPr lang="en-ID" sz="2400" dirty="0"/>
+              <a:t>Deletion in +1 allele ?</a:t>
+            </a:r>
+          </a:p>
+          <a:p>
+            <a:pPr marL="800100" lvl="1" indent="-342900">
+              <a:buFont typeface="Arial" panose="020B0604020202020204" pitchFamily="34" charset="0"/>
+              <a:buChar char="•"/>
+            </a:pPr>
+            <a:r>
+              <a:rPr lang="en-ID" sz="2400" dirty="0"/>
+              <a:t>Insertion in 0 allele ?</a:t>
+            </a:r>
+          </a:p>
+          <a:p>
+            <a:pPr marL="800100" lvl="1" indent="-342900">
+              <a:buFont typeface="Arial" panose="020B0604020202020204" pitchFamily="34" charset="0"/>
+              <a:buChar char="•"/>
+            </a:pPr>
+            <a:r>
+              <a:rPr lang="en-ID" sz="2400" dirty="0"/>
+              <a:t>Due to PCR artefact or </a:t>
+            </a:r>
+            <a:r>
+              <a:rPr lang="en-ID" sz="2400" dirty="0" err="1"/>
+              <a:t>MMRd</a:t>
+            </a:r>
+            <a:r>
+              <a:rPr lang="en-ID" sz="2400" dirty="0"/>
+              <a:t> ?</a:t>
+            </a:r>
+          </a:p>
+          <a:p>
+            <a:pPr marL="800100" lvl="1" indent="-342900">
+              <a:buFont typeface="Arial" panose="020B0604020202020204" pitchFamily="34" charset="0"/>
+              <a:buChar char="•"/>
+            </a:pPr>
+            <a:endParaRPr lang="en-ID" sz="2400" dirty="0"/>
+          </a:p>
+          <a:p>
+            <a:pPr marL="342900" indent="-342900">
+              <a:buFont typeface="Arial" panose="020B0604020202020204" pitchFamily="34" charset="0"/>
+              <a:buChar char="•"/>
+            </a:pPr>
+            <a:r>
+              <a:rPr lang="en-ID" sz="2400" dirty="0"/>
+              <a:t>Positive correlation in </a:t>
+            </a:r>
+            <a:r>
+              <a:rPr lang="en-ID" sz="2400" dirty="0" err="1"/>
+              <a:t>MMRd</a:t>
+            </a:r>
+            <a:endParaRPr lang="en-ID" sz="2400" dirty="0"/>
+          </a:p>
+          <a:p>
+            <a:pPr marL="800100" lvl="1" indent="-342900">
+              <a:buFont typeface="Arial" panose="020B0604020202020204" pitchFamily="34" charset="0"/>
+              <a:buChar char="•"/>
+            </a:pPr>
+            <a:r>
+              <a:rPr lang="en-ID" sz="2400" dirty="0"/>
+              <a:t>double deletion ?</a:t>
+            </a:r>
+          </a:p>
+          <a:p>
+            <a:pPr marL="800100" lvl="1" indent="-342900">
+              <a:buFont typeface="Arial" panose="020B0604020202020204" pitchFamily="34" charset="0"/>
+              <a:buChar char="•"/>
+            </a:pPr>
+            <a:r>
+              <a:rPr lang="en-ID" sz="2400" dirty="0"/>
+              <a:t>0 allele deletion rate ∝ +1 allele double deletion rate ?</a:t>
+            </a:r>
+          </a:p>
+        </p:txBody>
+      </p:sp>
+      <p:pic>
+        <p:nvPicPr>
+          <p:cNvPr id="5" name="Picture 4" descr="A chart with green and purple squares&#10;&#10;Description automatically generated">
+            <a:extLst>
+              <a:ext uri="{FF2B5EF4-FFF2-40B4-BE49-F238E27FC236}">
+                <a16:creationId xmlns:a16="http://schemas.microsoft.com/office/drawing/2014/main" id="{740EA9B7-B3E2-D9D5-10AD-7803D0387364}"/>
+              </a:ext>
+            </a:extLst>
+          </p:cNvPr>
+          <p:cNvPicPr>
+            <a:picLocks noChangeAspect="1"/>
+          </p:cNvPicPr>
+          <p:nvPr/>
+        </p:nvPicPr>
+        <p:blipFill>
+          <a:blip r:embed="rId2">
+            <a:extLst>
+              <a:ext uri="{28A0092B-C50C-407E-A947-70E740481C1C}">
+                <a14:useLocalDpi xmlns:a14="http://schemas.microsoft.com/office/drawing/2010/main" val="0"/>
+              </a:ext>
+            </a:extLst>
+          </a:blip>
+          <a:stretch>
+            <a:fillRect/>
+          </a:stretch>
+        </p:blipFill>
+        <p:spPr>
+          <a:xfrm>
+            <a:off x="6339828" y="1134911"/>
+            <a:ext cx="5852172" cy="4389129"/>
+          </a:xfrm>
+          <a:prstGeom prst="rect">
+            <a:avLst/>
+          </a:prstGeom>
+        </p:spPr>
+      </p:pic>
     </p:spTree>
     <p:extLst>
       <p:ext uri="{BB962C8B-B14F-4D97-AF65-F5344CB8AC3E}">
-        <p14:creationId xmlns:p14="http://schemas.microsoft.com/office/powerpoint/2010/main" val="1339199455"/>
+        <p14:creationId xmlns:p14="http://schemas.microsoft.com/office/powerpoint/2010/main" val="577176597"/>
       </p:ext>
     </p:extLst>
   </p:cSld>
@@ -3799,14 +4396,19 @@
             <p:ph type="title"/>
           </p:nvPr>
         </p:nvSpPr>
-        <p:spPr/>
+        <p:spPr>
+          <a:xfrm>
+            <a:off x="993842" y="500062"/>
+            <a:ext cx="10515600" cy="1325563"/>
+          </a:xfrm>
+        </p:spPr>
         <p:txBody>
           <a:bodyPr/>
           <a:lstStyle/>
           <a:p>
             <a:r>
               <a:rPr lang="en-ID" dirty="0"/>
-              <a:t>Result</a:t>
+              <a:t>Result (0 vs +1)</a:t>
             </a:r>
           </a:p>
         </p:txBody>
@@ -3842,12 +4444,84 @@
           </a:p>
         </p:txBody>
       </p:sp>
+      <p:sp>
+        <p:nvSpPr>
+          <p:cNvPr id="6" name="TextBox 5">
+            <a:extLst>
+              <a:ext uri="{FF2B5EF4-FFF2-40B4-BE49-F238E27FC236}">
+                <a16:creationId xmlns:a16="http://schemas.microsoft.com/office/drawing/2014/main" id="{4BC78215-EC87-78F4-E9BC-D5FDAEE7ACED}"/>
+              </a:ext>
+            </a:extLst>
+          </p:cNvPr>
+          <p:cNvSpPr txBox="1"/>
+          <p:nvPr/>
+        </p:nvSpPr>
+        <p:spPr>
+          <a:xfrm>
+            <a:off x="380014" y="3151188"/>
+            <a:ext cx="5570236" cy="1569660"/>
+          </a:xfrm>
+          <a:prstGeom prst="rect">
+            <a:avLst/>
+          </a:prstGeom>
+          <a:noFill/>
+        </p:spPr>
+        <p:txBody>
+          <a:bodyPr wrap="square" rtlCol="0">
+            <a:spAutoFit/>
+          </a:bodyPr>
+          <a:lstStyle/>
+          <a:p>
+            <a:pPr marL="342900" indent="-342900">
+              <a:buFont typeface="Arial" panose="020B0604020202020204" pitchFamily="34" charset="0"/>
+              <a:buChar char="•"/>
+            </a:pPr>
+            <a:r>
+              <a:rPr lang="en-ID" sz="2400" dirty="0"/>
+              <a:t>Slight negative correlation in marker behaviour between </a:t>
+            </a:r>
+            <a:r>
+              <a:rPr lang="en-ID" sz="2400" dirty="0" err="1"/>
+              <a:t>MMRp</a:t>
+            </a:r>
+            <a:r>
+              <a:rPr lang="en-ID" sz="2400" dirty="0"/>
+              <a:t> and </a:t>
+            </a:r>
+            <a:r>
+              <a:rPr lang="en-ID" sz="2400" dirty="0" err="1"/>
+              <a:t>MMRd</a:t>
+            </a:r>
+            <a:endParaRPr lang="en-ID" sz="2400" dirty="0"/>
+          </a:p>
+          <a:p>
+            <a:pPr marL="800100" lvl="1" indent="-342900">
+              <a:buFont typeface="Arial" panose="020B0604020202020204" pitchFamily="34" charset="0"/>
+              <a:buChar char="•"/>
+            </a:pPr>
+            <a:r>
+              <a:rPr lang="en-ID" sz="2400" dirty="0"/>
+              <a:t>not significant</a:t>
+            </a:r>
+          </a:p>
+          <a:p>
+            <a:pPr marL="800100" lvl="1" indent="-342900">
+              <a:buFont typeface="Arial" panose="020B0604020202020204" pitchFamily="34" charset="0"/>
+              <a:buChar char="•"/>
+            </a:pPr>
+            <a:r>
+              <a:rPr lang="en-ID" sz="2400" dirty="0"/>
+              <a:t>Spearman correlation : -0.03</a:t>
+            </a:r>
+          </a:p>
+        </p:txBody>
+      </p:sp>
       <p:pic>
         <p:nvPicPr>
-          <p:cNvPr id="5" name="Picture 4" descr="A graph with red and blue dots">
-            <a:extLst>
-              <a:ext uri="{FF2B5EF4-FFF2-40B4-BE49-F238E27FC236}">
-                <a16:creationId xmlns:a16="http://schemas.microsoft.com/office/drawing/2014/main" id="{CE3F7534-9FDF-ABE5-44BB-19B9BFA73050}"/>
+          <p:cNvPr id="7" name="Picture 6" descr="A graph with black dots and a blue line&#10;&#10;Description automatically generated">
+            <a:extLst>
+              <a:ext uri="{FF2B5EF4-FFF2-40B4-BE49-F238E27FC236}">
+                <a16:creationId xmlns:a16="http://schemas.microsoft.com/office/drawing/2014/main" id="{A4FE4323-EB22-061A-3F61-D1E75D75C4C5}"/>
               </a:ext>
             </a:extLst>
           </p:cNvPr>
@@ -3870,127 +4544,18 @@
         </p:blipFill>
         <p:spPr>
           <a:xfrm>
-            <a:off x="4553105" y="617510"/>
-            <a:ext cx="7307211" cy="4469063"/>
+            <a:off x="5959814" y="767508"/>
+            <a:ext cx="5852172" cy="4389129"/>
           </a:xfrm>
           <a:prstGeom prst="rect">
             <a:avLst/>
           </a:prstGeom>
         </p:spPr>
       </p:pic>
-      <p:sp>
-        <p:nvSpPr>
-          <p:cNvPr id="6" name="TextBox 5">
-            <a:extLst>
-              <a:ext uri="{FF2B5EF4-FFF2-40B4-BE49-F238E27FC236}">
-                <a16:creationId xmlns:a16="http://schemas.microsoft.com/office/drawing/2014/main" id="{4BC78215-EC87-78F4-E9BC-D5FDAEE7ACED}"/>
-              </a:ext>
-            </a:extLst>
-          </p:cNvPr>
-          <p:cNvSpPr txBox="1"/>
-          <p:nvPr/>
-        </p:nvSpPr>
-        <p:spPr>
-          <a:xfrm>
-            <a:off x="213590" y="2223643"/>
-            <a:ext cx="4339515" cy="2677656"/>
-          </a:xfrm>
-          <a:prstGeom prst="rect">
-            <a:avLst/>
-          </a:prstGeom>
-          <a:noFill/>
-        </p:spPr>
-        <p:txBody>
-          <a:bodyPr wrap="square" rtlCol="0">
-            <a:spAutoFit/>
-          </a:bodyPr>
-          <a:lstStyle/>
-          <a:p>
-            <a:pPr marL="342900" indent="-342900">
-              <a:buFont typeface="Arial" panose="020B0604020202020204" pitchFamily="34" charset="0"/>
-              <a:buChar char="•"/>
-            </a:pPr>
-            <a:r>
-              <a:rPr lang="en-ID" sz="2400" dirty="0"/>
-              <a:t>The reference and +1 allele frequencies of microsatellite markers are negatively correlated in MSS </a:t>
-            </a:r>
-            <a:r>
-              <a:rPr lang="en-ID" sz="2400" dirty="0" err="1"/>
-              <a:t>tumors</a:t>
-            </a:r>
-            <a:endParaRPr lang="en-ID" sz="2400" dirty="0"/>
-          </a:p>
-          <a:p>
-            <a:pPr marL="342900" indent="-342900">
-              <a:buFont typeface="Arial" panose="020B0604020202020204" pitchFamily="34" charset="0"/>
-              <a:buChar char="•"/>
-            </a:pPr>
-            <a:endParaRPr lang="en-ID" sz="2400" dirty="0"/>
-          </a:p>
-          <a:p>
-            <a:pPr marL="342900" indent="-342900">
-              <a:buFont typeface="Arial" panose="020B0604020202020204" pitchFamily="34" charset="0"/>
-              <a:buChar char="•"/>
-            </a:pPr>
-            <a:r>
-              <a:rPr lang="en-ID" sz="2400" dirty="0"/>
-              <a:t>The opposite trend is observed in MSI </a:t>
-            </a:r>
-            <a:r>
-              <a:rPr lang="en-ID" sz="2400" dirty="0" err="1"/>
-              <a:t>tumors</a:t>
-            </a:r>
-            <a:r>
-              <a:rPr lang="en-ID" sz="2400" dirty="0"/>
-              <a:t>.</a:t>
-            </a:r>
-          </a:p>
-        </p:txBody>
-      </p:sp>
-      <p:sp>
-        <p:nvSpPr>
-          <p:cNvPr id="7" name="TextBox 6">
-            <a:extLst>
-              <a:ext uri="{FF2B5EF4-FFF2-40B4-BE49-F238E27FC236}">
-                <a16:creationId xmlns:a16="http://schemas.microsoft.com/office/drawing/2014/main" id="{5597E078-628D-6763-E944-0E4BAE62F562}"/>
-              </a:ext>
-            </a:extLst>
-          </p:cNvPr>
-          <p:cNvSpPr txBox="1"/>
-          <p:nvPr/>
-        </p:nvSpPr>
-        <p:spPr>
-          <a:xfrm>
-            <a:off x="4339515" y="5299316"/>
-            <a:ext cx="8665081" cy="707886"/>
-          </a:xfrm>
-          <a:prstGeom prst="rect">
-            <a:avLst/>
-          </a:prstGeom>
-          <a:noFill/>
-        </p:spPr>
-        <p:txBody>
-          <a:bodyPr wrap="square" rtlCol="0">
-            <a:spAutoFit/>
-          </a:bodyPr>
-          <a:lstStyle/>
-          <a:p>
-            <a:r>
-              <a:rPr lang="en-ID" sz="2000" dirty="0"/>
-              <a:t>Figure 2. Spearman correlation coefficient for the reference and +1 allele frequencies of each microsatellite marker in MSI and MSS </a:t>
-            </a:r>
-            <a:r>
-              <a:rPr lang="en-ID" sz="2000" dirty="0" err="1"/>
-              <a:t>tumors</a:t>
-            </a:r>
-            <a:endParaRPr lang="en-ID" sz="2000" dirty="0"/>
-          </a:p>
-        </p:txBody>
-      </p:sp>
     </p:spTree>
     <p:extLst>
       <p:ext uri="{BB962C8B-B14F-4D97-AF65-F5344CB8AC3E}">
-        <p14:creationId xmlns:p14="http://schemas.microsoft.com/office/powerpoint/2010/main" val="577176597"/>
+        <p14:creationId xmlns:p14="http://schemas.microsoft.com/office/powerpoint/2010/main" val="1643746320"/>
       </p:ext>
     </p:extLst>
   </p:cSld>
@@ -4022,7 +4587,7 @@
           <p:cNvPr id="2" name="Title 1">
             <a:extLst>
               <a:ext uri="{FF2B5EF4-FFF2-40B4-BE49-F238E27FC236}">
-                <a16:creationId xmlns:a16="http://schemas.microsoft.com/office/drawing/2014/main" id="{FC62D525-E181-4327-86B6-39876CCBDA52}"/>
+                <a16:creationId xmlns:a16="http://schemas.microsoft.com/office/drawing/2014/main" id="{5709C9F6-CD43-E4F8-16BB-6188EADA7D0E}"/>
               </a:ext>
             </a:extLst>
           </p:cNvPr>
@@ -4031,103 +4596,207 @@
           </p:cNvSpPr>
           <p:nvPr>
             <p:ph type="title"/>
-          </p:nvPr>
-        </p:nvSpPr>
-        <p:spPr/>
-        <p:txBody>
-          <a:bodyPr/>
-          <a:lstStyle/>
-          <a:p>
-            <a:r>
-              <a:rPr lang="en-ID" dirty="0"/>
-              <a:t>Conclusion</a:t>
-            </a:r>
-          </a:p>
-        </p:txBody>
-      </p:sp>
-      <p:sp>
-        <p:nvSpPr>
-          <p:cNvPr id="3" name="Content Placeholder 2">
-            <a:extLst>
-              <a:ext uri="{FF2B5EF4-FFF2-40B4-BE49-F238E27FC236}">
-                <a16:creationId xmlns:a16="http://schemas.microsoft.com/office/drawing/2014/main" id="{50F796C0-F162-E625-6147-6C12848A8780}"/>
-              </a:ext>
-            </a:extLst>
-          </p:cNvPr>
-          <p:cNvSpPr>
-            <a:spLocks noGrp="1"/>
-          </p:cNvSpPr>
-          <p:nvPr>
-            <p:ph idx="1"/>
           </p:nvPr>
         </p:nvSpPr>
         <p:spPr>
           <a:xfrm>
-            <a:off x="838200" y="1825624"/>
-            <a:ext cx="10515600" cy="4964281"/>
+            <a:off x="1023025" y="1301749"/>
+            <a:ext cx="10515600" cy="1325563"/>
           </a:xfrm>
         </p:spPr>
         <p:txBody>
-          <a:bodyPr>
-            <a:normAutofit/>
+          <a:bodyPr/>
+          <a:lstStyle/>
+          <a:p>
+            <a:r>
+              <a:rPr lang="en-ID" dirty="0"/>
+              <a:t>Result (-1 vs +1)</a:t>
+            </a:r>
+          </a:p>
+        </p:txBody>
+      </p:sp>
+      <p:sp>
+        <p:nvSpPr>
+          <p:cNvPr id="3" name="Content Placeholder 2">
+            <a:extLst>
+              <a:ext uri="{FF2B5EF4-FFF2-40B4-BE49-F238E27FC236}">
+                <a16:creationId xmlns:a16="http://schemas.microsoft.com/office/drawing/2014/main" id="{441C49D0-3606-85E9-72AF-849DA0814AD3}"/>
+              </a:ext>
+            </a:extLst>
+          </p:cNvPr>
+          <p:cNvSpPr>
+            <a:spLocks noGrp="1"/>
+          </p:cNvSpPr>
+          <p:nvPr>
+            <p:ph idx="1"/>
+          </p:nvPr>
+        </p:nvSpPr>
+        <p:spPr/>
+        <p:txBody>
+          <a:bodyPr/>
+          <a:lstStyle/>
+          <a:p>
+            <a:pPr marL="0" indent="0">
+              <a:buNone/>
+            </a:pPr>
+            <a:endParaRPr lang="en-ID" dirty="0"/>
+          </a:p>
+          <a:p>
+            <a:endParaRPr lang="en-ID" dirty="0"/>
+          </a:p>
+        </p:txBody>
+      </p:sp>
+      <p:sp>
+        <p:nvSpPr>
+          <p:cNvPr id="6" name="TextBox 5">
+            <a:extLst>
+              <a:ext uri="{FF2B5EF4-FFF2-40B4-BE49-F238E27FC236}">
+                <a16:creationId xmlns:a16="http://schemas.microsoft.com/office/drawing/2014/main" id="{4BC78215-EC87-78F4-E9BC-D5FDAEE7ACED}"/>
+              </a:ext>
+            </a:extLst>
+          </p:cNvPr>
+          <p:cNvSpPr txBox="1"/>
+          <p:nvPr/>
+        </p:nvSpPr>
+        <p:spPr>
+          <a:xfrm>
+            <a:off x="369484" y="3429000"/>
+            <a:ext cx="9864013" cy="2308324"/>
+          </a:xfrm>
+          <a:prstGeom prst="rect">
+            <a:avLst/>
+          </a:prstGeom>
+          <a:noFill/>
+        </p:spPr>
+        <p:txBody>
+          <a:bodyPr wrap="square" rtlCol="0">
+            <a:spAutoFit/>
           </a:bodyPr>
           <a:lstStyle/>
           <a:p>
-            <a:r>
-              <a:rPr lang="en-US" dirty="0"/>
-              <a:t>T</a:t>
-            </a:r>
-            <a:r>
-              <a:rPr lang="en-ID" dirty="0"/>
-              <a:t>he negative correlation observed in MSS </a:t>
-            </a:r>
-            <a:r>
-              <a:rPr lang="en-ID" dirty="0" err="1"/>
-              <a:t>tumors</a:t>
-            </a:r>
-            <a:r>
-              <a:rPr lang="en-ID" dirty="0"/>
-              <a:t> are a strong indication that insertion mutations (in the reference allele) and/or deletion mutations (in the +1 allele) have taken place.</a:t>
-            </a:r>
+            <a:pPr marL="342900" indent="-342900">
+              <a:buFont typeface="Arial" panose="020B0604020202020204" pitchFamily="34" charset="0"/>
+              <a:buChar char="•"/>
+            </a:pPr>
+            <a:r>
+              <a:rPr lang="en-ID" sz="2400" dirty="0"/>
+              <a:t>Different </a:t>
+            </a:r>
+            <a:r>
+              <a:rPr lang="en-ID" sz="2400" dirty="0" err="1"/>
+              <a:t>behavior</a:t>
+            </a:r>
+            <a:r>
+              <a:rPr lang="en-ID" sz="2400" dirty="0"/>
+              <a:t> in </a:t>
+            </a:r>
+            <a:r>
+              <a:rPr lang="en-ID" sz="2400" dirty="0" err="1"/>
+              <a:t>MMRp</a:t>
+            </a:r>
+            <a:r>
+              <a:rPr lang="en-ID" sz="2400" dirty="0"/>
+              <a:t> and </a:t>
+            </a:r>
+            <a:r>
+              <a:rPr lang="en-ID" sz="2400" dirty="0" err="1"/>
+              <a:t>MMRd</a:t>
+            </a:r>
+            <a:endParaRPr lang="en-ID" sz="2400" dirty="0"/>
+          </a:p>
+          <a:p>
+            <a:pPr marL="342900" indent="-342900">
+              <a:buFont typeface="Arial" panose="020B0604020202020204" pitchFamily="34" charset="0"/>
+              <a:buChar char="•"/>
+            </a:pPr>
+            <a:endParaRPr lang="en-ID" sz="2400" dirty="0"/>
+          </a:p>
+          <a:p>
+            <a:pPr marL="342900" indent="-342900">
+              <a:buFont typeface="Arial" panose="020B0604020202020204" pitchFamily="34" charset="0"/>
+              <a:buChar char="•"/>
+            </a:pPr>
+            <a:r>
+              <a:rPr lang="en-ID" sz="2400" dirty="0"/>
+              <a:t>No significant correlation in </a:t>
+            </a:r>
+            <a:r>
+              <a:rPr lang="en-ID" sz="2400" dirty="0" err="1"/>
+              <a:t>MMRp</a:t>
+            </a:r>
+            <a:endParaRPr lang="en-ID" sz="2400" dirty="0"/>
           </a:p>
           <a:p>
             <a:pPr lvl="1"/>
-            <a:r>
-              <a:rPr lang="en-ID" dirty="0"/>
-              <a:t>These two events contribute to the negative correlation between the frequencies of the reference and +1 allele</a:t>
-            </a:r>
-          </a:p>
-          <a:p>
-            <a:pPr lvl="1"/>
-            <a:r>
-              <a:rPr lang="en-ID" dirty="0"/>
-              <a:t>But it is still unclear whether these mutations are the result of inherent microsatellite instability or PCR artefacts</a:t>
-            </a:r>
-          </a:p>
-          <a:p>
-            <a:pPr lvl="1"/>
-            <a:endParaRPr lang="en-ID" dirty="0"/>
-          </a:p>
-          <a:p>
-            <a:r>
-              <a:rPr lang="en-ID" dirty="0"/>
-              <a:t>The positive correlation observed in MSI </a:t>
-            </a:r>
-            <a:r>
-              <a:rPr lang="en-ID" dirty="0" err="1"/>
-              <a:t>tumors</a:t>
-            </a:r>
-            <a:r>
-              <a:rPr lang="en-ID" dirty="0"/>
-              <a:t> are a strong indication that there is a considerable “double deletion” effect which would mask the relationship between the reference and +1 allele</a:t>
-            </a:r>
-          </a:p>
-        </p:txBody>
-      </p:sp>
+            <a:endParaRPr lang="en-ID" sz="2400" dirty="0"/>
+          </a:p>
+          <a:p>
+            <a:pPr marL="342900" indent="-342900">
+              <a:buFont typeface="Arial" panose="020B0604020202020204" pitchFamily="34" charset="0"/>
+              <a:buChar char="•"/>
+            </a:pPr>
+            <a:r>
+              <a:rPr lang="en-ID" sz="2400" dirty="0"/>
+              <a:t>Negative correlation in </a:t>
+            </a:r>
+            <a:r>
+              <a:rPr lang="en-ID" sz="2400" dirty="0" err="1"/>
+              <a:t>MMRd</a:t>
+            </a:r>
+            <a:endParaRPr lang="en-ID" sz="2400" dirty="0"/>
+          </a:p>
+          <a:p>
+            <a:pPr marL="800100" lvl="1" indent="-342900">
+              <a:buFont typeface="Arial" panose="020B0604020202020204" pitchFamily="34" charset="0"/>
+              <a:buChar char="•"/>
+            </a:pPr>
+            <a:r>
+              <a:rPr lang="en-ID" sz="2400" dirty="0"/>
+              <a:t>More evidence for double deletion at +1 allele</a:t>
+            </a:r>
+          </a:p>
+        </p:txBody>
+      </p:sp>
+      <p:pic>
+        <p:nvPicPr>
+          <p:cNvPr id="7" name="Picture 6" descr="A chart of different colored squares&#10;&#10;Description automatically generated">
+            <a:extLst>
+              <a:ext uri="{FF2B5EF4-FFF2-40B4-BE49-F238E27FC236}">
+                <a16:creationId xmlns:a16="http://schemas.microsoft.com/office/drawing/2014/main" id="{10D205C9-F119-B448-3FED-BB1A7D044D77}"/>
+              </a:ext>
+            </a:extLst>
+          </p:cNvPr>
+          <p:cNvPicPr>
+            <a:picLocks noChangeAspect="1"/>
+          </p:cNvPicPr>
+          <p:nvPr/>
+        </p:nvPicPr>
+        <p:blipFill>
+          <a:blip r:embed="rId2">
+            <a:extLst>
+              <a:ext uri="{28A0092B-C50C-407E-A947-70E740481C1C}">
+                <a14:useLocalDpi xmlns:a14="http://schemas.microsoft.com/office/drawing/2010/main" val="0"/>
+              </a:ext>
+            </a:extLst>
+          </a:blip>
+          <a:stretch>
+            <a:fillRect/>
+          </a:stretch>
+        </p:blipFill>
+        <p:spPr>
+          <a:xfrm>
+            <a:off x="6280825" y="794796"/>
+            <a:ext cx="5852172" cy="4389129"/>
+          </a:xfrm>
+          <a:prstGeom prst="rect">
+            <a:avLst/>
+          </a:prstGeom>
+        </p:spPr>
+      </p:pic>
     </p:spTree>
     <p:extLst>
       <p:ext uri="{BB962C8B-B14F-4D97-AF65-F5344CB8AC3E}">
-        <p14:creationId xmlns:p14="http://schemas.microsoft.com/office/powerpoint/2010/main" val="2317318672"/>
+        <p14:creationId xmlns:p14="http://schemas.microsoft.com/office/powerpoint/2010/main" val="4112913871"/>
       </p:ext>
     </p:extLst>
   </p:cSld>
@@ -4159,7 +4828,7 @@
           <p:cNvPr id="2" name="Title 1">
             <a:extLst>
               <a:ext uri="{FF2B5EF4-FFF2-40B4-BE49-F238E27FC236}">
-                <a16:creationId xmlns:a16="http://schemas.microsoft.com/office/drawing/2014/main" id="{EDB75595-FAED-16DF-3EB4-DC488BB78C88}"/>
+                <a16:creationId xmlns:a16="http://schemas.microsoft.com/office/drawing/2014/main" id="{5709C9F6-CD43-E4F8-16BB-6188EADA7D0E}"/>
               </a:ext>
             </a:extLst>
           </p:cNvPr>
@@ -4168,121 +4837,324 @@
           </p:cNvSpPr>
           <p:nvPr>
             <p:ph type="title"/>
-          </p:nvPr>
-        </p:nvSpPr>
-        <p:spPr/>
-        <p:txBody>
-          <a:bodyPr/>
-          <a:lstStyle/>
-          <a:p>
-            <a:r>
-              <a:rPr lang="en-ID" dirty="0"/>
-              <a:t>Approach :</a:t>
-            </a:r>
-          </a:p>
-        </p:txBody>
-      </p:sp>
-      <p:sp>
-        <p:nvSpPr>
-          <p:cNvPr id="3" name="Content Placeholder 2">
-            <a:extLst>
-              <a:ext uri="{FF2B5EF4-FFF2-40B4-BE49-F238E27FC236}">
-                <a16:creationId xmlns:a16="http://schemas.microsoft.com/office/drawing/2014/main" id="{60C09111-0F4C-FB8E-8C81-9CA048E3FE52}"/>
-              </a:ext>
-            </a:extLst>
-          </p:cNvPr>
-          <p:cNvSpPr>
-            <a:spLocks noGrp="1"/>
-          </p:cNvSpPr>
-          <p:nvPr>
-            <p:ph idx="1"/>
           </p:nvPr>
         </p:nvSpPr>
         <p:spPr>
           <a:xfrm>
-            <a:off x="739302" y="1468876"/>
-            <a:ext cx="10614498" cy="5204298"/>
+            <a:off x="945204" y="1301749"/>
+            <a:ext cx="10515600" cy="1325563"/>
           </a:xfrm>
         </p:spPr>
         <p:txBody>
-          <a:bodyPr>
-            <a:normAutofit/>
+          <a:bodyPr/>
+          <a:lstStyle/>
+          <a:p>
+            <a:r>
+              <a:rPr lang="en-ID" dirty="0"/>
+              <a:t>Result (-1 vs +1)</a:t>
+            </a:r>
+          </a:p>
+        </p:txBody>
+      </p:sp>
+      <p:sp>
+        <p:nvSpPr>
+          <p:cNvPr id="3" name="Content Placeholder 2">
+            <a:extLst>
+              <a:ext uri="{FF2B5EF4-FFF2-40B4-BE49-F238E27FC236}">
+                <a16:creationId xmlns:a16="http://schemas.microsoft.com/office/drawing/2014/main" id="{441C49D0-3606-85E9-72AF-849DA0814AD3}"/>
+              </a:ext>
+            </a:extLst>
+          </p:cNvPr>
+          <p:cNvSpPr>
+            <a:spLocks noGrp="1"/>
+          </p:cNvSpPr>
+          <p:nvPr>
+            <p:ph idx="1"/>
+          </p:nvPr>
+        </p:nvSpPr>
+        <p:spPr/>
+        <p:txBody>
+          <a:bodyPr/>
+          <a:lstStyle/>
+          <a:p>
+            <a:pPr marL="0" indent="0">
+              <a:buNone/>
+            </a:pPr>
+            <a:endParaRPr lang="en-ID" dirty="0"/>
+          </a:p>
+          <a:p>
+            <a:endParaRPr lang="en-ID" dirty="0"/>
+          </a:p>
+        </p:txBody>
+      </p:sp>
+      <p:sp>
+        <p:nvSpPr>
+          <p:cNvPr id="6" name="TextBox 5">
+            <a:extLst>
+              <a:ext uri="{FF2B5EF4-FFF2-40B4-BE49-F238E27FC236}">
+                <a16:creationId xmlns:a16="http://schemas.microsoft.com/office/drawing/2014/main" id="{4BC78215-EC87-78F4-E9BC-D5FDAEE7ACED}"/>
+              </a:ext>
+            </a:extLst>
+          </p:cNvPr>
+          <p:cNvSpPr txBox="1"/>
+          <p:nvPr/>
+        </p:nvSpPr>
+        <p:spPr>
+          <a:xfrm>
+            <a:off x="350029" y="3424136"/>
+            <a:ext cx="9864013" cy="1200329"/>
+          </a:xfrm>
+          <a:prstGeom prst="rect">
+            <a:avLst/>
+          </a:prstGeom>
+          <a:noFill/>
+        </p:spPr>
+        <p:txBody>
+          <a:bodyPr wrap="square" rtlCol="0">
+            <a:spAutoFit/>
           </a:bodyPr>
           <a:lstStyle/>
           <a:p>
-            <a:r>
-              <a:rPr lang="en-ID" dirty="0"/>
-              <a:t>If these +1 alleles are the result of PCR artefacts, then we would expect to see a negative correlation between the reference and +1 allele frequencies.</a:t>
-            </a:r>
-          </a:p>
-          <a:p>
-            <a:pPr lvl="1"/>
-            <a:r>
-              <a:rPr lang="en-ID" dirty="0"/>
-              <a:t>This is because the +1 allele species is generated from the depletion of the reference allele species as PCR mutations are introduced</a:t>
-            </a:r>
-          </a:p>
-          <a:p>
-            <a:pPr lvl="1"/>
-            <a:r>
-              <a:rPr lang="en-ID" dirty="0"/>
-              <a:t>Since there is a greater abundance of the reference allele species in MSS </a:t>
-            </a:r>
-            <a:r>
-              <a:rPr lang="en-ID" dirty="0" err="1"/>
-              <a:t>tumors</a:t>
-            </a:r>
-            <a:r>
-              <a:rPr lang="en-ID" dirty="0"/>
-              <a:t> (compared to MSI </a:t>
-            </a:r>
-            <a:r>
-              <a:rPr lang="en-ID" dirty="0" err="1"/>
-              <a:t>tumors</a:t>
-            </a:r>
-            <a:r>
-              <a:rPr lang="en-ID" dirty="0"/>
-              <a:t>), we would also expect to see a greater abundance of the +1 allele species in MSS </a:t>
-            </a:r>
-            <a:r>
-              <a:rPr lang="en-ID" dirty="0" err="1"/>
-              <a:t>tumors</a:t>
-            </a:r>
-            <a:r>
-              <a:rPr lang="en-ID" dirty="0"/>
-              <a:t> as well; which indeed was observed</a:t>
-            </a:r>
-          </a:p>
-          <a:p>
-            <a:pPr lvl="1"/>
-            <a:endParaRPr lang="en-ID" dirty="0"/>
-          </a:p>
-          <a:p>
-            <a:r>
-              <a:rPr lang="en-ID" dirty="0"/>
-              <a:t>Spearman’s test was used to determine the correlation between the reference and +1 allele frequencies for each microsatellite marker in both MSS and MSI </a:t>
-            </a:r>
-            <a:r>
-              <a:rPr lang="en-ID" dirty="0" err="1"/>
-              <a:t>tumors</a:t>
-            </a:r>
-            <a:endParaRPr lang="en-ID" dirty="0"/>
-          </a:p>
-          <a:p>
-            <a:endParaRPr lang="en-ID" dirty="0"/>
-          </a:p>
-          <a:p>
-            <a:endParaRPr lang="en-ID" dirty="0"/>
-          </a:p>
-          <a:p>
-            <a:endParaRPr lang="en-ID" dirty="0"/>
-          </a:p>
-        </p:txBody>
-      </p:sp>
+            <a:pPr marL="342900" indent="-342900">
+              <a:buFont typeface="Arial" panose="020B0604020202020204" pitchFamily="34" charset="0"/>
+              <a:buChar char="•"/>
+            </a:pPr>
+            <a:r>
+              <a:rPr lang="en-ID" sz="2400" dirty="0"/>
+              <a:t>Slight negative correlation also observed</a:t>
+            </a:r>
+          </a:p>
+          <a:p>
+            <a:pPr marL="800100" lvl="1" indent="-342900">
+              <a:buFont typeface="Arial" panose="020B0604020202020204" pitchFamily="34" charset="0"/>
+              <a:buChar char="•"/>
+            </a:pPr>
+            <a:r>
+              <a:rPr lang="en-ID" sz="2400" dirty="0"/>
+              <a:t>Not significant</a:t>
+            </a:r>
+          </a:p>
+          <a:p>
+            <a:pPr marL="800100" lvl="1" indent="-342900">
+              <a:buFont typeface="Arial" panose="020B0604020202020204" pitchFamily="34" charset="0"/>
+              <a:buChar char="•"/>
+            </a:pPr>
+            <a:r>
+              <a:rPr lang="en-ID" sz="2400" dirty="0"/>
+              <a:t>Spearman correlation : -0.01</a:t>
+            </a:r>
+          </a:p>
+        </p:txBody>
+      </p:sp>
+      <p:pic>
+        <p:nvPicPr>
+          <p:cNvPr id="5" name="Picture 4" descr="A graph with black dots and a blue line&#10;&#10;Description automatically generated">
+            <a:extLst>
+              <a:ext uri="{FF2B5EF4-FFF2-40B4-BE49-F238E27FC236}">
+                <a16:creationId xmlns:a16="http://schemas.microsoft.com/office/drawing/2014/main" id="{79254698-9FA2-4685-424A-F3C9C9951A58}"/>
+              </a:ext>
+            </a:extLst>
+          </p:cNvPr>
+          <p:cNvPicPr>
+            <a:picLocks noChangeAspect="1"/>
+          </p:cNvPicPr>
+          <p:nvPr/>
+        </p:nvPicPr>
+        <p:blipFill>
+          <a:blip r:embed="rId2">
+            <a:extLst>
+              <a:ext uri="{28A0092B-C50C-407E-A947-70E740481C1C}">
+                <a14:useLocalDpi xmlns:a14="http://schemas.microsoft.com/office/drawing/2010/main" val="0"/>
+              </a:ext>
+            </a:extLst>
+          </a:blip>
+          <a:stretch>
+            <a:fillRect/>
+          </a:stretch>
+        </p:blipFill>
+        <p:spPr>
+          <a:xfrm>
+            <a:off x="6203004" y="553498"/>
+            <a:ext cx="5852172" cy="4389129"/>
+          </a:xfrm>
+          <a:prstGeom prst="rect">
+            <a:avLst/>
+          </a:prstGeom>
+        </p:spPr>
+      </p:pic>
     </p:spTree>
     <p:extLst>
       <p:ext uri="{BB962C8B-B14F-4D97-AF65-F5344CB8AC3E}">
-        <p14:creationId xmlns:p14="http://schemas.microsoft.com/office/powerpoint/2010/main" val="3417444578"/>
+        <p14:creationId xmlns:p14="http://schemas.microsoft.com/office/powerpoint/2010/main" val="3295337728"/>
+      </p:ext>
+    </p:extLst>
+  </p:cSld>
+  <p:clrMapOvr>
+    <a:masterClrMapping/>
+  </p:clrMapOvr>
+</p:sld>
+</file>
+
+<file path=ppt/slides/slide7.xml><?xml version="1.0" encoding="utf-8"?>
+<p:sld xmlns:a="http://schemas.openxmlformats.org/drawingml/2006/main" xmlns:r="http://schemas.openxmlformats.org/officeDocument/2006/relationships" xmlns:p="http://schemas.openxmlformats.org/presentationml/2006/main">
+  <p:cSld>
+    <p:spTree>
+      <p:nvGrpSpPr>
+        <p:cNvPr id="1" name=""/>
+        <p:cNvGrpSpPr/>
+        <p:nvPr/>
+      </p:nvGrpSpPr>
+      <p:grpSpPr>
+        <a:xfrm>
+          <a:off x="0" y="0"/>
+          <a:ext cx="0" cy="0"/>
+          <a:chOff x="0" y="0"/>
+          <a:chExt cx="0" cy="0"/>
+        </a:xfrm>
+      </p:grpSpPr>
+      <p:sp>
+        <p:nvSpPr>
+          <p:cNvPr id="2" name="Title 1">
+            <a:extLst>
+              <a:ext uri="{FF2B5EF4-FFF2-40B4-BE49-F238E27FC236}">
+                <a16:creationId xmlns:a16="http://schemas.microsoft.com/office/drawing/2014/main" id="{53844053-28A2-4C86-8EE6-C50E4EB8B309}"/>
+              </a:ext>
+            </a:extLst>
+          </p:cNvPr>
+          <p:cNvSpPr>
+            <a:spLocks noGrp="1"/>
+          </p:cNvSpPr>
+          <p:nvPr>
+            <p:ph type="title"/>
+          </p:nvPr>
+        </p:nvSpPr>
+        <p:spPr/>
+        <p:txBody>
+          <a:bodyPr/>
+          <a:lstStyle/>
+          <a:p>
+            <a:r>
+              <a:rPr lang="en-ID" dirty="0"/>
+              <a:t>Conclusion</a:t>
+            </a:r>
+          </a:p>
+        </p:txBody>
+      </p:sp>
+      <p:sp>
+        <p:nvSpPr>
+          <p:cNvPr id="3" name="Content Placeholder 2">
+            <a:extLst>
+              <a:ext uri="{FF2B5EF4-FFF2-40B4-BE49-F238E27FC236}">
+                <a16:creationId xmlns:a16="http://schemas.microsoft.com/office/drawing/2014/main" id="{ED794B28-7BEE-48E2-4202-C812195DA93C}"/>
+              </a:ext>
+            </a:extLst>
+          </p:cNvPr>
+          <p:cNvSpPr>
+            <a:spLocks noGrp="1"/>
+          </p:cNvSpPr>
+          <p:nvPr>
+            <p:ph idx="1"/>
+          </p:nvPr>
+        </p:nvSpPr>
+        <p:spPr/>
+        <p:txBody>
+          <a:bodyPr/>
+          <a:lstStyle/>
+          <a:p>
+            <a:r>
+              <a:rPr lang="en-ID" sz="2400" dirty="0"/>
+              <a:t>+1 allele negative or no correlation with other mutant alleles</a:t>
+            </a:r>
+          </a:p>
+          <a:p>
+            <a:pPr lvl="1"/>
+            <a:r>
+              <a:rPr lang="en-ID" sz="2000" dirty="0"/>
+              <a:t>negative correlation with -1 allele in </a:t>
+            </a:r>
+            <a:r>
+              <a:rPr lang="en-ID" sz="2000" dirty="0" err="1"/>
+              <a:t>MMRd</a:t>
+            </a:r>
+            <a:endParaRPr lang="en-ID" sz="2000" dirty="0"/>
+          </a:p>
+          <a:p>
+            <a:pPr lvl="1"/>
+            <a:r>
+              <a:rPr lang="en-ID" sz="2000" dirty="0"/>
+              <a:t>no correlation with -1 allele in </a:t>
+            </a:r>
+            <a:r>
+              <a:rPr lang="en-ID" sz="2000" dirty="0" err="1"/>
+              <a:t>MMRp</a:t>
+            </a:r>
+            <a:endParaRPr lang="en-ID" sz="2000" dirty="0"/>
+          </a:p>
+          <a:p>
+            <a:pPr lvl="1"/>
+            <a:r>
+              <a:rPr lang="en-ID" sz="2000" dirty="0"/>
+              <a:t>Evidence for +1 allele not being a genuine mutant ?</a:t>
+            </a:r>
+          </a:p>
+          <a:p>
+            <a:pPr lvl="1"/>
+            <a:endParaRPr lang="en-ID" sz="2000" dirty="0"/>
+          </a:p>
+          <a:p>
+            <a:r>
+              <a:rPr lang="en-ID" sz="2400" dirty="0"/>
+              <a:t>+1 allele’s correlation with reference allele</a:t>
+            </a:r>
+          </a:p>
+          <a:p>
+            <a:pPr lvl="1"/>
+            <a:r>
+              <a:rPr lang="en-ID" sz="2000" dirty="0"/>
+              <a:t>Negative correlation (i.e. “normal” mutant behaviour) in </a:t>
+            </a:r>
+            <a:r>
+              <a:rPr lang="en-ID" sz="2000" dirty="0" err="1"/>
+              <a:t>MMRp</a:t>
+            </a:r>
+            <a:r>
+              <a:rPr lang="en-ID" sz="2000" dirty="0"/>
+              <a:t> </a:t>
+            </a:r>
+          </a:p>
+          <a:p>
+            <a:pPr lvl="1"/>
+            <a:r>
+              <a:rPr lang="en-ID" sz="2000" dirty="0"/>
+              <a:t>Opposite behaviour in </a:t>
+            </a:r>
+            <a:r>
+              <a:rPr lang="en-ID" sz="2000" dirty="0" err="1"/>
+              <a:t>MMRd</a:t>
+            </a:r>
+            <a:r>
+              <a:rPr lang="en-ID" sz="2000" dirty="0"/>
+              <a:t> ? Still unclear why </a:t>
+            </a:r>
+          </a:p>
+          <a:p>
+            <a:pPr lvl="1"/>
+            <a:endParaRPr lang="en-ID" dirty="0"/>
+          </a:p>
+          <a:p>
+            <a:pPr lvl="1"/>
+            <a:endParaRPr lang="en-ID" dirty="0"/>
+          </a:p>
+          <a:p>
+            <a:pPr lvl="1"/>
+            <a:endParaRPr lang="en-ID" dirty="0"/>
+          </a:p>
+        </p:txBody>
+      </p:sp>
+    </p:spTree>
+    <p:extLst>
+      <p:ext uri="{BB962C8B-B14F-4D97-AF65-F5344CB8AC3E}">
+        <p14:creationId xmlns:p14="http://schemas.microsoft.com/office/powerpoint/2010/main" val="944629050"/>
       </p:ext>
     </p:extLst>
   </p:cSld>
@@ -4605,4 +5477,319 @@
     </a:ext>
   </a:extLst>
 </a:theme>
+</file>
+
+<file path=ppt/theme/theme2.xml><?xml version="1.0" encoding="utf-8"?>
+<a:theme xmlns:a="http://schemas.openxmlformats.org/drawingml/2006/main" name="Office Theme">
+  <a:themeElements>
+    <a:clrScheme name="Office">
+      <a:dk1>
+        <a:sysClr val="windowText" lastClr="000000"/>
+      </a:dk1>
+      <a:lt1>
+        <a:sysClr val="window" lastClr="FFFFFF"/>
+      </a:lt1>
+      <a:dk2>
+        <a:srgbClr val="0E2841"/>
+      </a:dk2>
+      <a:lt2>
+        <a:srgbClr val="E8E8E8"/>
+      </a:lt2>
+      <a:accent1>
+        <a:srgbClr val="156082"/>
+      </a:accent1>
+      <a:accent2>
+        <a:srgbClr val="E97132"/>
+      </a:accent2>
+      <a:accent3>
+        <a:srgbClr val="196B24"/>
+      </a:accent3>
+      <a:accent4>
+        <a:srgbClr val="0F9ED5"/>
+      </a:accent4>
+      <a:accent5>
+        <a:srgbClr val="A02B93"/>
+      </a:accent5>
+      <a:accent6>
+        <a:srgbClr val="4EA72E"/>
+      </a:accent6>
+      <a:hlink>
+        <a:srgbClr val="467886"/>
+      </a:hlink>
+      <a:folHlink>
+        <a:srgbClr val="96607D"/>
+      </a:folHlink>
+    </a:clrScheme>
+    <a:fontScheme name="Office">
+      <a:majorFont>
+        <a:latin typeface="Aptos Display" panose="02110004020202020204"/>
+        <a:ea typeface=""/>
+        <a:cs typeface=""/>
+        <a:font script="Jpan" typeface="游ゴシック Light"/>
+        <a:font script="Hang" typeface="맑은 고딕"/>
+        <a:font script="Hans" typeface="等线 Light"/>
+        <a:font script="Hant" typeface="新細明體"/>
+        <a:font script="Arab" typeface="Times New Roman"/>
+        <a:font script="Hebr" typeface="Times New Roman"/>
+        <a:font script="Thai" typeface="Angsana New"/>
+        <a:font script="Ethi" typeface="Nyala"/>
+        <a:font script="Beng" typeface="Vrinda"/>
+        <a:font script="Gujr" typeface="Shruti"/>
+        <a:font script="Khmr" typeface="MoolBoran"/>
+        <a:font script="Knda" typeface="Tunga"/>
+        <a:font script="Guru" typeface="Raavi"/>
+        <a:font script="Cans" typeface="Euphemia"/>
+        <a:font script="Cher" typeface="Plantagenet Cherokee"/>
+        <a:font script="Yiii" typeface="Microsoft Yi Baiti"/>
+        <a:font script="Tibt" typeface="Microsoft Himalaya"/>
+        <a:font script="Thaa" typeface="MV Boli"/>
+        <a:font script="Deva" typeface="Mangal"/>
+        <a:font script="Telu" typeface="Gautami"/>
+        <a:font script="Taml" typeface="Latha"/>
+        <a:font script="Syrc" typeface="Estrangelo Edessa"/>
+        <a:font script="Orya" typeface="Kalinga"/>
+        <a:font script="Mlym" typeface="Kartika"/>
+        <a:font script="Laoo" typeface="DokChampa"/>
+        <a:font script="Sinh" typeface="Iskoola Pota"/>
+        <a:font script="Mong" typeface="Mongolian Baiti"/>
+        <a:font script="Viet" typeface="Times New Roman"/>
+        <a:font script="Uigh" typeface="Microsoft Uighur"/>
+        <a:font script="Geor" typeface="Sylfaen"/>
+        <a:font script="Armn" typeface="Arial"/>
+        <a:font script="Bugi" typeface="Leelawadee UI"/>
+        <a:font script="Bopo" typeface="Microsoft JhengHei"/>
+        <a:font script="Java" typeface="Javanese Text"/>
+        <a:font script="Lisu" typeface="Segoe UI"/>
+        <a:font script="Mymr" typeface="Myanmar Text"/>
+        <a:font script="Nkoo" typeface="Ebrima"/>
+        <a:font script="Olck" typeface="Nirmala UI"/>
+        <a:font script="Osma" typeface="Ebrima"/>
+        <a:font script="Phag" typeface="Phagspa"/>
+        <a:font script="Syrn" typeface="Estrangelo Edessa"/>
+        <a:font script="Syrj" typeface="Estrangelo Edessa"/>
+        <a:font script="Syre" typeface="Estrangelo Edessa"/>
+        <a:font script="Sora" typeface="Nirmala UI"/>
+        <a:font script="Tale" typeface="Microsoft Tai Le"/>
+        <a:font script="Talu" typeface="Microsoft New Tai Lue"/>
+        <a:font script="Tfng" typeface="Ebrima"/>
+      </a:majorFont>
+      <a:minorFont>
+        <a:latin typeface="Aptos" panose="02110004020202020204"/>
+        <a:ea typeface=""/>
+        <a:cs typeface=""/>
+        <a:font script="Jpan" typeface="游ゴシック"/>
+        <a:font script="Hang" typeface="맑은 고딕"/>
+        <a:font script="Hans" typeface="等线"/>
+        <a:font script="Hant" typeface="新細明體"/>
+        <a:font script="Arab" typeface="Arial"/>
+        <a:font script="Hebr" typeface="Arial"/>
+        <a:font script="Thai" typeface="Cordia New"/>
+        <a:font script="Ethi" typeface="Nyala"/>
+        <a:font script="Beng" typeface="Vrinda"/>
+        <a:font script="Gujr" typeface="Shruti"/>
+        <a:font script="Khmr" typeface="DaunPenh"/>
+        <a:font script="Knda" typeface="Tunga"/>
+        <a:font script="Guru" typeface="Raavi"/>
+        <a:font script="Cans" typeface="Euphemia"/>
+        <a:font script="Cher" typeface="Plantagenet Cherokee"/>
+        <a:font script="Yiii" typeface="Microsoft Yi Baiti"/>
+        <a:font script="Tibt" typeface="Microsoft Himalaya"/>
+        <a:font script="Thaa" typeface="MV Boli"/>
+        <a:font script="Deva" typeface="Mangal"/>
+        <a:font script="Telu" typeface="Gautami"/>
+        <a:font script="Taml" typeface="Latha"/>
+        <a:font script="Syrc" typeface="Estrangelo Edessa"/>
+        <a:font script="Orya" typeface="Kalinga"/>
+        <a:font script="Mlym" typeface="Kartika"/>
+        <a:font script="Laoo" typeface="DokChampa"/>
+        <a:font script="Sinh" typeface="Iskoola Pota"/>
+        <a:font script="Mong" typeface="Mongolian Baiti"/>
+        <a:font script="Viet" typeface="Arial"/>
+        <a:font script="Uigh" typeface="Microsoft Uighur"/>
+        <a:font script="Geor" typeface="Sylfaen"/>
+        <a:font script="Armn" typeface="Arial"/>
+        <a:font script="Bugi" typeface="Leelawadee UI"/>
+        <a:font script="Bopo" typeface="Microsoft JhengHei"/>
+        <a:font script="Java" typeface="Javanese Text"/>
+        <a:font script="Lisu" typeface="Segoe UI"/>
+        <a:font script="Mymr" typeface="Myanmar Text"/>
+        <a:font script="Nkoo" typeface="Ebrima"/>
+        <a:font script="Olck" typeface="Nirmala UI"/>
+        <a:font script="Osma" typeface="Ebrima"/>
+        <a:font script="Phag" typeface="Phagspa"/>
+        <a:font script="Syrn" typeface="Estrangelo Edessa"/>
+        <a:font script="Syrj" typeface="Estrangelo Edessa"/>
+        <a:font script="Syre" typeface="Estrangelo Edessa"/>
+        <a:font script="Sora" typeface="Nirmala UI"/>
+        <a:font script="Tale" typeface="Microsoft Tai Le"/>
+        <a:font script="Talu" typeface="Microsoft New Tai Lue"/>
+        <a:font script="Tfng" typeface="Ebrima"/>
+      </a:minorFont>
+    </a:fontScheme>
+    <a:fmtScheme name="Office">
+      <a:fillStyleLst>
+        <a:solidFill>
+          <a:schemeClr val="phClr"/>
+        </a:solidFill>
+        <a:gradFill rotWithShape="1">
+          <a:gsLst>
+            <a:gs pos="0">
+              <a:schemeClr val="phClr">
+                <a:lumMod val="110000"/>
+                <a:satMod val="105000"/>
+                <a:tint val="67000"/>
+              </a:schemeClr>
+            </a:gs>
+            <a:gs pos="50000">
+              <a:schemeClr val="phClr">
+                <a:lumMod val="105000"/>
+                <a:satMod val="103000"/>
+                <a:tint val="73000"/>
+              </a:schemeClr>
+            </a:gs>
+            <a:gs pos="100000">
+              <a:schemeClr val="phClr">
+                <a:lumMod val="105000"/>
+                <a:satMod val="109000"/>
+                <a:tint val="81000"/>
+              </a:schemeClr>
+            </a:gs>
+          </a:gsLst>
+          <a:lin ang="5400000" scaled="0"/>
+        </a:gradFill>
+        <a:gradFill rotWithShape="1">
+          <a:gsLst>
+            <a:gs pos="0">
+              <a:schemeClr val="phClr">
+                <a:satMod val="103000"/>
+                <a:lumMod val="102000"/>
+                <a:tint val="94000"/>
+              </a:schemeClr>
+            </a:gs>
+            <a:gs pos="50000">
+              <a:schemeClr val="phClr">
+                <a:satMod val="110000"/>
+                <a:lumMod val="100000"/>
+                <a:shade val="100000"/>
+              </a:schemeClr>
+            </a:gs>
+            <a:gs pos="100000">
+              <a:schemeClr val="phClr">
+                <a:lumMod val="99000"/>
+                <a:satMod val="120000"/>
+                <a:shade val="78000"/>
+              </a:schemeClr>
+            </a:gs>
+          </a:gsLst>
+          <a:lin ang="5400000" scaled="0"/>
+        </a:gradFill>
+      </a:fillStyleLst>
+      <a:lnStyleLst>
+        <a:ln w="12700" cap="flat" cmpd="sng" algn="ctr">
+          <a:solidFill>
+            <a:schemeClr val="phClr"/>
+          </a:solidFill>
+          <a:prstDash val="solid"/>
+          <a:miter lim="800000"/>
+        </a:ln>
+        <a:ln w="19050" cap="flat" cmpd="sng" algn="ctr">
+          <a:solidFill>
+            <a:schemeClr val="phClr"/>
+          </a:solidFill>
+          <a:prstDash val="solid"/>
+          <a:miter lim="800000"/>
+        </a:ln>
+        <a:ln w="25400" cap="flat" cmpd="sng" algn="ctr">
+          <a:solidFill>
+            <a:schemeClr val="phClr"/>
+          </a:solidFill>
+          <a:prstDash val="solid"/>
+          <a:miter lim="800000"/>
+        </a:ln>
+      </a:lnStyleLst>
+      <a:effectStyleLst>
+        <a:effectStyle>
+          <a:effectLst/>
+        </a:effectStyle>
+        <a:effectStyle>
+          <a:effectLst/>
+        </a:effectStyle>
+        <a:effectStyle>
+          <a:effectLst>
+            <a:outerShdw blurRad="57150" dist="19050" dir="5400000" algn="ctr" rotWithShape="0">
+              <a:srgbClr val="000000">
+                <a:alpha val="63000"/>
+              </a:srgbClr>
+            </a:outerShdw>
+          </a:effectLst>
+        </a:effectStyle>
+      </a:effectStyleLst>
+      <a:bgFillStyleLst>
+        <a:solidFill>
+          <a:schemeClr val="phClr"/>
+        </a:solidFill>
+        <a:solidFill>
+          <a:schemeClr val="phClr">
+            <a:tint val="95000"/>
+            <a:satMod val="170000"/>
+          </a:schemeClr>
+        </a:solidFill>
+        <a:gradFill rotWithShape="1">
+          <a:gsLst>
+            <a:gs pos="0">
+              <a:schemeClr val="phClr">
+                <a:tint val="93000"/>
+                <a:satMod val="150000"/>
+                <a:shade val="98000"/>
+                <a:lumMod val="102000"/>
+              </a:schemeClr>
+            </a:gs>
+            <a:gs pos="50000">
+              <a:schemeClr val="phClr">
+                <a:tint val="98000"/>
+                <a:satMod val="130000"/>
+                <a:shade val="90000"/>
+                <a:lumMod val="103000"/>
+              </a:schemeClr>
+            </a:gs>
+            <a:gs pos="100000">
+              <a:schemeClr val="phClr">
+                <a:shade val="63000"/>
+                <a:satMod val="120000"/>
+              </a:schemeClr>
+            </a:gs>
+          </a:gsLst>
+          <a:lin ang="5400000" scaled="0"/>
+        </a:gradFill>
+      </a:bgFillStyleLst>
+    </a:fmtScheme>
+  </a:themeElements>
+  <a:objectDefaults>
+    <a:lnDef>
+      <a:spPr/>
+      <a:bodyPr/>
+      <a:lstStyle/>
+      <a:style>
+        <a:lnRef idx="2">
+          <a:schemeClr val="accent1"/>
+        </a:lnRef>
+        <a:fillRef idx="0">
+          <a:schemeClr val="accent1"/>
+        </a:fillRef>
+        <a:effectRef idx="1">
+          <a:schemeClr val="accent1"/>
+        </a:effectRef>
+        <a:fontRef idx="minor">
+          <a:schemeClr val="tx1"/>
+        </a:fontRef>
+      </a:style>
+    </a:lnDef>
+  </a:objectDefaults>
+  <a:extraClrSchemeLst/>
+  <a:extLst>
+    <a:ext uri="{05A4C25C-085E-4340-85A3-A5531E510DB2}">
+      <thm15:themeFamily xmlns:thm15="http://schemas.microsoft.com/office/thememl/2012/main" name="Office Theme" id="{2E142A2C-CD16-42D6-873A-C26D2A0506FA}" vid="{1BDDFF52-6CD6-40A5-AB3C-68EB2F1E4D0A}"/>
+    </a:ext>
+  </a:extLst>
+</a:theme>
 </file>
</xml_diff>

<commit_message>
better code in scripts/correlation, new plots, powerpoint is improved
</commit_message>
<xml_diff>
--- a/Presentation1.pptx
+++ b/Presentation1.pptx
@@ -5,16 +5,20 @@
     <p:sldMasterId id="2147483648" r:id="rId1"/>
   </p:sldMasterIdLst>
   <p:notesMasterIdLst>
-    <p:notesMasterId r:id="rId9"/>
+    <p:notesMasterId r:id="rId13"/>
   </p:notesMasterIdLst>
   <p:sldIdLst>
     <p:sldId id="264" r:id="rId2"/>
     <p:sldId id="259" r:id="rId3"/>
-    <p:sldId id="261" r:id="rId4"/>
-    <p:sldId id="268" r:id="rId5"/>
-    <p:sldId id="265" r:id="rId6"/>
-    <p:sldId id="267" r:id="rId7"/>
-    <p:sldId id="266" r:id="rId8"/>
+    <p:sldId id="269" r:id="rId4"/>
+    <p:sldId id="270" r:id="rId5"/>
+    <p:sldId id="271" r:id="rId6"/>
+    <p:sldId id="272" r:id="rId7"/>
+    <p:sldId id="261" r:id="rId8"/>
+    <p:sldId id="265" r:id="rId9"/>
+    <p:sldId id="268" r:id="rId10"/>
+    <p:sldId id="267" r:id="rId11"/>
+    <p:sldId id="266" r:id="rId12"/>
   </p:sldIdLst>
   <p:sldSz cx="12192000" cy="6858000"/>
   <p:notesSz cx="6858000" cy="9144000"/>
@@ -203,7 +207,7 @@
           <a:p>
             <a:fld id="{77704DBA-E862-417F-AD62-956093F1CA91}" type="datetimeFigureOut">
               <a:rPr lang="en-ID" smtClean="0"/>
-              <a:t>19/10/2024</a:t>
+              <a:t>23/10/2024</a:t>
             </a:fld>
             <a:endParaRPr lang="en-ID"/>
           </a:p>
@@ -471,6 +475,474 @@
 </p:notesMaster>
 </file>
 
+<file path=ppt/notesSlides/notesSlide1.xml><?xml version="1.0" encoding="utf-8"?>
+<p:notes xmlns:a="http://schemas.openxmlformats.org/drawingml/2006/main" xmlns:r="http://schemas.openxmlformats.org/officeDocument/2006/relationships" xmlns:p="http://schemas.openxmlformats.org/presentationml/2006/main">
+  <p:cSld>
+    <p:spTree>
+      <p:nvGrpSpPr>
+        <p:cNvPr id="1" name=""/>
+        <p:cNvGrpSpPr/>
+        <p:nvPr/>
+      </p:nvGrpSpPr>
+      <p:grpSpPr>
+        <a:xfrm>
+          <a:off x="0" y="0"/>
+          <a:ext cx="0" cy="0"/>
+          <a:chOff x="0" y="0"/>
+          <a:chExt cx="0" cy="0"/>
+        </a:xfrm>
+      </p:grpSpPr>
+      <p:sp>
+        <p:nvSpPr>
+          <p:cNvPr id="2" name="Slide Image Placeholder 1"/>
+          <p:cNvSpPr>
+            <a:spLocks noGrp="1" noRot="1" noChangeAspect="1"/>
+          </p:cNvSpPr>
+          <p:nvPr>
+            <p:ph type="sldImg"/>
+          </p:nvPr>
+        </p:nvSpPr>
+        <p:spPr/>
+      </p:sp>
+      <p:sp>
+        <p:nvSpPr>
+          <p:cNvPr id="3" name="Notes Placeholder 2"/>
+          <p:cNvSpPr>
+            <a:spLocks noGrp="1"/>
+          </p:cNvSpPr>
+          <p:nvPr>
+            <p:ph type="body" idx="1"/>
+          </p:nvPr>
+        </p:nvSpPr>
+        <p:spPr/>
+        <p:txBody>
+          <a:bodyPr/>
+          <a:lstStyle/>
+          <a:p>
+            <a:pPr marL="0" marR="0" lvl="0" indent="0" algn="l" defTabSz="914400" rtl="0" eaLnBrk="1" fontAlgn="auto" latinLnBrk="0" hangingPunct="1">
+              <a:lnSpc>
+                <a:spcPct val="100000"/>
+              </a:lnSpc>
+              <a:spcBef>
+                <a:spcPts val="0"/>
+              </a:spcBef>
+              <a:spcAft>
+                <a:spcPts val="0"/>
+              </a:spcAft>
+              <a:buClrTx/>
+              <a:buSzTx/>
+              <a:buFontTx/>
+              <a:buNone/>
+              <a:tabLst/>
+              <a:defRPr/>
+            </a:pPr>
+            <a:r>
+              <a:rPr lang="en-ID" sz="1200" dirty="0"/>
+              <a:t>Stronger negative correlation ~ marker is more prone to insertions (and vice versa)</a:t>
+            </a:r>
+          </a:p>
+          <a:p>
+            <a:pPr marL="0" marR="0" lvl="0" indent="0" algn="l" defTabSz="914400" rtl="0" eaLnBrk="1" fontAlgn="auto" latinLnBrk="0" hangingPunct="1">
+              <a:lnSpc>
+                <a:spcPct val="100000"/>
+              </a:lnSpc>
+              <a:spcBef>
+                <a:spcPts val="0"/>
+              </a:spcBef>
+              <a:spcAft>
+                <a:spcPts val="0"/>
+              </a:spcAft>
+              <a:buClrTx/>
+              <a:buSzTx/>
+              <a:buFontTx/>
+              <a:buNone/>
+              <a:tabLst/>
+              <a:defRPr/>
+            </a:pPr>
+            <a:r>
+              <a:rPr lang="en-ID" sz="1200" dirty="0"/>
+              <a:t>- </a:t>
+            </a:r>
+            <a:r>
+              <a:rPr lang="en-US" dirty="0"/>
+              <a:t>Maybe not true??</a:t>
+            </a:r>
+            <a:endParaRPr lang="en-ID" dirty="0"/>
+          </a:p>
+        </p:txBody>
+      </p:sp>
+      <p:sp>
+        <p:nvSpPr>
+          <p:cNvPr id="4" name="Slide Number Placeholder 3"/>
+          <p:cNvSpPr>
+            <a:spLocks noGrp="1"/>
+          </p:cNvSpPr>
+          <p:nvPr>
+            <p:ph type="sldNum" sz="quarter" idx="5"/>
+          </p:nvPr>
+        </p:nvSpPr>
+        <p:spPr/>
+        <p:txBody>
+          <a:bodyPr/>
+          <a:lstStyle/>
+          <a:p>
+            <a:fld id="{2C9D2EC0-BFC9-4F48-A087-584B9BB7F564}" type="slidenum">
+              <a:rPr lang="en-ID" smtClean="0"/>
+              <a:t>3</a:t>
+            </a:fld>
+            <a:endParaRPr lang="en-ID"/>
+          </a:p>
+        </p:txBody>
+      </p:sp>
+    </p:spTree>
+    <p:extLst>
+      <p:ext uri="{BB962C8B-B14F-4D97-AF65-F5344CB8AC3E}">
+        <p14:creationId xmlns:p14="http://schemas.microsoft.com/office/powerpoint/2010/main" val="1480601819"/>
+      </p:ext>
+    </p:extLst>
+  </p:cSld>
+  <p:clrMapOvr>
+    <a:masterClrMapping/>
+  </p:clrMapOvr>
+</p:notes>
+</file>
+
+<file path=ppt/notesSlides/notesSlide2.xml><?xml version="1.0" encoding="utf-8"?>
+<p:notes xmlns:a="http://schemas.openxmlformats.org/drawingml/2006/main" xmlns:r="http://schemas.openxmlformats.org/officeDocument/2006/relationships" xmlns:p="http://schemas.openxmlformats.org/presentationml/2006/main">
+  <p:cSld>
+    <p:spTree>
+      <p:nvGrpSpPr>
+        <p:cNvPr id="1" name=""/>
+        <p:cNvGrpSpPr/>
+        <p:nvPr/>
+      </p:nvGrpSpPr>
+      <p:grpSpPr>
+        <a:xfrm>
+          <a:off x="0" y="0"/>
+          <a:ext cx="0" cy="0"/>
+          <a:chOff x="0" y="0"/>
+          <a:chExt cx="0" cy="0"/>
+        </a:xfrm>
+      </p:grpSpPr>
+      <p:sp>
+        <p:nvSpPr>
+          <p:cNvPr id="2" name="Slide Image Placeholder 1"/>
+          <p:cNvSpPr>
+            <a:spLocks noGrp="1" noRot="1" noChangeAspect="1"/>
+          </p:cNvSpPr>
+          <p:nvPr>
+            <p:ph type="sldImg"/>
+          </p:nvPr>
+        </p:nvSpPr>
+        <p:spPr/>
+      </p:sp>
+      <p:sp>
+        <p:nvSpPr>
+          <p:cNvPr id="3" name="Notes Placeholder 2"/>
+          <p:cNvSpPr>
+            <a:spLocks noGrp="1"/>
+          </p:cNvSpPr>
+          <p:nvPr>
+            <p:ph type="body" idx="1"/>
+          </p:nvPr>
+        </p:nvSpPr>
+        <p:spPr/>
+        <p:txBody>
+          <a:bodyPr/>
+          <a:lstStyle/>
+          <a:p>
+            <a:endParaRPr lang="en-ID" dirty="0"/>
+          </a:p>
+        </p:txBody>
+      </p:sp>
+      <p:sp>
+        <p:nvSpPr>
+          <p:cNvPr id="4" name="Slide Number Placeholder 3"/>
+          <p:cNvSpPr>
+            <a:spLocks noGrp="1"/>
+          </p:cNvSpPr>
+          <p:nvPr>
+            <p:ph type="sldNum" sz="quarter" idx="5"/>
+          </p:nvPr>
+        </p:nvSpPr>
+        <p:spPr/>
+        <p:txBody>
+          <a:bodyPr/>
+          <a:lstStyle/>
+          <a:p>
+            <a:fld id="{2C9D2EC0-BFC9-4F48-A087-584B9BB7F564}" type="slidenum">
+              <a:rPr lang="en-ID" smtClean="0"/>
+              <a:t>4</a:t>
+            </a:fld>
+            <a:endParaRPr lang="en-ID"/>
+          </a:p>
+        </p:txBody>
+      </p:sp>
+    </p:spTree>
+    <p:extLst>
+      <p:ext uri="{BB962C8B-B14F-4D97-AF65-F5344CB8AC3E}">
+        <p14:creationId xmlns:p14="http://schemas.microsoft.com/office/powerpoint/2010/main" val="181787325"/>
+      </p:ext>
+    </p:extLst>
+  </p:cSld>
+  <p:clrMapOvr>
+    <a:masterClrMapping/>
+  </p:clrMapOvr>
+</p:notes>
+</file>
+
+<file path=ppt/notesSlides/notesSlide3.xml><?xml version="1.0" encoding="utf-8"?>
+<p:notes xmlns:a="http://schemas.openxmlformats.org/drawingml/2006/main" xmlns:r="http://schemas.openxmlformats.org/officeDocument/2006/relationships" xmlns:p="http://schemas.openxmlformats.org/presentationml/2006/main">
+  <p:cSld>
+    <p:spTree>
+      <p:nvGrpSpPr>
+        <p:cNvPr id="1" name=""/>
+        <p:cNvGrpSpPr/>
+        <p:nvPr/>
+      </p:nvGrpSpPr>
+      <p:grpSpPr>
+        <a:xfrm>
+          <a:off x="0" y="0"/>
+          <a:ext cx="0" cy="0"/>
+          <a:chOff x="0" y="0"/>
+          <a:chExt cx="0" cy="0"/>
+        </a:xfrm>
+      </p:grpSpPr>
+      <p:sp>
+        <p:nvSpPr>
+          <p:cNvPr id="2" name="Slide Image Placeholder 1"/>
+          <p:cNvSpPr>
+            <a:spLocks noGrp="1" noRot="1" noChangeAspect="1"/>
+          </p:cNvSpPr>
+          <p:nvPr>
+            <p:ph type="sldImg"/>
+          </p:nvPr>
+        </p:nvSpPr>
+        <p:spPr/>
+      </p:sp>
+      <p:sp>
+        <p:nvSpPr>
+          <p:cNvPr id="3" name="Notes Placeholder 2"/>
+          <p:cNvSpPr>
+            <a:spLocks noGrp="1"/>
+          </p:cNvSpPr>
+          <p:nvPr>
+            <p:ph type="body" idx="1"/>
+          </p:nvPr>
+        </p:nvSpPr>
+        <p:spPr/>
+        <p:txBody>
+          <a:bodyPr/>
+          <a:lstStyle/>
+          <a:p>
+            <a:endParaRPr lang="en-ID" dirty="0"/>
+          </a:p>
+        </p:txBody>
+      </p:sp>
+      <p:sp>
+        <p:nvSpPr>
+          <p:cNvPr id="4" name="Slide Number Placeholder 3"/>
+          <p:cNvSpPr>
+            <a:spLocks noGrp="1"/>
+          </p:cNvSpPr>
+          <p:nvPr>
+            <p:ph type="sldNum" sz="quarter" idx="5"/>
+          </p:nvPr>
+        </p:nvSpPr>
+        <p:spPr/>
+        <p:txBody>
+          <a:bodyPr/>
+          <a:lstStyle/>
+          <a:p>
+            <a:fld id="{2C9D2EC0-BFC9-4F48-A087-584B9BB7F564}" type="slidenum">
+              <a:rPr lang="en-ID" smtClean="0"/>
+              <a:t>5</a:t>
+            </a:fld>
+            <a:endParaRPr lang="en-ID"/>
+          </a:p>
+        </p:txBody>
+      </p:sp>
+    </p:spTree>
+    <p:extLst>
+      <p:ext uri="{BB962C8B-B14F-4D97-AF65-F5344CB8AC3E}">
+        <p14:creationId xmlns:p14="http://schemas.microsoft.com/office/powerpoint/2010/main" val="1925411691"/>
+      </p:ext>
+    </p:extLst>
+  </p:cSld>
+  <p:clrMapOvr>
+    <a:masterClrMapping/>
+  </p:clrMapOvr>
+</p:notes>
+</file>
+
+<file path=ppt/notesSlides/notesSlide4.xml><?xml version="1.0" encoding="utf-8"?>
+<p:notes xmlns:a="http://schemas.openxmlformats.org/drawingml/2006/main" xmlns:r="http://schemas.openxmlformats.org/officeDocument/2006/relationships" xmlns:p="http://schemas.openxmlformats.org/presentationml/2006/main">
+  <p:cSld>
+    <p:spTree>
+      <p:nvGrpSpPr>
+        <p:cNvPr id="1" name=""/>
+        <p:cNvGrpSpPr/>
+        <p:nvPr/>
+      </p:nvGrpSpPr>
+      <p:grpSpPr>
+        <a:xfrm>
+          <a:off x="0" y="0"/>
+          <a:ext cx="0" cy="0"/>
+          <a:chOff x="0" y="0"/>
+          <a:chExt cx="0" cy="0"/>
+        </a:xfrm>
+      </p:grpSpPr>
+      <p:sp>
+        <p:nvSpPr>
+          <p:cNvPr id="2" name="Slide Image Placeholder 1"/>
+          <p:cNvSpPr>
+            <a:spLocks noGrp="1" noRot="1" noChangeAspect="1"/>
+          </p:cNvSpPr>
+          <p:nvPr>
+            <p:ph type="sldImg"/>
+          </p:nvPr>
+        </p:nvSpPr>
+        <p:spPr/>
+      </p:sp>
+      <p:sp>
+        <p:nvSpPr>
+          <p:cNvPr id="3" name="Notes Placeholder 2"/>
+          <p:cNvSpPr>
+            <a:spLocks noGrp="1"/>
+          </p:cNvSpPr>
+          <p:nvPr>
+            <p:ph type="body" idx="1"/>
+          </p:nvPr>
+        </p:nvSpPr>
+        <p:spPr/>
+        <p:txBody>
+          <a:bodyPr/>
+          <a:lstStyle/>
+          <a:p>
+            <a:endParaRPr lang="en-ID" dirty="0"/>
+          </a:p>
+        </p:txBody>
+      </p:sp>
+      <p:sp>
+        <p:nvSpPr>
+          <p:cNvPr id="4" name="Slide Number Placeholder 3"/>
+          <p:cNvSpPr>
+            <a:spLocks noGrp="1"/>
+          </p:cNvSpPr>
+          <p:nvPr>
+            <p:ph type="sldNum" sz="quarter" idx="5"/>
+          </p:nvPr>
+        </p:nvSpPr>
+        <p:spPr/>
+        <p:txBody>
+          <a:bodyPr/>
+          <a:lstStyle/>
+          <a:p>
+            <a:fld id="{2C9D2EC0-BFC9-4F48-A087-584B9BB7F564}" type="slidenum">
+              <a:rPr lang="en-ID" smtClean="0"/>
+              <a:t>6</a:t>
+            </a:fld>
+            <a:endParaRPr lang="en-ID"/>
+          </a:p>
+        </p:txBody>
+      </p:sp>
+    </p:spTree>
+    <p:extLst>
+      <p:ext uri="{BB962C8B-B14F-4D97-AF65-F5344CB8AC3E}">
+        <p14:creationId xmlns:p14="http://schemas.microsoft.com/office/powerpoint/2010/main" val="2740363555"/>
+      </p:ext>
+    </p:extLst>
+  </p:cSld>
+  <p:clrMapOvr>
+    <a:masterClrMapping/>
+  </p:clrMapOvr>
+</p:notes>
+</file>
+
+<file path=ppt/notesSlides/notesSlide5.xml><?xml version="1.0" encoding="utf-8"?>
+<p:notes xmlns:a="http://schemas.openxmlformats.org/drawingml/2006/main" xmlns:r="http://schemas.openxmlformats.org/officeDocument/2006/relationships" xmlns:p="http://schemas.openxmlformats.org/presentationml/2006/main">
+  <p:cSld>
+    <p:spTree>
+      <p:nvGrpSpPr>
+        <p:cNvPr id="1" name=""/>
+        <p:cNvGrpSpPr/>
+        <p:nvPr/>
+      </p:nvGrpSpPr>
+      <p:grpSpPr>
+        <a:xfrm>
+          <a:off x="0" y="0"/>
+          <a:ext cx="0" cy="0"/>
+          <a:chOff x="0" y="0"/>
+          <a:chExt cx="0" cy="0"/>
+        </a:xfrm>
+      </p:grpSpPr>
+      <p:sp>
+        <p:nvSpPr>
+          <p:cNvPr id="2" name="Slide Image Placeholder 1"/>
+          <p:cNvSpPr>
+            <a:spLocks noGrp="1" noRot="1" noChangeAspect="1"/>
+          </p:cNvSpPr>
+          <p:nvPr>
+            <p:ph type="sldImg"/>
+          </p:nvPr>
+        </p:nvSpPr>
+        <p:spPr/>
+      </p:sp>
+      <p:sp>
+        <p:nvSpPr>
+          <p:cNvPr id="3" name="Notes Placeholder 2"/>
+          <p:cNvSpPr>
+            <a:spLocks noGrp="1"/>
+          </p:cNvSpPr>
+          <p:nvPr>
+            <p:ph type="body" idx="1"/>
+          </p:nvPr>
+        </p:nvSpPr>
+        <p:spPr/>
+        <p:txBody>
+          <a:bodyPr/>
+          <a:lstStyle/>
+          <a:p>
+            <a:endParaRPr lang="en-ID" dirty="0"/>
+          </a:p>
+        </p:txBody>
+      </p:sp>
+      <p:sp>
+        <p:nvSpPr>
+          <p:cNvPr id="4" name="Slide Number Placeholder 3"/>
+          <p:cNvSpPr>
+            <a:spLocks noGrp="1"/>
+          </p:cNvSpPr>
+          <p:nvPr>
+            <p:ph type="sldNum" sz="quarter" idx="5"/>
+          </p:nvPr>
+        </p:nvSpPr>
+        <p:spPr/>
+        <p:txBody>
+          <a:bodyPr/>
+          <a:lstStyle/>
+          <a:p>
+            <a:fld id="{2C9D2EC0-BFC9-4F48-A087-584B9BB7F564}" type="slidenum">
+              <a:rPr lang="en-ID" smtClean="0"/>
+              <a:t>7</a:t>
+            </a:fld>
+            <a:endParaRPr lang="en-ID"/>
+          </a:p>
+        </p:txBody>
+      </p:sp>
+    </p:spTree>
+    <p:extLst>
+      <p:ext uri="{BB962C8B-B14F-4D97-AF65-F5344CB8AC3E}">
+        <p14:creationId xmlns:p14="http://schemas.microsoft.com/office/powerpoint/2010/main" val="1905262411"/>
+      </p:ext>
+    </p:extLst>
+  </p:cSld>
+  <p:clrMapOvr>
+    <a:masterClrMapping/>
+  </p:clrMapOvr>
+</p:notes>
+</file>
+
 <file path=ppt/slideLayouts/slideLayout1.xml><?xml version="1.0" encoding="utf-8"?>
 <p:sldLayout xmlns:a="http://schemas.openxmlformats.org/drawingml/2006/main" xmlns:r="http://schemas.openxmlformats.org/officeDocument/2006/relationships" xmlns:p="http://schemas.openxmlformats.org/presentationml/2006/main" type="title" preserve="1">
   <p:cSld name="Title Slide">
@@ -620,7 +1092,7 @@
           <a:p>
             <a:fld id="{B482AB83-0AB6-483E-883E-23F305AEAE74}" type="datetimeFigureOut">
               <a:rPr lang="en-ID" smtClean="0"/>
-              <a:t>19/10/2024</a:t>
+              <a:t>23/10/2024</a:t>
             </a:fld>
             <a:endParaRPr lang="en-ID"/>
           </a:p>
@@ -820,7 +1292,7 @@
           <a:p>
             <a:fld id="{B482AB83-0AB6-483E-883E-23F305AEAE74}" type="datetimeFigureOut">
               <a:rPr lang="en-ID" smtClean="0"/>
-              <a:t>19/10/2024</a:t>
+              <a:t>23/10/2024</a:t>
             </a:fld>
             <a:endParaRPr lang="en-ID"/>
           </a:p>
@@ -1030,7 +1502,7 @@
           <a:p>
             <a:fld id="{B482AB83-0AB6-483E-883E-23F305AEAE74}" type="datetimeFigureOut">
               <a:rPr lang="en-ID" smtClean="0"/>
-              <a:t>19/10/2024</a:t>
+              <a:t>23/10/2024</a:t>
             </a:fld>
             <a:endParaRPr lang="en-ID"/>
           </a:p>
@@ -1230,7 +1702,7 @@
           <a:p>
             <a:fld id="{B482AB83-0AB6-483E-883E-23F305AEAE74}" type="datetimeFigureOut">
               <a:rPr lang="en-ID" smtClean="0"/>
-              <a:t>19/10/2024</a:t>
+              <a:t>23/10/2024</a:t>
             </a:fld>
             <a:endParaRPr lang="en-ID"/>
           </a:p>
@@ -1506,7 +1978,7 @@
           <a:p>
             <a:fld id="{B482AB83-0AB6-483E-883E-23F305AEAE74}" type="datetimeFigureOut">
               <a:rPr lang="en-ID" smtClean="0"/>
-              <a:t>19/10/2024</a:t>
+              <a:t>23/10/2024</a:t>
             </a:fld>
             <a:endParaRPr lang="en-ID"/>
           </a:p>
@@ -1774,7 +2246,7 @@
           <a:p>
             <a:fld id="{B482AB83-0AB6-483E-883E-23F305AEAE74}" type="datetimeFigureOut">
               <a:rPr lang="en-ID" smtClean="0"/>
-              <a:t>19/10/2024</a:t>
+              <a:t>23/10/2024</a:t>
             </a:fld>
             <a:endParaRPr lang="en-ID"/>
           </a:p>
@@ -2189,7 +2661,7 @@
           <a:p>
             <a:fld id="{B482AB83-0AB6-483E-883E-23F305AEAE74}" type="datetimeFigureOut">
               <a:rPr lang="en-ID" smtClean="0"/>
-              <a:t>19/10/2024</a:t>
+              <a:t>23/10/2024</a:t>
             </a:fld>
             <a:endParaRPr lang="en-ID"/>
           </a:p>
@@ -2331,7 +2803,7 @@
           <a:p>
             <a:fld id="{B482AB83-0AB6-483E-883E-23F305AEAE74}" type="datetimeFigureOut">
               <a:rPr lang="en-ID" smtClean="0"/>
-              <a:t>19/10/2024</a:t>
+              <a:t>23/10/2024</a:t>
             </a:fld>
             <a:endParaRPr lang="en-ID"/>
           </a:p>
@@ -2444,7 +2916,7 @@
           <a:p>
             <a:fld id="{B482AB83-0AB6-483E-883E-23F305AEAE74}" type="datetimeFigureOut">
               <a:rPr lang="en-ID" smtClean="0"/>
-              <a:t>19/10/2024</a:t>
+              <a:t>23/10/2024</a:t>
             </a:fld>
             <a:endParaRPr lang="en-ID"/>
           </a:p>
@@ -2757,7 +3229,7 @@
           <a:p>
             <a:fld id="{B482AB83-0AB6-483E-883E-23F305AEAE74}" type="datetimeFigureOut">
               <a:rPr lang="en-ID" smtClean="0"/>
-              <a:t>19/10/2024</a:t>
+              <a:t>23/10/2024</a:t>
             </a:fld>
             <a:endParaRPr lang="en-ID"/>
           </a:p>
@@ -3046,7 +3518,7 @@
           <a:p>
             <a:fld id="{B482AB83-0AB6-483E-883E-23F305AEAE74}" type="datetimeFigureOut">
               <a:rPr lang="en-ID" smtClean="0"/>
-              <a:t>19/10/2024</a:t>
+              <a:t>23/10/2024</a:t>
             </a:fld>
             <a:endParaRPr lang="en-ID"/>
           </a:p>
@@ -3289,7 +3761,7 @@
           <a:p>
             <a:fld id="{B482AB83-0AB6-483E-883E-23F305AEAE74}" type="datetimeFigureOut">
               <a:rPr lang="en-ID" smtClean="0"/>
-              <a:t>19/10/2024</a:t>
+              <a:t>23/10/2024</a:t>
             </a:fld>
             <a:endParaRPr lang="en-ID"/>
           </a:p>
@@ -3759,12 +4231,14 @@
         </p:nvSpPr>
         <p:spPr>
           <a:xfrm>
-            <a:off x="731196" y="1253331"/>
-            <a:ext cx="10515600" cy="4351338"/>
+            <a:off x="671561" y="1382540"/>
+            <a:ext cx="6613187" cy="4351338"/>
           </a:xfrm>
         </p:spPr>
         <p:txBody>
-          <a:bodyPr/>
+          <a:bodyPr>
+            <a:normAutofit/>
+          </a:bodyPr>
           <a:lstStyle/>
           <a:p>
             <a:r>
@@ -3787,64 +4261,74 @@
             </a:r>
           </a:p>
           <a:p>
+            <a:pPr lvl="1"/>
+            <a:r>
+              <a:rPr lang="en-ID" sz="2000" dirty="0"/>
+              <a:t>Found in certain types of cancer (colorectal, endometrial, etc..)</a:t>
+            </a:r>
+          </a:p>
+          <a:p>
             <a:endParaRPr lang="en-ID" sz="2400" dirty="0"/>
           </a:p>
           <a:p>
             <a:r>
               <a:rPr lang="en-ID" sz="2400" dirty="0"/>
-              <a:t>Aim : Can we predict MMR status via MSI ?</a:t>
+              <a:t>In previous work</a:t>
             </a:r>
           </a:p>
           <a:p>
             <a:pPr lvl="1"/>
             <a:r>
               <a:rPr lang="en-ID" sz="2000" dirty="0"/>
-              <a:t>MSI measured by ↑ frequency of mutant alleles</a:t>
+              <a:t>+1 allele detected in both </a:t>
+            </a:r>
+            <a:r>
+              <a:rPr lang="en-ID" sz="2000" dirty="0" err="1"/>
+              <a:t>MMRp</a:t>
+            </a:r>
+            <a:r>
+              <a:rPr lang="en-ID" sz="2000" dirty="0"/>
+              <a:t> and </a:t>
+            </a:r>
+            <a:r>
+              <a:rPr lang="en-ID" sz="2000" dirty="0" err="1"/>
+              <a:t>MMRd</a:t>
+            </a:r>
+            <a:r>
+              <a:rPr lang="en-ID" sz="2000" dirty="0"/>
+              <a:t> samples</a:t>
             </a:r>
           </a:p>
           <a:p>
             <a:pPr lvl="1"/>
             <a:r>
               <a:rPr lang="en-ID" sz="2000" dirty="0"/>
-              <a:t>High MSI </a:t>
-            </a:r>
-            <a:r>
-              <a:rPr lang="en-ID" sz="2000" b="0" i="0" u="none" strike="noStrike" dirty="0">
-                <a:effectLst/>
-              </a:rPr>
-              <a:t>→ </a:t>
-            </a:r>
-            <a:r>
-              <a:rPr lang="en-ID" sz="2000" b="0" i="0" u="none" strike="noStrike" dirty="0" err="1">
-                <a:effectLst/>
-              </a:rPr>
+              <a:t>Higher frequency in </a:t>
+            </a:r>
+            <a:r>
+              <a:rPr lang="en-ID" sz="2000" dirty="0" err="1"/>
+              <a:t>MMRp</a:t>
+            </a:r>
+            <a:r>
+              <a:rPr lang="en-ID" sz="2000" dirty="0"/>
+              <a:t> than </a:t>
+            </a:r>
+            <a:r>
+              <a:rPr lang="en-ID" sz="2000" dirty="0" err="1"/>
               <a:t>MMRd</a:t>
             </a:r>
-            <a:r>
-              <a:rPr lang="en-ID" sz="2000" b="0" i="0" u="none" strike="noStrike" dirty="0">
-                <a:effectLst/>
-              </a:rPr>
-              <a:t> </a:t>
-            </a:r>
-          </a:p>
-          <a:p>
-            <a:pPr lvl="1"/>
             <a:endParaRPr lang="en-ID" sz="2000" dirty="0"/>
           </a:p>
           <a:p>
-            <a:r>
-              <a:rPr lang="en-ID" sz="2400" dirty="0"/>
-              <a:t>Problem :</a:t>
-            </a:r>
-          </a:p>
-          <a:p>
-            <a:pPr lvl="1"/>
-            <a:r>
-              <a:rPr lang="en-ID" sz="2000" dirty="0"/>
-              <a:t>Are some mutant alleles (+1, -1, etc..) more predictive than others?</a:t>
-            </a:r>
-          </a:p>
-          <a:p>
+            <a:pPr marL="457200" lvl="1" indent="0">
+              <a:buNone/>
+            </a:pPr>
+            <a:endParaRPr lang="en-ID" sz="2000" dirty="0"/>
+          </a:p>
+          <a:p>
+            <a:pPr marL="0" indent="0">
+              <a:buNone/>
+            </a:pPr>
             <a:endParaRPr lang="en-ID" dirty="0"/>
           </a:p>
           <a:p>
@@ -3857,6 +4341,133 @@
             <a:endParaRPr lang="en-ID" dirty="0"/>
           </a:p>
           <a:p>
+            <a:endParaRPr lang="en-ID" dirty="0"/>
+          </a:p>
+        </p:txBody>
+      </p:sp>
+      <p:pic>
+        <p:nvPicPr>
+          <p:cNvPr id="5" name="Picture 4">
+            <a:extLst>
+              <a:ext uri="{FF2B5EF4-FFF2-40B4-BE49-F238E27FC236}">
+                <a16:creationId xmlns:a16="http://schemas.microsoft.com/office/drawing/2014/main" id="{D901B361-1E81-1FE6-57F9-4C286207BD53}"/>
+              </a:ext>
+            </a:extLst>
+          </p:cNvPr>
+          <p:cNvPicPr>
+            <a:picLocks noChangeAspect="1"/>
+          </p:cNvPicPr>
+          <p:nvPr/>
+        </p:nvPicPr>
+        <p:blipFill>
+          <a:blip r:embed="rId2"/>
+          <a:srcRect l="6505"/>
+          <a:stretch/>
+        </p:blipFill>
+        <p:spPr>
+          <a:xfrm>
+            <a:off x="8015591" y="485292"/>
+            <a:ext cx="2234235" cy="4786772"/>
+          </a:xfrm>
+          <a:prstGeom prst="rect">
+            <a:avLst/>
+          </a:prstGeom>
+        </p:spPr>
+      </p:pic>
+      <p:pic>
+        <p:nvPicPr>
+          <p:cNvPr id="7" name="Picture 6">
+            <a:extLst>
+              <a:ext uri="{FF2B5EF4-FFF2-40B4-BE49-F238E27FC236}">
+                <a16:creationId xmlns:a16="http://schemas.microsoft.com/office/drawing/2014/main" id="{8F9B1FA9-1209-6C86-9251-4FC76B8DCFE7}"/>
+              </a:ext>
+            </a:extLst>
+          </p:cNvPr>
+          <p:cNvPicPr>
+            <a:picLocks noChangeAspect="1"/>
+          </p:cNvPicPr>
+          <p:nvPr/>
+        </p:nvPicPr>
+        <p:blipFill>
+          <a:blip r:embed="rId3"/>
+          <a:stretch>
+            <a:fillRect/>
+          </a:stretch>
+        </p:blipFill>
+        <p:spPr>
+          <a:xfrm>
+            <a:off x="10440210" y="2189433"/>
+            <a:ext cx="1447800" cy="981075"/>
+          </a:xfrm>
+          <a:prstGeom prst="rect">
+            <a:avLst/>
+          </a:prstGeom>
+        </p:spPr>
+      </p:pic>
+      <p:sp>
+        <p:nvSpPr>
+          <p:cNvPr id="8" name="TextBox 7">
+            <a:extLst>
+              <a:ext uri="{FF2B5EF4-FFF2-40B4-BE49-F238E27FC236}">
+                <a16:creationId xmlns:a16="http://schemas.microsoft.com/office/drawing/2014/main" id="{81383D85-57E1-26FC-5E68-00C3B2EF6505}"/>
+              </a:ext>
+            </a:extLst>
+          </p:cNvPr>
+          <p:cNvSpPr txBox="1"/>
+          <p:nvPr/>
+        </p:nvSpPr>
+        <p:spPr>
+          <a:xfrm>
+            <a:off x="7080699" y="5321038"/>
+            <a:ext cx="4992034" cy="1477328"/>
+          </a:xfrm>
+          <a:prstGeom prst="rect">
+            <a:avLst/>
+          </a:prstGeom>
+          <a:noFill/>
+        </p:spPr>
+        <p:txBody>
+          <a:bodyPr wrap="square" rtlCol="0">
+            <a:spAutoFit/>
+          </a:bodyPr>
+          <a:lstStyle/>
+          <a:p>
+            <a:r>
+              <a:rPr lang="en-US" dirty="0"/>
+              <a:t>Figure 1. Standardized ratios (y-axis) comparing allele frequencies (x-axis) in different markers between </a:t>
+            </a:r>
+            <a:r>
+              <a:rPr lang="en-US" dirty="0" err="1"/>
+              <a:t>MMRp</a:t>
+            </a:r>
+            <a:r>
+              <a:rPr lang="en-US" dirty="0"/>
+              <a:t> and </a:t>
+            </a:r>
+            <a:r>
+              <a:rPr lang="en-US" dirty="0" err="1"/>
+              <a:t>MMRd</a:t>
+            </a:r>
+            <a:r>
+              <a:rPr lang="en-US" dirty="0"/>
+              <a:t> samples. A ratio &gt; 0.5 indicates a greater allele frequency in </a:t>
+            </a:r>
+            <a:r>
+              <a:rPr lang="en-US" dirty="0" err="1"/>
+              <a:t>MMRd</a:t>
+            </a:r>
+            <a:r>
+              <a:rPr lang="en-US" dirty="0"/>
+              <a:t> compared to </a:t>
+            </a:r>
+            <a:r>
+              <a:rPr lang="en-US" dirty="0" err="1"/>
+              <a:t>MMRp</a:t>
+            </a:r>
+            <a:r>
+              <a:rPr lang="en-US" dirty="0"/>
+              <a:t> and vice-versa.</a:t>
+            </a:r>
             <a:endParaRPr lang="en-ID" dirty="0"/>
           </a:p>
         </p:txBody>
@@ -3865,6 +4476,307 @@
     <p:extLst>
       <p:ext uri="{BB962C8B-B14F-4D97-AF65-F5344CB8AC3E}">
         <p14:creationId xmlns:p14="http://schemas.microsoft.com/office/powerpoint/2010/main" val="1660227001"/>
+      </p:ext>
+    </p:extLst>
+  </p:cSld>
+  <p:clrMapOvr>
+    <a:masterClrMapping/>
+  </p:clrMapOvr>
+</p:sld>
+</file>
+
+<file path=ppt/slides/slide10.xml><?xml version="1.0" encoding="utf-8"?>
+<p:sld xmlns:a="http://schemas.openxmlformats.org/drawingml/2006/main" xmlns:r="http://schemas.openxmlformats.org/officeDocument/2006/relationships" xmlns:p="http://schemas.openxmlformats.org/presentationml/2006/main">
+  <p:cSld>
+    <p:spTree>
+      <p:nvGrpSpPr>
+        <p:cNvPr id="1" name=""/>
+        <p:cNvGrpSpPr/>
+        <p:nvPr/>
+      </p:nvGrpSpPr>
+      <p:grpSpPr>
+        <a:xfrm>
+          <a:off x="0" y="0"/>
+          <a:ext cx="0" cy="0"/>
+          <a:chOff x="0" y="0"/>
+          <a:chExt cx="0" cy="0"/>
+        </a:xfrm>
+      </p:grpSpPr>
+      <p:sp>
+        <p:nvSpPr>
+          <p:cNvPr id="2" name="Title 1">
+            <a:extLst>
+              <a:ext uri="{FF2B5EF4-FFF2-40B4-BE49-F238E27FC236}">
+                <a16:creationId xmlns:a16="http://schemas.microsoft.com/office/drawing/2014/main" id="{5709C9F6-CD43-E4F8-16BB-6188EADA7D0E}"/>
+              </a:ext>
+            </a:extLst>
+          </p:cNvPr>
+          <p:cNvSpPr>
+            <a:spLocks noGrp="1"/>
+          </p:cNvSpPr>
+          <p:nvPr>
+            <p:ph type="title"/>
+          </p:nvPr>
+        </p:nvSpPr>
+        <p:spPr>
+          <a:xfrm>
+            <a:off x="945204" y="1301749"/>
+            <a:ext cx="10515600" cy="1325563"/>
+          </a:xfrm>
+        </p:spPr>
+        <p:txBody>
+          <a:bodyPr/>
+          <a:lstStyle/>
+          <a:p>
+            <a:r>
+              <a:rPr lang="en-ID" dirty="0"/>
+              <a:t>Result (-1 vs +1)</a:t>
+            </a:r>
+          </a:p>
+        </p:txBody>
+      </p:sp>
+      <p:sp>
+        <p:nvSpPr>
+          <p:cNvPr id="3" name="Content Placeholder 2">
+            <a:extLst>
+              <a:ext uri="{FF2B5EF4-FFF2-40B4-BE49-F238E27FC236}">
+                <a16:creationId xmlns:a16="http://schemas.microsoft.com/office/drawing/2014/main" id="{441C49D0-3606-85E9-72AF-849DA0814AD3}"/>
+              </a:ext>
+            </a:extLst>
+          </p:cNvPr>
+          <p:cNvSpPr>
+            <a:spLocks noGrp="1"/>
+          </p:cNvSpPr>
+          <p:nvPr>
+            <p:ph idx="1"/>
+          </p:nvPr>
+        </p:nvSpPr>
+        <p:spPr/>
+        <p:txBody>
+          <a:bodyPr/>
+          <a:lstStyle/>
+          <a:p>
+            <a:pPr marL="0" indent="0">
+              <a:buNone/>
+            </a:pPr>
+            <a:endParaRPr lang="en-ID" dirty="0"/>
+          </a:p>
+          <a:p>
+            <a:endParaRPr lang="en-ID" dirty="0"/>
+          </a:p>
+        </p:txBody>
+      </p:sp>
+      <p:pic>
+        <p:nvPicPr>
+          <p:cNvPr id="5" name="Picture 4" descr="A graph with black dots and a blue line&#10;&#10;Description automatically generated">
+            <a:extLst>
+              <a:ext uri="{FF2B5EF4-FFF2-40B4-BE49-F238E27FC236}">
+                <a16:creationId xmlns:a16="http://schemas.microsoft.com/office/drawing/2014/main" id="{79254698-9FA2-4685-424A-F3C9C9951A58}"/>
+              </a:ext>
+            </a:extLst>
+          </p:cNvPr>
+          <p:cNvPicPr>
+            <a:picLocks noChangeAspect="1"/>
+          </p:cNvPicPr>
+          <p:nvPr/>
+        </p:nvPicPr>
+        <p:blipFill>
+          <a:blip r:embed="rId2">
+            <a:extLst>
+              <a:ext uri="{28A0092B-C50C-407E-A947-70E740481C1C}">
+                <a14:useLocalDpi xmlns:a14="http://schemas.microsoft.com/office/drawing/2010/main" val="0"/>
+              </a:ext>
+            </a:extLst>
+          </a:blip>
+          <a:stretch>
+            <a:fillRect/>
+          </a:stretch>
+        </p:blipFill>
+        <p:spPr>
+          <a:xfrm>
+            <a:off x="6203004" y="553498"/>
+            <a:ext cx="5852172" cy="4389129"/>
+          </a:xfrm>
+          <a:prstGeom prst="rect">
+            <a:avLst/>
+          </a:prstGeom>
+        </p:spPr>
+      </p:pic>
+    </p:spTree>
+    <p:extLst>
+      <p:ext uri="{BB962C8B-B14F-4D97-AF65-F5344CB8AC3E}">
+        <p14:creationId xmlns:p14="http://schemas.microsoft.com/office/powerpoint/2010/main" val="3295337728"/>
+      </p:ext>
+    </p:extLst>
+  </p:cSld>
+  <p:clrMapOvr>
+    <a:masterClrMapping/>
+  </p:clrMapOvr>
+</p:sld>
+</file>
+
+<file path=ppt/slides/slide11.xml><?xml version="1.0" encoding="utf-8"?>
+<p:sld xmlns:a="http://schemas.openxmlformats.org/drawingml/2006/main" xmlns:r="http://schemas.openxmlformats.org/officeDocument/2006/relationships" xmlns:p="http://schemas.openxmlformats.org/presentationml/2006/main">
+  <p:cSld>
+    <p:spTree>
+      <p:nvGrpSpPr>
+        <p:cNvPr id="1" name=""/>
+        <p:cNvGrpSpPr/>
+        <p:nvPr/>
+      </p:nvGrpSpPr>
+      <p:grpSpPr>
+        <a:xfrm>
+          <a:off x="0" y="0"/>
+          <a:ext cx="0" cy="0"/>
+          <a:chOff x="0" y="0"/>
+          <a:chExt cx="0" cy="0"/>
+        </a:xfrm>
+      </p:grpSpPr>
+      <p:sp>
+        <p:nvSpPr>
+          <p:cNvPr id="2" name="Title 1">
+            <a:extLst>
+              <a:ext uri="{FF2B5EF4-FFF2-40B4-BE49-F238E27FC236}">
+                <a16:creationId xmlns:a16="http://schemas.microsoft.com/office/drawing/2014/main" id="{53844053-28A2-4C86-8EE6-C50E4EB8B309}"/>
+              </a:ext>
+            </a:extLst>
+          </p:cNvPr>
+          <p:cNvSpPr>
+            <a:spLocks noGrp="1"/>
+          </p:cNvSpPr>
+          <p:nvPr>
+            <p:ph type="title"/>
+          </p:nvPr>
+        </p:nvSpPr>
+        <p:spPr/>
+        <p:txBody>
+          <a:bodyPr/>
+          <a:lstStyle/>
+          <a:p>
+            <a:r>
+              <a:rPr lang="en-ID" dirty="0"/>
+              <a:t>Conclusion</a:t>
+            </a:r>
+          </a:p>
+        </p:txBody>
+      </p:sp>
+      <p:sp>
+        <p:nvSpPr>
+          <p:cNvPr id="3" name="Content Placeholder 2">
+            <a:extLst>
+              <a:ext uri="{FF2B5EF4-FFF2-40B4-BE49-F238E27FC236}">
+                <a16:creationId xmlns:a16="http://schemas.microsoft.com/office/drawing/2014/main" id="{ED794B28-7BEE-48E2-4202-C812195DA93C}"/>
+              </a:ext>
+            </a:extLst>
+          </p:cNvPr>
+          <p:cNvSpPr>
+            <a:spLocks noGrp="1"/>
+          </p:cNvSpPr>
+          <p:nvPr>
+            <p:ph idx="1"/>
+          </p:nvPr>
+        </p:nvSpPr>
+        <p:spPr/>
+        <p:txBody>
+          <a:bodyPr/>
+          <a:lstStyle/>
+          <a:p>
+            <a:r>
+              <a:rPr lang="en-ID" sz="2400" dirty="0"/>
+              <a:t>+1 allele negative or no correlation with other mutant alleles</a:t>
+            </a:r>
+          </a:p>
+          <a:p>
+            <a:pPr lvl="1"/>
+            <a:r>
+              <a:rPr lang="en-ID" sz="2000" dirty="0"/>
+              <a:t>negative correlation with -1 allele in </a:t>
+            </a:r>
+            <a:r>
+              <a:rPr lang="en-ID" sz="2000" dirty="0" err="1"/>
+              <a:t>MMRd</a:t>
+            </a:r>
+            <a:endParaRPr lang="en-ID" sz="2000" dirty="0"/>
+          </a:p>
+          <a:p>
+            <a:pPr lvl="1"/>
+            <a:r>
+              <a:rPr lang="en-ID" sz="2000" dirty="0"/>
+              <a:t>no correlation with -1 allele in </a:t>
+            </a:r>
+            <a:r>
+              <a:rPr lang="en-ID" sz="2000" dirty="0" err="1"/>
+              <a:t>MMRp</a:t>
+            </a:r>
+            <a:endParaRPr lang="en-ID" sz="2000" dirty="0"/>
+          </a:p>
+          <a:p>
+            <a:pPr lvl="1"/>
+            <a:r>
+              <a:rPr lang="en-ID" sz="2000" dirty="0"/>
+              <a:t>+1 allele does not correlate with loss of MMR</a:t>
+            </a:r>
+          </a:p>
+          <a:p>
+            <a:pPr marL="457200" lvl="1" indent="0">
+              <a:buNone/>
+            </a:pPr>
+            <a:endParaRPr lang="en-ID" sz="2000" dirty="0"/>
+          </a:p>
+          <a:p>
+            <a:r>
+              <a:rPr lang="en-ID" sz="2400" dirty="0"/>
+              <a:t>+1 allele’s correlation with reference allele</a:t>
+            </a:r>
+          </a:p>
+          <a:p>
+            <a:pPr lvl="1"/>
+            <a:r>
+              <a:rPr lang="en-ID" sz="2000" dirty="0"/>
+              <a:t>Negative correlation (i.e. “normal” mutant behaviour) in </a:t>
+            </a:r>
+            <a:r>
+              <a:rPr lang="en-ID" sz="2000" dirty="0" err="1"/>
+              <a:t>MMRp</a:t>
+            </a:r>
+            <a:r>
+              <a:rPr lang="en-ID" sz="2000" dirty="0"/>
+              <a:t> </a:t>
+            </a:r>
+          </a:p>
+          <a:p>
+            <a:pPr lvl="1"/>
+            <a:r>
+              <a:rPr lang="en-ID" sz="2000" dirty="0"/>
+              <a:t>Opposite behaviour in </a:t>
+            </a:r>
+            <a:r>
+              <a:rPr lang="en-ID" sz="2000" dirty="0" err="1"/>
+              <a:t>MMRd</a:t>
+            </a:r>
+            <a:r>
+              <a:rPr lang="en-ID" sz="2000" dirty="0"/>
+              <a:t> ? Still unclear why </a:t>
+            </a:r>
+          </a:p>
+          <a:p>
+            <a:pPr lvl="1"/>
+            <a:endParaRPr lang="en-ID" dirty="0"/>
+          </a:p>
+          <a:p>
+            <a:pPr lvl="1"/>
+            <a:endParaRPr lang="en-ID" dirty="0"/>
+          </a:p>
+          <a:p>
+            <a:pPr lvl="1"/>
+            <a:endParaRPr lang="en-ID" dirty="0"/>
+          </a:p>
+        </p:txBody>
+      </p:sp>
+    </p:spTree>
+    <p:extLst>
+      <p:ext uri="{BB962C8B-B14F-4D97-AF65-F5344CB8AC3E}">
+        <p14:creationId xmlns:p14="http://schemas.microsoft.com/office/powerpoint/2010/main" val="944629050"/>
       </p:ext>
     </p:extLst>
   </p:cSld>
@@ -3920,8 +4832,16 @@
           <a:lstStyle/>
           <a:p>
             <a:r>
+              <a:rPr lang="en-US" sz="3600" dirty="0"/>
+              <a:t>Q</a:t>
+            </a:r>
+            <a:r>
+              <a:rPr lang="en-ID" sz="3600" dirty="0" err="1"/>
+              <a:t>uestion</a:t>
+            </a:r>
+            <a:r>
               <a:rPr lang="en-ID" sz="3600" dirty="0"/>
-              <a:t>To Investigate :</a:t>
+              <a:t> : How does the +1 allele arise?</a:t>
             </a:r>
           </a:p>
         </p:txBody>
@@ -3944,116 +4864,106 @@
         </p:nvSpPr>
         <p:spPr>
           <a:xfrm>
-            <a:off x="731196" y="1253331"/>
-            <a:ext cx="10515600" cy="4351338"/>
+            <a:off x="731196" y="1253330"/>
+            <a:ext cx="10515600" cy="5604669"/>
           </a:xfrm>
         </p:spPr>
         <p:txBody>
-          <a:bodyPr/>
+          <a:bodyPr>
+            <a:normAutofit/>
+          </a:bodyPr>
           <a:lstStyle/>
           <a:p>
             <a:r>
               <a:rPr lang="en-ID" sz="2400" dirty="0"/>
-              <a:t>Low frequency of +1 alleles (~1%)</a:t>
+              <a:t>Caused by </a:t>
+            </a:r>
+            <a:r>
+              <a:rPr lang="en-ID" sz="2400" dirty="0" err="1"/>
+              <a:t>MMRd</a:t>
+            </a:r>
+            <a:r>
+              <a:rPr lang="en-ID" sz="2400" dirty="0"/>
+              <a:t>?</a:t>
             </a:r>
           </a:p>
           <a:p>
             <a:pPr lvl="1"/>
             <a:r>
               <a:rPr lang="en-ID" sz="2000" dirty="0"/>
-              <a:t>Higher in </a:t>
-            </a:r>
-            <a:r>
-              <a:rPr lang="en-ID" sz="2000" dirty="0" err="1"/>
-              <a:t>MMRp</a:t>
-            </a:r>
+              <a:t>Unlikely due based on previous results</a:t>
+            </a:r>
+          </a:p>
+          <a:p>
+            <a:r>
+              <a:rPr lang="en-ID" sz="2400" b="1" dirty="0"/>
+              <a:t>PCR artefacts?</a:t>
+            </a:r>
+          </a:p>
+          <a:p>
+            <a:pPr lvl="1"/>
             <a:r>
               <a:rPr lang="en-ID" sz="2000" dirty="0"/>
-              <a:t> than </a:t>
-            </a:r>
-            <a:r>
-              <a:rPr lang="en-ID" sz="2000" dirty="0" err="1"/>
-              <a:t>MMRd</a:t>
-            </a:r>
-            <a:endParaRPr lang="en-ID" sz="2000" dirty="0"/>
+              <a:t>Possible due to its low frequency (~1%)</a:t>
+            </a:r>
+          </a:p>
+          <a:p>
+            <a:r>
+              <a:rPr lang="en-ID" sz="2400" b="1" dirty="0"/>
+              <a:t>A normal function of MMR?</a:t>
+            </a:r>
           </a:p>
           <a:p>
             <a:pPr lvl="1"/>
             <a:r>
               <a:rPr lang="en-ID" sz="2000" dirty="0"/>
-              <a:t>Genuine insertion mutations?</a:t>
+              <a:t>Aligns with previous results</a:t>
             </a:r>
           </a:p>
           <a:p>
             <a:pPr lvl="1"/>
             <a:r>
               <a:rPr lang="en-ID" sz="2000" dirty="0"/>
-              <a:t>PCR artefacts?  </a:t>
-            </a:r>
-            <a:r>
-              <a:rPr lang="en-ID" sz="2000" b="0" i="0" u="none" strike="noStrike" dirty="0">
-                <a:effectLst/>
-              </a:rPr>
-              <a:t>→  not predictive of </a:t>
-            </a:r>
-            <a:r>
-              <a:rPr lang="en-ID" sz="2000" b="0" i="0" u="none" strike="noStrike" dirty="0" err="1">
-                <a:effectLst/>
-              </a:rPr>
-              <a:t>MMRd</a:t>
-            </a:r>
-            <a:endParaRPr lang="en-ID" sz="2000" b="0" i="0" u="none" strike="noStrike" dirty="0">
-              <a:effectLst/>
-            </a:endParaRPr>
+              <a:t>MMR is also known to be involved in trinucleotide expansion diseases</a:t>
+            </a:r>
           </a:p>
           <a:p>
             <a:pPr lvl="1"/>
             <a:endParaRPr lang="en-ID" sz="2000" dirty="0"/>
           </a:p>
           <a:p>
+            <a:r>
+              <a:rPr lang="en-ID" sz="2400" b="1" dirty="0"/>
+              <a:t>Significance :</a:t>
+            </a:r>
+            <a:endParaRPr lang="en-ID" sz="2400" dirty="0"/>
+          </a:p>
+          <a:p>
+            <a:pPr lvl="1"/>
+            <a:r>
+              <a:rPr lang="en-ID" sz="2000" dirty="0"/>
+              <a:t>Assuming hypothesis 2, then +1 allele frequency can be used to estimate PCR error rate  and can be used to (further) normalize the dataset</a:t>
+            </a:r>
+          </a:p>
+          <a:p>
+            <a:pPr marL="457200" lvl="1" indent="0">
+              <a:buNone/>
+            </a:pPr>
+            <a:endParaRPr lang="en-ID" sz="1800" dirty="0"/>
+          </a:p>
+          <a:p>
+            <a:pPr lvl="1"/>
+            <a:r>
+              <a:rPr lang="en-ID" sz="2000" dirty="0"/>
+              <a:t>Assuming hypothesis 3, then +1 allele frequency can be used as a marker to evaluate MMR function in constitutional samples</a:t>
+            </a:r>
+            <a:endParaRPr lang="en-ID" sz="1800" dirty="0"/>
+          </a:p>
+          <a:p>
             <a:pPr lvl="1"/>
             <a:endParaRPr lang="en-ID" sz="2000" dirty="0"/>
           </a:p>
           <a:p>
-            <a:r>
-              <a:rPr lang="en-ID" sz="2400" dirty="0"/>
-              <a:t>Is there a correlation between the allele frequencies?</a:t>
-            </a:r>
-          </a:p>
-          <a:p>
-            <a:pPr lvl="1"/>
-            <a:r>
-              <a:rPr lang="en-ID" sz="2000" dirty="0"/>
-              <a:t>0 vs +1,  -1 vs +1 ?</a:t>
-            </a:r>
-          </a:p>
-          <a:p>
-            <a:pPr lvl="1"/>
-            <a:r>
-              <a:rPr lang="en-ID" sz="2000" dirty="0"/>
-              <a:t>Different behaviour between </a:t>
-            </a:r>
-            <a:r>
-              <a:rPr lang="en-ID" sz="2000" dirty="0" err="1"/>
-              <a:t>MMRp</a:t>
-            </a:r>
-            <a:r>
-              <a:rPr lang="en-ID" sz="2000" dirty="0"/>
-              <a:t> and </a:t>
-            </a:r>
-            <a:r>
-              <a:rPr lang="en-ID" sz="2000" dirty="0" err="1"/>
-              <a:t>MMRd</a:t>
-            </a:r>
-            <a:r>
-              <a:rPr lang="en-ID" sz="2000" dirty="0"/>
-              <a:t> ?</a:t>
-            </a:r>
-          </a:p>
-          <a:p>
-            <a:pPr marL="0" indent="0">
-              <a:buNone/>
-            </a:pPr>
             <a:endParaRPr lang="en-ID" dirty="0"/>
           </a:p>
         </p:txBody>
@@ -4093,7 +5003,7 @@
           <p:cNvPr id="2" name="Title 1">
             <a:extLst>
               <a:ext uri="{FF2B5EF4-FFF2-40B4-BE49-F238E27FC236}">
-                <a16:creationId xmlns:a16="http://schemas.microsoft.com/office/drawing/2014/main" id="{5709C9F6-CD43-E4F8-16BB-6188EADA7D0E}"/>
+                <a16:creationId xmlns:a16="http://schemas.microsoft.com/office/drawing/2014/main" id="{0EF6B732-5898-7290-2FE5-5C3B1CFD363A}"/>
               </a:ext>
             </a:extLst>
           </p:cNvPr>
@@ -4102,99 +5012,131 @@
           </p:cNvSpPr>
           <p:nvPr>
             <p:ph type="title"/>
+          </p:nvPr>
+        </p:nvSpPr>
+        <p:spPr/>
+        <p:txBody>
+          <a:bodyPr/>
+          <a:lstStyle/>
+          <a:p>
+            <a:r>
+              <a:rPr lang="en-US" dirty="0"/>
+              <a:t>To investigate :</a:t>
+            </a:r>
+            <a:endParaRPr lang="en-ID" dirty="0"/>
+          </a:p>
+        </p:txBody>
+      </p:sp>
+      <p:sp>
+        <p:nvSpPr>
+          <p:cNvPr id="3" name="Content Placeholder 2">
+            <a:extLst>
+              <a:ext uri="{FF2B5EF4-FFF2-40B4-BE49-F238E27FC236}">
+                <a16:creationId xmlns:a16="http://schemas.microsoft.com/office/drawing/2014/main" id="{C515B0E7-327B-BAC9-028E-7F1C9CE2A5EF}"/>
+              </a:ext>
+            </a:extLst>
+          </p:cNvPr>
+          <p:cNvSpPr>
+            <a:spLocks noGrp="1"/>
+          </p:cNvSpPr>
+          <p:nvPr>
+            <p:ph idx="1"/>
           </p:nvPr>
         </p:nvSpPr>
         <p:spPr>
           <a:xfrm>
-            <a:off x="993842" y="500062"/>
-            <a:ext cx="10515600" cy="1325563"/>
+            <a:off x="414477" y="1690688"/>
+            <a:ext cx="11564566" cy="4351338"/>
           </a:xfrm>
         </p:spPr>
         <p:txBody>
-          <a:bodyPr/>
-          <a:lstStyle/>
-          <a:p>
-            <a:r>
-              <a:rPr lang="en-ID" dirty="0"/>
-              <a:t>Result (0 vs +1)</a:t>
-            </a:r>
-          </a:p>
-        </p:txBody>
-      </p:sp>
-      <p:sp>
-        <p:nvSpPr>
-          <p:cNvPr id="3" name="Content Placeholder 2">
-            <a:extLst>
-              <a:ext uri="{FF2B5EF4-FFF2-40B4-BE49-F238E27FC236}">
-                <a16:creationId xmlns:a16="http://schemas.microsoft.com/office/drawing/2014/main" id="{441C49D0-3606-85E9-72AF-849DA0814AD3}"/>
-              </a:ext>
-            </a:extLst>
-          </p:cNvPr>
-          <p:cNvSpPr>
-            <a:spLocks noGrp="1"/>
-          </p:cNvSpPr>
-          <p:nvPr>
-            <p:ph idx="1"/>
-          </p:nvPr>
-        </p:nvSpPr>
-        <p:spPr/>
-        <p:txBody>
-          <a:bodyPr/>
-          <a:lstStyle/>
-          <a:p>
-            <a:pPr marL="0" indent="0">
+          <a:bodyPr>
+            <a:normAutofit lnSpcReduction="10000"/>
+          </a:bodyPr>
+          <a:lstStyle/>
+          <a:p>
+            <a:r>
+              <a:rPr lang="en-ID" sz="2400" dirty="0"/>
+              <a:t>Deletion rate at each marker depends on its length</a:t>
+            </a:r>
+          </a:p>
+          <a:p>
+            <a:pPr lvl="1"/>
+            <a:r>
+              <a:rPr lang="en-ID" sz="2000" dirty="0"/>
+              <a:t>↑ length ~ ↑ deletions</a:t>
+            </a:r>
+          </a:p>
+          <a:p>
+            <a:pPr lvl="1"/>
+            <a:r>
+              <a:rPr lang="en-ID" sz="2000" dirty="0"/>
+              <a:t>What about insertions? Theoretically Yes</a:t>
+            </a:r>
+          </a:p>
+          <a:p>
+            <a:endParaRPr lang="en-ID" sz="2400" dirty="0"/>
+          </a:p>
+          <a:p>
+            <a:r>
+              <a:rPr lang="en-ID" sz="2400" dirty="0"/>
+              <a:t>Spearman’s test </a:t>
+            </a:r>
+            <a:r>
+              <a:rPr lang="en-ID" sz="2000" dirty="0"/>
+              <a:t> </a:t>
+            </a:r>
+            <a:r>
+              <a:rPr lang="en-ID" sz="2400" dirty="0"/>
+              <a:t>on 0 and +1 allele frequency (per marker)</a:t>
+            </a:r>
+          </a:p>
+          <a:p>
+            <a:pPr lvl="1"/>
+            <a:r>
+              <a:rPr lang="en-ID" sz="2000" dirty="0"/>
+              <a:t>Expect each marker to have different sensitivities to mutational effects</a:t>
+            </a:r>
+          </a:p>
+          <a:p>
+            <a:pPr lvl="2"/>
+            <a:r>
+              <a:rPr lang="en-ID" sz="1600" dirty="0"/>
+              <a:t>whether by MMR or PCR</a:t>
+            </a:r>
+          </a:p>
+          <a:p>
+            <a:pPr lvl="1"/>
+            <a:r>
+              <a:rPr lang="en-US" sz="2000" dirty="0"/>
+              <a:t>We assume that the +1 allele originates from insertions in the 0 allele</a:t>
+            </a:r>
+          </a:p>
+          <a:p>
+            <a:pPr lvl="2"/>
+            <a:r>
+              <a:rPr lang="en-ID" sz="1600" dirty="0"/>
+              <a:t>(↘ 0 allele) ⟶ (↗ +1 allele)</a:t>
+            </a:r>
+            <a:endParaRPr lang="en-ID" sz="2000" dirty="0"/>
+          </a:p>
+          <a:p>
+            <a:pPr lvl="1"/>
+            <a:r>
+              <a:rPr lang="en-ID" sz="2000" dirty="0"/>
+              <a:t>Stronger negative correlation ~ marker is more prone to insertions (and vice versa)</a:t>
+            </a:r>
+          </a:p>
+          <a:p>
+            <a:pPr marL="457200" lvl="1" indent="0">
               <a:buNone/>
             </a:pPr>
-            <a:endParaRPr lang="en-ID" dirty="0"/>
-          </a:p>
-          <a:p>
-            <a:endParaRPr lang="en-ID" dirty="0"/>
-          </a:p>
-        </p:txBody>
-      </p:sp>
-      <p:sp>
-        <p:nvSpPr>
-          <p:cNvPr id="6" name="TextBox 5">
-            <a:extLst>
-              <a:ext uri="{FF2B5EF4-FFF2-40B4-BE49-F238E27FC236}">
-                <a16:creationId xmlns:a16="http://schemas.microsoft.com/office/drawing/2014/main" id="{4BC78215-EC87-78F4-E9BC-D5FDAEE7ACED}"/>
-              </a:ext>
-            </a:extLst>
-          </p:cNvPr>
-          <p:cNvSpPr txBox="1"/>
-          <p:nvPr/>
-        </p:nvSpPr>
-        <p:spPr>
-          <a:xfrm>
-            <a:off x="311756" y="2391311"/>
-            <a:ext cx="9659095" cy="3785652"/>
-          </a:xfrm>
-          <a:prstGeom prst="rect">
-            <a:avLst/>
-          </a:prstGeom>
-          <a:noFill/>
-        </p:spPr>
-        <p:txBody>
-          <a:bodyPr wrap="square" rtlCol="0">
-            <a:spAutoFit/>
-          </a:bodyPr>
-          <a:lstStyle/>
-          <a:p>
-            <a:pPr marL="342900" indent="-342900">
-              <a:buFont typeface="Arial" panose="020B0604020202020204" pitchFamily="34" charset="0"/>
-              <a:buChar char="•"/>
-            </a:pPr>
+            <a:endParaRPr lang="en-ID" sz="2000" dirty="0"/>
+          </a:p>
+          <a:p>
             <a:r>
               <a:rPr lang="en-ID" sz="2400" dirty="0"/>
-              <a:t>Different </a:t>
-            </a:r>
-            <a:r>
-              <a:rPr lang="en-ID" sz="2400" dirty="0" err="1"/>
-              <a:t>behavior</a:t>
-            </a:r>
-            <a:r>
-              <a:rPr lang="en-ID" sz="2400" dirty="0"/>
-              <a:t> in </a:t>
+              <a:t>Are markers that are more prone to insertions (in </a:t>
             </a:r>
             <a:r>
               <a:rPr lang="en-ID" sz="2400" dirty="0" err="1"/>
@@ -4202,158 +5144,42 @@
             </a:r>
             <a:r>
               <a:rPr lang="en-ID" sz="2400" dirty="0"/>
-              <a:t> and </a:t>
+              <a:t>) also more prone to deletions (in </a:t>
             </a:r>
             <a:r>
               <a:rPr lang="en-ID" sz="2400" dirty="0" err="1"/>
               <a:t>MMRd</a:t>
             </a:r>
+            <a:r>
+              <a:rPr lang="en-ID" sz="2400" dirty="0"/>
+              <a:t>)?</a:t>
+            </a:r>
+          </a:p>
+          <a:p>
+            <a:pPr lvl="1"/>
+            <a:endParaRPr lang="en-ID" sz="2000" dirty="0"/>
+          </a:p>
+          <a:p>
+            <a:pPr lvl="1"/>
+            <a:endParaRPr lang="en-ID" sz="2000" dirty="0"/>
+          </a:p>
+          <a:p>
+            <a:pPr lvl="1"/>
+            <a:endParaRPr lang="en-ID" sz="2000" dirty="0"/>
+          </a:p>
+          <a:p>
+            <a:pPr lvl="1"/>
+            <a:endParaRPr lang="en-ID" sz="2000" dirty="0"/>
+          </a:p>
+          <a:p>
             <a:endParaRPr lang="en-ID" sz="2400" dirty="0"/>
           </a:p>
-          <a:p>
-            <a:pPr marL="342900" indent="-342900">
-              <a:buFont typeface="Arial" panose="020B0604020202020204" pitchFamily="34" charset="0"/>
-              <a:buChar char="•"/>
-            </a:pPr>
-            <a:endParaRPr lang="en-ID" sz="2400" dirty="0"/>
-          </a:p>
-          <a:p>
-            <a:pPr marL="342900" indent="-342900">
-              <a:buFont typeface="Arial" panose="020B0604020202020204" pitchFamily="34" charset="0"/>
-              <a:buChar char="•"/>
-            </a:pPr>
-            <a:r>
-              <a:rPr lang="en-ID" sz="2400" dirty="0"/>
-              <a:t>Negative correlation in </a:t>
-            </a:r>
-            <a:r>
-              <a:rPr lang="en-ID" sz="2400" dirty="0" err="1"/>
-              <a:t>MMRp</a:t>
-            </a:r>
-            <a:endParaRPr lang="en-ID" sz="2400" dirty="0"/>
-          </a:p>
-          <a:p>
-            <a:pPr marL="800100" lvl="1" indent="-342900">
-              <a:buFont typeface="Arial" panose="020B0604020202020204" pitchFamily="34" charset="0"/>
-              <a:buChar char="•"/>
-            </a:pPr>
-            <a:r>
-              <a:rPr lang="en-ID" sz="2400" dirty="0"/>
-              <a:t>Deletion in +1 allele ?</a:t>
-            </a:r>
-          </a:p>
-          <a:p>
-            <a:pPr marL="800100" lvl="1" indent="-342900">
-              <a:buFont typeface="Arial" panose="020B0604020202020204" pitchFamily="34" charset="0"/>
-              <a:buChar char="•"/>
-            </a:pPr>
-            <a:r>
-              <a:rPr lang="en-ID" sz="2400" dirty="0"/>
-              <a:t>Insertion in 0 allele ?</a:t>
-            </a:r>
-          </a:p>
-          <a:p>
-            <a:pPr marL="800100" lvl="1" indent="-342900">
-              <a:buFont typeface="Arial" panose="020B0604020202020204" pitchFamily="34" charset="0"/>
-              <a:buChar char="•"/>
-            </a:pPr>
-            <a:r>
-              <a:rPr lang="en-ID" sz="2400" dirty="0"/>
-              <a:t>Due to PCR artefact or </a:t>
-            </a:r>
-            <a:r>
-              <a:rPr lang="en-ID" sz="2400" dirty="0" err="1"/>
-              <a:t>MMRd</a:t>
-            </a:r>
-            <a:r>
-              <a:rPr lang="en-ID" sz="2400" dirty="0"/>
-              <a:t> ?</a:t>
-            </a:r>
-          </a:p>
-          <a:p>
-            <a:pPr marL="800100" lvl="1" indent="-342900">
-              <a:buFont typeface="Arial" panose="020B0604020202020204" pitchFamily="34" charset="0"/>
-              <a:buChar char="•"/>
-            </a:pPr>
-            <a:endParaRPr lang="en-ID" sz="2400" dirty="0"/>
-          </a:p>
-          <a:p>
-            <a:pPr marL="342900" indent="-342900">
-              <a:buFont typeface="Arial" panose="020B0604020202020204" pitchFamily="34" charset="0"/>
-              <a:buChar char="•"/>
-            </a:pPr>
-            <a:r>
-              <a:rPr lang="en-ID" sz="2400" dirty="0"/>
-              <a:t>Positive correlation in </a:t>
-            </a:r>
-            <a:r>
-              <a:rPr lang="en-ID" sz="2400" dirty="0" err="1"/>
-              <a:t>MMRd</a:t>
-            </a:r>
-            <a:endParaRPr lang="en-ID" sz="2400" dirty="0"/>
-          </a:p>
-          <a:p>
-            <a:pPr marL="800100" lvl="1" indent="-342900">
-              <a:buFont typeface="Arial" panose="020B0604020202020204" pitchFamily="34" charset="0"/>
-              <a:buChar char="•"/>
-            </a:pPr>
-            <a:r>
-              <a:rPr lang="en-ID" sz="2400" dirty="0"/>
-              <a:t>double deletion ?</a:t>
-            </a:r>
-          </a:p>
-          <a:p>
-            <a:pPr marL="800100" lvl="1" indent="-342900">
-              <a:buFont typeface="Arial" panose="020B0604020202020204" pitchFamily="34" charset="0"/>
-              <a:buChar char="•"/>
-            </a:pPr>
-            <a:r>
-              <a:rPr lang="en-ID" sz="2400" dirty="0"/>
-              <a:t>0 allele deletion rate ∝ +1 allele double deletion rate ?</a:t>
-            </a:r>
-          </a:p>
-        </p:txBody>
-      </p:sp>
-      <p:pic>
-        <p:nvPicPr>
-          <p:cNvPr id="5" name="Picture 4" descr="A chart with green and purple squares&#10;&#10;Description automatically generated">
-            <a:extLst>
-              <a:ext uri="{FF2B5EF4-FFF2-40B4-BE49-F238E27FC236}">
-                <a16:creationId xmlns:a16="http://schemas.microsoft.com/office/drawing/2014/main" id="{740EA9B7-B3E2-D9D5-10AD-7803D0387364}"/>
-              </a:ext>
-            </a:extLst>
-          </p:cNvPr>
-          <p:cNvPicPr>
-            <a:picLocks noChangeAspect="1"/>
-          </p:cNvPicPr>
-          <p:nvPr/>
-        </p:nvPicPr>
-        <p:blipFill>
-          <a:blip r:embed="rId2">
-            <a:extLst>
-              <a:ext uri="{28A0092B-C50C-407E-A947-70E740481C1C}">
-                <a14:useLocalDpi xmlns:a14="http://schemas.microsoft.com/office/drawing/2010/main" val="0"/>
-              </a:ext>
-            </a:extLst>
-          </a:blip>
-          <a:stretch>
-            <a:fillRect/>
-          </a:stretch>
-        </p:blipFill>
-        <p:spPr>
-          <a:xfrm>
-            <a:off x="6339828" y="1134911"/>
-            <a:ext cx="5852172" cy="4389129"/>
-          </a:xfrm>
-          <a:prstGeom prst="rect">
-            <a:avLst/>
-          </a:prstGeom>
-        </p:spPr>
-      </p:pic>
+        </p:txBody>
+      </p:sp>
     </p:spTree>
     <p:extLst>
       <p:ext uri="{BB962C8B-B14F-4D97-AF65-F5344CB8AC3E}">
-        <p14:creationId xmlns:p14="http://schemas.microsoft.com/office/powerpoint/2010/main" val="577176597"/>
+        <p14:creationId xmlns:p14="http://schemas.microsoft.com/office/powerpoint/2010/main" val="851244366"/>
       </p:ext>
     </p:extLst>
   </p:cSld>
@@ -4398,7 +5224,7 @@
         </p:nvSpPr>
         <p:spPr>
           <a:xfrm>
-            <a:off x="993842" y="500062"/>
+            <a:off x="528203" y="100683"/>
             <a:ext cx="10515600" cy="1325563"/>
           </a:xfrm>
         </p:spPr>
@@ -4407,9 +5233,18 @@
           <a:lstStyle/>
           <a:p>
             <a:r>
-              <a:rPr lang="en-ID" dirty="0"/>
-              <a:t>Result (0 vs +1)</a:t>
-            </a:r>
+              <a:rPr lang="en-US" dirty="0"/>
+              <a:t>Marker length </a:t>
+            </a:r>
+            <a:r>
+              <a:rPr lang="en-ID" sz="4400" dirty="0"/>
+              <a:t>∝</a:t>
+            </a:r>
+            <a:r>
+              <a:rPr lang="en-US" dirty="0"/>
+              <a:t> Deletion rate</a:t>
+            </a:r>
+            <a:endParaRPr lang="en-ID" dirty="0"/>
           </a:p>
         </p:txBody>
       </p:sp>
@@ -4429,27 +5264,84 @@
             <p:ph idx="1"/>
           </p:nvPr>
         </p:nvSpPr>
-        <p:spPr/>
-        <p:txBody>
-          <a:bodyPr/>
-          <a:lstStyle/>
-          <a:p>
-            <a:pPr marL="0" indent="0">
+        <p:spPr>
+          <a:xfrm>
+            <a:off x="8411382" y="925170"/>
+            <a:ext cx="3673526" cy="6020915"/>
+          </a:xfrm>
+        </p:spPr>
+        <p:txBody>
+          <a:bodyPr>
+            <a:normAutofit/>
+          </a:bodyPr>
+          <a:lstStyle/>
+          <a:p>
+            <a:r>
+              <a:rPr lang="en-ID" sz="2400" dirty="0"/>
+              <a:t>Assumption</a:t>
+            </a:r>
+          </a:p>
+          <a:p>
+            <a:pPr lvl="1"/>
+            <a:r>
+              <a:rPr lang="en-ID" sz="2000" dirty="0"/>
+              <a:t>-1 allele frequency ∝ deletion rate</a:t>
+            </a:r>
+          </a:p>
+          <a:p>
+            <a:pPr marL="457200" lvl="1" indent="0">
               <a:buNone/>
             </a:pPr>
-            <a:endParaRPr lang="en-ID" dirty="0"/>
-          </a:p>
-          <a:p>
-            <a:endParaRPr lang="en-ID" dirty="0"/>
-          </a:p>
-        </p:txBody>
-      </p:sp>
-      <p:sp>
-        <p:nvSpPr>
-          <p:cNvPr id="6" name="TextBox 5">
-            <a:extLst>
-              <a:ext uri="{FF2B5EF4-FFF2-40B4-BE49-F238E27FC236}">
-                <a16:creationId xmlns:a16="http://schemas.microsoft.com/office/drawing/2014/main" id="{4BC78215-EC87-78F4-E9BC-D5FDAEE7ACED}"/>
+            <a:endParaRPr lang="en-ID" sz="2400" dirty="0"/>
+          </a:p>
+          <a:p>
+            <a:r>
+              <a:rPr lang="en-ID" sz="2400" dirty="0"/>
+              <a:t>Positive correlation in </a:t>
+            </a:r>
+            <a:r>
+              <a:rPr lang="en-ID" sz="2400" dirty="0" err="1"/>
+              <a:t>MMRd</a:t>
+            </a:r>
+            <a:r>
+              <a:rPr lang="en-ID" sz="2400" dirty="0"/>
+              <a:t> and </a:t>
+            </a:r>
+            <a:r>
+              <a:rPr lang="en-ID" sz="2400" dirty="0" err="1"/>
+              <a:t>MMRp</a:t>
+            </a:r>
+            <a:endParaRPr lang="en-ID" sz="2400" dirty="0"/>
+          </a:p>
+          <a:p>
+            <a:pPr lvl="1"/>
+            <a:r>
+              <a:rPr lang="en-ID" sz="2000" dirty="0"/>
+              <a:t>Longer markers are more prone to deletions</a:t>
+            </a:r>
+          </a:p>
+          <a:p>
+            <a:endParaRPr lang="en-ID" sz="2400" dirty="0"/>
+          </a:p>
+          <a:p>
+            <a:r>
+              <a:rPr lang="en-ID" sz="2400" dirty="0"/>
+              <a:t>More sites where slippage is possible</a:t>
+            </a:r>
+            <a:endParaRPr lang="en-ID" sz="2000" dirty="0"/>
+          </a:p>
+          <a:p>
+            <a:pPr lvl="1"/>
+            <a:endParaRPr lang="en-ID" sz="2000" dirty="0"/>
+          </a:p>
+        </p:txBody>
+      </p:sp>
+      <p:sp>
+        <p:nvSpPr>
+          <p:cNvPr id="4" name="TextBox 3">
+            <a:extLst>
+              <a:ext uri="{FF2B5EF4-FFF2-40B4-BE49-F238E27FC236}">
+                <a16:creationId xmlns:a16="http://schemas.microsoft.com/office/drawing/2014/main" id="{06250899-72A1-6453-535C-15F314850701}"/>
               </a:ext>
             </a:extLst>
           </p:cNvPr>
@@ -4458,8 +5350,8 @@
         </p:nvSpPr>
         <p:spPr>
           <a:xfrm>
-            <a:off x="380014" y="3151188"/>
-            <a:ext cx="5570236" cy="1569660"/>
+            <a:off x="380270" y="4623249"/>
+            <a:ext cx="7738119" cy="923330"/>
           </a:xfrm>
           <a:prstGeom prst="rect">
             <a:avLst/>
@@ -4472,56 +5364,40 @@
           </a:bodyPr>
           <a:lstStyle/>
           <a:p>
-            <a:pPr marL="342900" indent="-342900">
-              <a:buFont typeface="Arial" panose="020B0604020202020204" pitchFamily="34" charset="0"/>
-              <a:buChar char="•"/>
-            </a:pPr>
-            <a:r>
-              <a:rPr lang="en-ID" sz="2400" dirty="0"/>
-              <a:t>Slight negative correlation in marker behaviour between </a:t>
-            </a:r>
-            <a:r>
-              <a:rPr lang="en-ID" sz="2400" dirty="0" err="1"/>
+            <a:r>
+              <a:rPr lang="en-US" b="1" dirty="0"/>
+              <a:t>Figure 2. </a:t>
+            </a:r>
+            <a:r>
+              <a:rPr lang="en-US" dirty="0"/>
+              <a:t>Average frequencies of the main deletion allele (-1) for each marker, plotted against its length in </a:t>
+            </a:r>
+            <a:r>
+              <a:rPr lang="en-US" dirty="0" err="1"/>
+              <a:t>MMRd</a:t>
+            </a:r>
+            <a:r>
+              <a:rPr lang="en-US" dirty="0"/>
+              <a:t> samples (spearman correlation : 0.66) and in </a:t>
+            </a:r>
+            <a:r>
+              <a:rPr lang="en-US" dirty="0" err="1"/>
               <a:t>MMRp</a:t>
             </a:r>
             <a:r>
-              <a:rPr lang="en-ID" sz="2400" dirty="0"/>
-              <a:t> and </a:t>
-            </a:r>
-            <a:r>
-              <a:rPr lang="en-ID" sz="2400" dirty="0" err="1"/>
-              <a:t>MMRd</a:t>
-            </a:r>
-            <a:endParaRPr lang="en-ID" sz="2400" dirty="0"/>
-          </a:p>
-          <a:p>
-            <a:pPr marL="800100" lvl="1" indent="-342900">
-              <a:buFont typeface="Arial" panose="020B0604020202020204" pitchFamily="34" charset="0"/>
-              <a:buChar char="•"/>
-            </a:pPr>
-            <a:r>
-              <a:rPr lang="en-ID" sz="2400" dirty="0"/>
-              <a:t>not significant</a:t>
-            </a:r>
-          </a:p>
-          <a:p>
-            <a:pPr marL="800100" lvl="1" indent="-342900">
-              <a:buFont typeface="Arial" panose="020B0604020202020204" pitchFamily="34" charset="0"/>
-              <a:buChar char="•"/>
-            </a:pPr>
-            <a:r>
-              <a:rPr lang="en-ID" sz="2400" dirty="0"/>
-              <a:t>Spearman correlation : -0.03</a:t>
-            </a:r>
+              <a:rPr lang="en-US" dirty="0"/>
+              <a:t> samples (spearman correlation: 0.80)</a:t>
+            </a:r>
+            <a:endParaRPr lang="en-ID" dirty="0"/>
           </a:p>
         </p:txBody>
       </p:sp>
       <p:pic>
         <p:nvPicPr>
-          <p:cNvPr id="7" name="Picture 6" descr="A graph with black dots and a blue line&#10;&#10;Description automatically generated">
-            <a:extLst>
-              <a:ext uri="{FF2B5EF4-FFF2-40B4-BE49-F238E27FC236}">
-                <a16:creationId xmlns:a16="http://schemas.microsoft.com/office/drawing/2014/main" id="{A4FE4323-EB22-061A-3F61-D1E75D75C4C5}"/>
+          <p:cNvPr id="8" name="Picture 7" descr="A graph with a line and dots&#10;&#10;Description automatically generated">
+            <a:extLst>
+              <a:ext uri="{FF2B5EF4-FFF2-40B4-BE49-F238E27FC236}">
+                <a16:creationId xmlns:a16="http://schemas.microsoft.com/office/drawing/2014/main" id="{8BAFD026-1C2C-D5E4-E854-DB2BC30AA6FD}"/>
               </a:ext>
             </a:extLst>
           </p:cNvPr>
@@ -4531,7 +5407,7 @@
           <p:nvPr/>
         </p:nvPicPr>
         <p:blipFill>
-          <a:blip r:embed="rId2">
+          <a:blip r:embed="rId3">
             <a:extLst>
               <a:ext uri="{28A0092B-C50C-407E-A947-70E740481C1C}">
                 <a14:useLocalDpi xmlns:a14="http://schemas.microsoft.com/office/drawing/2010/main" val="0"/>
@@ -4544,8 +5420,44 @@
         </p:blipFill>
         <p:spPr>
           <a:xfrm>
-            <a:off x="5959814" y="767508"/>
-            <a:ext cx="5852172" cy="4389129"/>
+            <a:off x="206927" y="1525704"/>
+            <a:ext cx="3864840" cy="2898630"/>
+          </a:xfrm>
+          <a:prstGeom prst="rect">
+            <a:avLst/>
+          </a:prstGeom>
+        </p:spPr>
+      </p:pic>
+      <p:pic>
+        <p:nvPicPr>
+          <p:cNvPr id="10" name="Picture 9" descr="A graph with a line and dots&#10;&#10;Description automatically generated">
+            <a:extLst>
+              <a:ext uri="{FF2B5EF4-FFF2-40B4-BE49-F238E27FC236}">
+                <a16:creationId xmlns:a16="http://schemas.microsoft.com/office/drawing/2014/main" id="{B7EA111D-E2A9-CFE0-BDD3-C5F5E372D64E}"/>
+              </a:ext>
+            </a:extLst>
+          </p:cNvPr>
+          <p:cNvPicPr>
+            <a:picLocks noChangeAspect="1"/>
+          </p:cNvPicPr>
+          <p:nvPr/>
+        </p:nvPicPr>
+        <p:blipFill>
+          <a:blip r:embed="rId4">
+            <a:extLst>
+              <a:ext uri="{28A0092B-C50C-407E-A947-70E740481C1C}">
+                <a14:useLocalDpi xmlns:a14="http://schemas.microsoft.com/office/drawing/2010/main" val="0"/>
+              </a:ext>
+            </a:extLst>
+          </a:blip>
+          <a:stretch>
+            <a:fillRect/>
+          </a:stretch>
+        </p:blipFill>
+        <p:spPr>
+          <a:xfrm>
+            <a:off x="4253549" y="1525704"/>
+            <a:ext cx="3864840" cy="2898630"/>
           </a:xfrm>
           <a:prstGeom prst="rect">
             <a:avLst/>
@@ -4555,7 +5467,7 @@
     </p:spTree>
     <p:extLst>
       <p:ext uri="{BB962C8B-B14F-4D97-AF65-F5344CB8AC3E}">
-        <p14:creationId xmlns:p14="http://schemas.microsoft.com/office/powerpoint/2010/main" val="1643746320"/>
+        <p14:creationId xmlns:p14="http://schemas.microsoft.com/office/powerpoint/2010/main" val="3958604140"/>
       </p:ext>
     </p:extLst>
   </p:cSld>
@@ -4600,7 +5512,7 @@
         </p:nvSpPr>
         <p:spPr>
           <a:xfrm>
-            <a:off x="1023025" y="1301749"/>
+            <a:off x="528203" y="100683"/>
             <a:ext cx="10515600" cy="1325563"/>
           </a:xfrm>
         </p:spPr>
@@ -4609,9 +5521,18 @@
           <a:lstStyle/>
           <a:p>
             <a:r>
-              <a:rPr lang="en-ID" dirty="0"/>
-              <a:t>Result (-1 vs +1)</a:t>
-            </a:r>
+              <a:rPr lang="en-US" dirty="0"/>
+              <a:t>Marker length </a:t>
+            </a:r>
+            <a:r>
+              <a:rPr lang="en-ID" sz="4400" dirty="0"/>
+              <a:t>∝</a:t>
+            </a:r>
+            <a:r>
+              <a:rPr lang="en-US" dirty="0"/>
+              <a:t> Insertion rate</a:t>
+            </a:r>
+            <a:endParaRPr lang="en-ID" dirty="0"/>
           </a:p>
         </p:txBody>
       </p:sp>
@@ -4631,27 +5552,80 @@
             <p:ph idx="1"/>
           </p:nvPr>
         </p:nvSpPr>
-        <p:spPr/>
-        <p:txBody>
-          <a:bodyPr/>
-          <a:lstStyle/>
-          <a:p>
-            <a:pPr marL="0" indent="0">
+        <p:spPr>
+          <a:xfrm>
+            <a:off x="8424562" y="948296"/>
+            <a:ext cx="3673526" cy="6020915"/>
+          </a:xfrm>
+        </p:spPr>
+        <p:txBody>
+          <a:bodyPr>
+            <a:normAutofit/>
+          </a:bodyPr>
+          <a:lstStyle/>
+          <a:p>
+            <a:r>
+              <a:rPr lang="en-ID" sz="2400" dirty="0"/>
+              <a:t>Assumption</a:t>
+            </a:r>
+          </a:p>
+          <a:p>
+            <a:pPr lvl="1"/>
+            <a:r>
+              <a:rPr lang="en-ID" sz="2000" dirty="0"/>
+              <a:t>+1 allele frequency ∝ insertion rate</a:t>
+            </a:r>
+          </a:p>
+          <a:p>
+            <a:pPr marL="457200" lvl="1" indent="0">
               <a:buNone/>
             </a:pPr>
-            <a:endParaRPr lang="en-ID" dirty="0"/>
-          </a:p>
-          <a:p>
-            <a:endParaRPr lang="en-ID" dirty="0"/>
-          </a:p>
-        </p:txBody>
-      </p:sp>
-      <p:sp>
-        <p:nvSpPr>
-          <p:cNvPr id="6" name="TextBox 5">
-            <a:extLst>
-              <a:ext uri="{FF2B5EF4-FFF2-40B4-BE49-F238E27FC236}">
-                <a16:creationId xmlns:a16="http://schemas.microsoft.com/office/drawing/2014/main" id="{4BC78215-EC87-78F4-E9BC-D5FDAEE7ACED}"/>
+            <a:endParaRPr lang="en-ID" sz="2400" dirty="0"/>
+          </a:p>
+          <a:p>
+            <a:r>
+              <a:rPr lang="en-ID" sz="2400" dirty="0"/>
+              <a:t>Positive correlation in </a:t>
+            </a:r>
+            <a:r>
+              <a:rPr lang="en-ID" sz="2400" dirty="0" err="1"/>
+              <a:t>MMRd</a:t>
+            </a:r>
+            <a:r>
+              <a:rPr lang="en-ID" sz="2400" dirty="0"/>
+              <a:t> and </a:t>
+            </a:r>
+            <a:r>
+              <a:rPr lang="en-ID" sz="2400" dirty="0" err="1"/>
+              <a:t>MMRp</a:t>
+            </a:r>
+            <a:endParaRPr lang="en-ID" sz="2400" dirty="0"/>
+          </a:p>
+          <a:p>
+            <a:pPr lvl="1"/>
+            <a:r>
+              <a:rPr lang="en-ID" sz="2000" dirty="0"/>
+              <a:t>Longer markers are more prone to insertions</a:t>
+            </a:r>
+          </a:p>
+          <a:p>
+            <a:endParaRPr lang="en-ID" sz="2400" dirty="0"/>
+          </a:p>
+          <a:p>
+            <a:r>
+              <a:rPr lang="en-ID" sz="2400" dirty="0"/>
+              <a:t>Same mechanism to deletions</a:t>
+            </a:r>
+            <a:endParaRPr lang="en-ID" sz="2000" dirty="0"/>
+          </a:p>
+        </p:txBody>
+      </p:sp>
+      <p:sp>
+        <p:nvSpPr>
+          <p:cNvPr id="4" name="TextBox 3">
+            <a:extLst>
+              <a:ext uri="{FF2B5EF4-FFF2-40B4-BE49-F238E27FC236}">
+                <a16:creationId xmlns:a16="http://schemas.microsoft.com/office/drawing/2014/main" id="{06250899-72A1-6453-535C-15F314850701}"/>
               </a:ext>
             </a:extLst>
           </p:cNvPr>
@@ -4660,8 +5634,8 @@
         </p:nvSpPr>
         <p:spPr>
           <a:xfrm>
-            <a:off x="369484" y="3429000"/>
-            <a:ext cx="9864013" cy="2308324"/>
+            <a:off x="375464" y="4301974"/>
+            <a:ext cx="7738119" cy="923330"/>
           </a:xfrm>
           <a:prstGeom prst="rect">
             <a:avLst/>
@@ -4674,95 +5648,40 @@
           </a:bodyPr>
           <a:lstStyle/>
           <a:p>
-            <a:pPr marL="342900" indent="-342900">
-              <a:buFont typeface="Arial" panose="020B0604020202020204" pitchFamily="34" charset="0"/>
-              <a:buChar char="•"/>
-            </a:pPr>
-            <a:r>
-              <a:rPr lang="en-ID" sz="2400" dirty="0"/>
-              <a:t>Different </a:t>
-            </a:r>
-            <a:r>
-              <a:rPr lang="en-ID" sz="2400" dirty="0" err="1"/>
-              <a:t>behavior</a:t>
-            </a:r>
-            <a:r>
-              <a:rPr lang="en-ID" sz="2400" dirty="0"/>
-              <a:t> in </a:t>
-            </a:r>
-            <a:r>
-              <a:rPr lang="en-ID" sz="2400" dirty="0" err="1"/>
+            <a:r>
+              <a:rPr lang="en-US" b="1" dirty="0"/>
+              <a:t>Figure 3. </a:t>
+            </a:r>
+            <a:r>
+              <a:rPr lang="en-US" dirty="0"/>
+              <a:t>Average frequencies of the main insertion allele (+1) for each marker, plotted against its length in </a:t>
+            </a:r>
+            <a:r>
+              <a:rPr lang="en-US" dirty="0" err="1"/>
+              <a:t>MMRd</a:t>
+            </a:r>
+            <a:r>
+              <a:rPr lang="en-US" dirty="0"/>
+              <a:t> samples (spearman correlation : 0.54) and in </a:t>
+            </a:r>
+            <a:r>
+              <a:rPr lang="en-US" dirty="0" err="1"/>
               <a:t>MMRp</a:t>
             </a:r>
             <a:r>
-              <a:rPr lang="en-ID" sz="2400" dirty="0"/>
-              <a:t> and </a:t>
-            </a:r>
-            <a:r>
-              <a:rPr lang="en-ID" sz="2400" dirty="0" err="1"/>
-              <a:t>MMRd</a:t>
-            </a:r>
-            <a:endParaRPr lang="en-ID" sz="2400" dirty="0"/>
-          </a:p>
-          <a:p>
-            <a:pPr marL="342900" indent="-342900">
-              <a:buFont typeface="Arial" panose="020B0604020202020204" pitchFamily="34" charset="0"/>
-              <a:buChar char="•"/>
-            </a:pPr>
-            <a:endParaRPr lang="en-ID" sz="2400" dirty="0"/>
-          </a:p>
-          <a:p>
-            <a:pPr marL="342900" indent="-342900">
-              <a:buFont typeface="Arial" panose="020B0604020202020204" pitchFamily="34" charset="0"/>
-              <a:buChar char="•"/>
-            </a:pPr>
-            <a:r>
-              <a:rPr lang="en-ID" sz="2400" dirty="0"/>
-              <a:t>No significant correlation in </a:t>
-            </a:r>
-            <a:r>
-              <a:rPr lang="en-ID" sz="2400" dirty="0" err="1"/>
-              <a:t>MMRp</a:t>
-            </a:r>
-            <a:endParaRPr lang="en-ID" sz="2400" dirty="0"/>
-          </a:p>
-          <a:p>
-            <a:pPr lvl="1"/>
-            <a:endParaRPr lang="en-ID" sz="2400" dirty="0"/>
-          </a:p>
-          <a:p>
-            <a:pPr marL="342900" indent="-342900">
-              <a:buFont typeface="Arial" panose="020B0604020202020204" pitchFamily="34" charset="0"/>
-              <a:buChar char="•"/>
-            </a:pPr>
-            <a:r>
-              <a:rPr lang="en-ID" sz="2400" dirty="0"/>
-              <a:t>Negative correlation in </a:t>
-            </a:r>
-            <a:r>
-              <a:rPr lang="en-ID" sz="2400" dirty="0" err="1"/>
-              <a:t>MMRd</a:t>
-            </a:r>
-            <a:endParaRPr lang="en-ID" sz="2400" dirty="0"/>
-          </a:p>
-          <a:p>
-            <a:pPr marL="800100" lvl="1" indent="-342900">
-              <a:buFont typeface="Arial" panose="020B0604020202020204" pitchFamily="34" charset="0"/>
-              <a:buChar char="•"/>
-            </a:pPr>
-            <a:r>
-              <a:rPr lang="en-ID" sz="2400" dirty="0"/>
-              <a:t>More evidence for double deletion at +1 allele</a:t>
-            </a:r>
+              <a:rPr lang="en-US" dirty="0"/>
+              <a:t> samples (spearman correlation: 0.67)</a:t>
+            </a:r>
+            <a:endParaRPr lang="en-ID" dirty="0"/>
           </a:p>
         </p:txBody>
       </p:sp>
       <p:pic>
         <p:nvPicPr>
-          <p:cNvPr id="7" name="Picture 6" descr="A chart of different colored squares&#10;&#10;Description automatically generated">
-            <a:extLst>
-              <a:ext uri="{FF2B5EF4-FFF2-40B4-BE49-F238E27FC236}">
-                <a16:creationId xmlns:a16="http://schemas.microsoft.com/office/drawing/2014/main" id="{10D205C9-F119-B448-3FED-BB1A7D044D77}"/>
+          <p:cNvPr id="6" name="Picture 5" descr="A graph with a line and dots&#10;&#10;Description automatically generated">
+            <a:extLst>
+              <a:ext uri="{FF2B5EF4-FFF2-40B4-BE49-F238E27FC236}">
+                <a16:creationId xmlns:a16="http://schemas.microsoft.com/office/drawing/2014/main" id="{5399777F-25FC-C48B-65A7-A217158E9D94}"/>
               </a:ext>
             </a:extLst>
           </p:cNvPr>
@@ -4772,7 +5691,7 @@
           <p:nvPr/>
         </p:nvPicPr>
         <p:blipFill>
-          <a:blip r:embed="rId2">
+          <a:blip r:embed="rId3">
             <a:extLst>
               <a:ext uri="{28A0092B-C50C-407E-A947-70E740481C1C}">
                 <a14:useLocalDpi xmlns:a14="http://schemas.microsoft.com/office/drawing/2010/main" val="0"/>
@@ -4785,8 +5704,44 @@
         </p:blipFill>
         <p:spPr>
           <a:xfrm>
-            <a:off x="6280825" y="794796"/>
-            <a:ext cx="5852172" cy="4389129"/>
+            <a:off x="380270" y="1311421"/>
+            <a:ext cx="3864254" cy="2898191"/>
+          </a:xfrm>
+          <a:prstGeom prst="rect">
+            <a:avLst/>
+          </a:prstGeom>
+        </p:spPr>
+      </p:pic>
+      <p:pic>
+        <p:nvPicPr>
+          <p:cNvPr id="9" name="Picture 8" descr="A graph with a line and dots&#10;&#10;Description automatically generated">
+            <a:extLst>
+              <a:ext uri="{FF2B5EF4-FFF2-40B4-BE49-F238E27FC236}">
+                <a16:creationId xmlns:a16="http://schemas.microsoft.com/office/drawing/2014/main" id="{0B52446B-EC47-60F2-676E-08002B1BFD6C}"/>
+              </a:ext>
+            </a:extLst>
+          </p:cNvPr>
+          <p:cNvPicPr>
+            <a:picLocks noChangeAspect="1"/>
+          </p:cNvPicPr>
+          <p:nvPr/>
+        </p:nvPicPr>
+        <p:blipFill>
+          <a:blip r:embed="rId4">
+            <a:extLst>
+              <a:ext uri="{28A0092B-C50C-407E-A947-70E740481C1C}">
+                <a14:useLocalDpi xmlns:a14="http://schemas.microsoft.com/office/drawing/2010/main" val="0"/>
+              </a:ext>
+            </a:extLst>
+          </a:blip>
+          <a:stretch>
+            <a:fillRect/>
+          </a:stretch>
+        </p:blipFill>
+        <p:spPr>
+          <a:xfrm>
+            <a:off x="4402416" y="1311421"/>
+            <a:ext cx="3864254" cy="2898191"/>
           </a:xfrm>
           <a:prstGeom prst="rect">
             <a:avLst/>
@@ -4796,7 +5751,7 @@
     </p:spTree>
     <p:extLst>
       <p:ext uri="{BB962C8B-B14F-4D97-AF65-F5344CB8AC3E}">
-        <p14:creationId xmlns:p14="http://schemas.microsoft.com/office/powerpoint/2010/main" val="4112913871"/>
+        <p14:creationId xmlns:p14="http://schemas.microsoft.com/office/powerpoint/2010/main" val="1267844067"/>
       </p:ext>
     </p:extLst>
   </p:cSld>
@@ -4841,7 +5796,7 @@
         </p:nvSpPr>
         <p:spPr>
           <a:xfrm>
-            <a:off x="945204" y="1301749"/>
+            <a:off x="614699" y="80863"/>
             <a:ext cx="10515600" cy="1325563"/>
           </a:xfrm>
         </p:spPr>
@@ -4851,7 +5806,7 @@
           <a:p>
             <a:r>
               <a:rPr lang="en-ID" dirty="0"/>
-              <a:t>Result (-1 vs +1)</a:t>
+              <a:t>Result (0 vs -1)</a:t>
             </a:r>
           </a:p>
         </p:txBody>
@@ -4901,8 +5856,8 @@
         </p:nvSpPr>
         <p:spPr>
           <a:xfrm>
-            <a:off x="350029" y="3424136"/>
-            <a:ext cx="9864013" cy="1200329"/>
+            <a:off x="303649" y="1954580"/>
+            <a:ext cx="11137700" cy="4093428"/>
           </a:xfrm>
           <a:prstGeom prst="rect">
             <a:avLst/>
@@ -4921,8 +5876,54 @@
             </a:pPr>
             <a:r>
               <a:rPr lang="en-ID" sz="2400" dirty="0"/>
-              <a:t>Slight negative correlation also observed</a:t>
-            </a:r>
+              <a:t>Different </a:t>
+            </a:r>
+            <a:r>
+              <a:rPr lang="en-ID" sz="2400" dirty="0" err="1"/>
+              <a:t>behavior</a:t>
+            </a:r>
+            <a:r>
+              <a:rPr lang="en-ID" sz="2400" dirty="0"/>
+              <a:t> in </a:t>
+            </a:r>
+            <a:r>
+              <a:rPr lang="en-ID" sz="2400" dirty="0" err="1"/>
+              <a:t>MMRp</a:t>
+            </a:r>
+            <a:r>
+              <a:rPr lang="en-ID" sz="2400" dirty="0"/>
+              <a:t> and </a:t>
+            </a:r>
+            <a:r>
+              <a:rPr lang="en-ID" sz="2400" dirty="0" err="1"/>
+              <a:t>MMRd</a:t>
+            </a:r>
+            <a:endParaRPr lang="en-ID" sz="2400" dirty="0"/>
+          </a:p>
+          <a:p>
+            <a:endParaRPr lang="en-ID" sz="2400" dirty="0"/>
+          </a:p>
+          <a:p>
+            <a:pPr marL="342900" indent="-342900">
+              <a:buFont typeface="Arial" panose="020B0604020202020204" pitchFamily="34" charset="0"/>
+              <a:buChar char="•"/>
+            </a:pPr>
+            <a:endParaRPr lang="en-ID" sz="2400" dirty="0"/>
+          </a:p>
+          <a:p>
+            <a:pPr marL="342900" indent="-342900">
+              <a:buFont typeface="Arial" panose="020B0604020202020204" pitchFamily="34" charset="0"/>
+              <a:buChar char="•"/>
+            </a:pPr>
+            <a:r>
+              <a:rPr lang="en-ID" sz="2400" dirty="0"/>
+              <a:t>Negative correlation in </a:t>
+            </a:r>
+            <a:r>
+              <a:rPr lang="en-ID" sz="2400" dirty="0" err="1"/>
+              <a:t>MMRp</a:t>
+            </a:r>
+            <a:endParaRPr lang="en-ID" sz="2400" dirty="0"/>
           </a:p>
           <a:p>
             <a:pPr marL="800100" lvl="1" indent="-342900">
@@ -4931,8 +5932,31 @@
             </a:pPr>
             <a:r>
               <a:rPr lang="en-ID" sz="2400" dirty="0"/>
-              <a:t>Not significant</a:t>
-            </a:r>
+              <a:t>Supports hypothesis 3</a:t>
+            </a:r>
+          </a:p>
+          <a:p>
+            <a:pPr lvl="1"/>
+            <a:endParaRPr lang="en-ID" sz="2400" dirty="0"/>
+          </a:p>
+          <a:p>
+            <a:pPr lvl="1"/>
+            <a:endParaRPr lang="en-ID" sz="2400" dirty="0"/>
+          </a:p>
+          <a:p>
+            <a:pPr marL="342900" indent="-342900">
+              <a:buFont typeface="Arial" panose="020B0604020202020204" pitchFamily="34" charset="0"/>
+              <a:buChar char="•"/>
+            </a:pPr>
+            <a:r>
+              <a:rPr lang="en-ID" sz="2400" dirty="0"/>
+              <a:t>Positive, but weaker correlation in </a:t>
+            </a:r>
+            <a:r>
+              <a:rPr lang="en-ID" sz="2400" dirty="0" err="1"/>
+              <a:t>MMRd</a:t>
+            </a:r>
+            <a:endParaRPr lang="en-ID" sz="2400" dirty="0"/>
           </a:p>
           <a:p>
             <a:pPr marL="800100" lvl="1" indent="-342900">
@@ -4941,17 +5965,37 @@
             </a:pPr>
             <a:r>
               <a:rPr lang="en-ID" sz="2400" dirty="0"/>
-              <a:t>Spearman correlation : -0.01</a:t>
+              <a:t>Evidence against hypothesis 1</a:t>
+            </a:r>
+          </a:p>
+          <a:p>
+            <a:pPr marL="800100" lvl="1" indent="-342900">
+              <a:buFont typeface="Arial" panose="020B0604020202020204" pitchFamily="34" charset="0"/>
+              <a:buChar char="•"/>
+            </a:pPr>
+            <a:r>
+              <a:rPr lang="en-ID" sz="2400" dirty="0"/>
+              <a:t>Could be explained by double deletion ?</a:t>
+            </a:r>
+          </a:p>
+          <a:p>
+            <a:pPr marL="1257300" lvl="2" indent="-342900">
+              <a:buFont typeface="Arial" panose="020B0604020202020204" pitchFamily="34" charset="0"/>
+              <a:buChar char="•"/>
+            </a:pPr>
+            <a:r>
+              <a:rPr lang="en-ID" sz="2000" dirty="0"/>
+              <a:t>0 allele deletion rate ∝ +1 allele double deletion rate ?</a:t>
             </a:r>
           </a:p>
         </p:txBody>
       </p:sp>
       <p:pic>
         <p:nvPicPr>
-          <p:cNvPr id="5" name="Picture 4" descr="A graph with black dots and a blue line&#10;&#10;Description automatically generated">
-            <a:extLst>
-              <a:ext uri="{FF2B5EF4-FFF2-40B4-BE49-F238E27FC236}">
-                <a16:creationId xmlns:a16="http://schemas.microsoft.com/office/drawing/2014/main" id="{79254698-9FA2-4685-424A-F3C9C9951A58}"/>
+          <p:cNvPr id="5" name="Picture 4" descr="A chart with green and purple squares&#10;&#10;Description automatically generated">
+            <a:extLst>
+              <a:ext uri="{FF2B5EF4-FFF2-40B4-BE49-F238E27FC236}">
+                <a16:creationId xmlns:a16="http://schemas.microsoft.com/office/drawing/2014/main" id="{740EA9B7-B3E2-D9D5-10AD-7803D0387364}"/>
               </a:ext>
             </a:extLst>
           </p:cNvPr>
@@ -4961,7 +6005,7 @@
           <p:nvPr/>
         </p:nvPicPr>
         <p:blipFill>
-          <a:blip r:embed="rId2">
+          <a:blip r:embed="rId3">
             <a:extLst>
               <a:ext uri="{28A0092B-C50C-407E-A947-70E740481C1C}">
                 <a14:useLocalDpi xmlns:a14="http://schemas.microsoft.com/office/drawing/2010/main" val="0"/>
@@ -4974,18 +6018,70 @@
         </p:blipFill>
         <p:spPr>
           <a:xfrm>
-            <a:off x="6203004" y="553498"/>
-            <a:ext cx="5852172" cy="4389129"/>
+            <a:off x="6953934" y="486722"/>
+            <a:ext cx="4876800" cy="3657600"/>
           </a:xfrm>
           <a:prstGeom prst="rect">
             <a:avLst/>
           </a:prstGeom>
         </p:spPr>
       </p:pic>
+      <p:sp>
+        <p:nvSpPr>
+          <p:cNvPr id="4" name="TextBox 3">
+            <a:extLst>
+              <a:ext uri="{FF2B5EF4-FFF2-40B4-BE49-F238E27FC236}">
+                <a16:creationId xmlns:a16="http://schemas.microsoft.com/office/drawing/2014/main" id="{06250899-72A1-6453-535C-15F314850701}"/>
+              </a:ext>
+            </a:extLst>
+          </p:cNvPr>
+          <p:cNvSpPr txBox="1"/>
+          <p:nvPr/>
+        </p:nvSpPr>
+        <p:spPr>
+          <a:xfrm>
+            <a:off x="6896317" y="4155649"/>
+            <a:ext cx="4992034" cy="923330"/>
+          </a:xfrm>
+          <a:prstGeom prst="rect">
+            <a:avLst/>
+          </a:prstGeom>
+          <a:noFill/>
+        </p:spPr>
+        <p:txBody>
+          <a:bodyPr wrap="square" rtlCol="0">
+            <a:spAutoFit/>
+          </a:bodyPr>
+          <a:lstStyle/>
+          <a:p>
+            <a:r>
+              <a:rPr lang="en-US" dirty="0"/>
+              <a:t>Figure 4. Spearman coefficient (per marker) between 0 and +1 allele frequencies in </a:t>
+            </a:r>
+            <a:r>
+              <a:rPr lang="en-US" dirty="0" err="1"/>
+              <a:t>MMRd</a:t>
+            </a:r>
+            <a:r>
+              <a:rPr lang="en-US" dirty="0"/>
+              <a:t> and </a:t>
+            </a:r>
+            <a:r>
+              <a:rPr lang="en-US" dirty="0" err="1"/>
+              <a:t>MMRp</a:t>
+            </a:r>
+            <a:r>
+              <a:rPr lang="en-US" dirty="0"/>
+              <a:t> samples.</a:t>
+            </a:r>
+            <a:endParaRPr lang="en-ID" dirty="0"/>
+          </a:p>
+        </p:txBody>
+      </p:sp>
     </p:spTree>
     <p:extLst>
       <p:ext uri="{BB962C8B-B14F-4D97-AF65-F5344CB8AC3E}">
-        <p14:creationId xmlns:p14="http://schemas.microsoft.com/office/powerpoint/2010/main" val="3295337728"/>
+        <p14:creationId xmlns:p14="http://schemas.microsoft.com/office/powerpoint/2010/main" val="3438255030"/>
       </p:ext>
     </p:extLst>
   </p:cSld>
@@ -5017,7 +6113,7 @@
           <p:cNvPr id="2" name="Title 1">
             <a:extLst>
               <a:ext uri="{FF2B5EF4-FFF2-40B4-BE49-F238E27FC236}">
-                <a16:creationId xmlns:a16="http://schemas.microsoft.com/office/drawing/2014/main" id="{53844053-28A2-4C86-8EE6-C50E4EB8B309}"/>
+                <a16:creationId xmlns:a16="http://schemas.microsoft.com/office/drawing/2014/main" id="{5709C9F6-CD43-E4F8-16BB-6188EADA7D0E}"/>
               </a:ext>
             </a:extLst>
           </p:cNvPr>
@@ -5028,133 +6124,704 @@
             <p:ph type="title"/>
           </p:nvPr>
         </p:nvSpPr>
+        <p:spPr>
+          <a:xfrm>
+            <a:off x="614699" y="80863"/>
+            <a:ext cx="10515600" cy="1325563"/>
+          </a:xfrm>
+        </p:spPr>
+        <p:txBody>
+          <a:bodyPr/>
+          <a:lstStyle/>
+          <a:p>
+            <a:r>
+              <a:rPr lang="en-ID" dirty="0"/>
+              <a:t>Result (0 vs -1)</a:t>
+            </a:r>
+          </a:p>
+        </p:txBody>
+      </p:sp>
+      <p:sp>
+        <p:nvSpPr>
+          <p:cNvPr id="3" name="Content Placeholder 2">
+            <a:extLst>
+              <a:ext uri="{FF2B5EF4-FFF2-40B4-BE49-F238E27FC236}">
+                <a16:creationId xmlns:a16="http://schemas.microsoft.com/office/drawing/2014/main" id="{441C49D0-3606-85E9-72AF-849DA0814AD3}"/>
+              </a:ext>
+            </a:extLst>
+          </p:cNvPr>
+          <p:cNvSpPr>
+            <a:spLocks noGrp="1"/>
+          </p:cNvSpPr>
+          <p:nvPr>
+            <p:ph idx="1"/>
+          </p:nvPr>
+        </p:nvSpPr>
         <p:spPr/>
         <p:txBody>
           <a:bodyPr/>
           <a:lstStyle/>
           <a:p>
-            <a:r>
-              <a:rPr lang="en-ID" dirty="0"/>
-              <a:t>Conclusion</a:t>
-            </a:r>
-          </a:p>
-        </p:txBody>
-      </p:sp>
-      <p:sp>
-        <p:nvSpPr>
-          <p:cNvPr id="3" name="Content Placeholder 2">
-            <a:extLst>
-              <a:ext uri="{FF2B5EF4-FFF2-40B4-BE49-F238E27FC236}">
-                <a16:creationId xmlns:a16="http://schemas.microsoft.com/office/drawing/2014/main" id="{ED794B28-7BEE-48E2-4202-C812195DA93C}"/>
-              </a:ext>
-            </a:extLst>
-          </p:cNvPr>
-          <p:cNvSpPr>
-            <a:spLocks noGrp="1"/>
-          </p:cNvSpPr>
-          <p:nvPr>
-            <p:ph idx="1"/>
-          </p:nvPr>
-        </p:nvSpPr>
-        <p:spPr/>
-        <p:txBody>
-          <a:bodyPr/>
-          <a:lstStyle/>
-          <a:p>
+            <a:pPr marL="0" indent="0">
+              <a:buNone/>
+            </a:pPr>
+            <a:endParaRPr lang="en-ID" dirty="0"/>
+          </a:p>
+          <a:p>
+            <a:endParaRPr lang="en-ID" dirty="0"/>
+          </a:p>
+        </p:txBody>
+      </p:sp>
+      <p:sp>
+        <p:nvSpPr>
+          <p:cNvPr id="6" name="TextBox 5">
+            <a:extLst>
+              <a:ext uri="{FF2B5EF4-FFF2-40B4-BE49-F238E27FC236}">
+                <a16:creationId xmlns:a16="http://schemas.microsoft.com/office/drawing/2014/main" id="{4BC78215-EC87-78F4-E9BC-D5FDAEE7ACED}"/>
+              </a:ext>
+            </a:extLst>
+          </p:cNvPr>
+          <p:cNvSpPr txBox="1"/>
+          <p:nvPr/>
+        </p:nvSpPr>
+        <p:spPr>
+          <a:xfrm>
+            <a:off x="216100" y="1825625"/>
+            <a:ext cx="5879900" cy="3170099"/>
+          </a:xfrm>
+          <a:prstGeom prst="rect">
+            <a:avLst/>
+          </a:prstGeom>
+          <a:noFill/>
+        </p:spPr>
+        <p:txBody>
+          <a:bodyPr wrap="square" rtlCol="0">
+            <a:spAutoFit/>
+          </a:bodyPr>
+          <a:lstStyle/>
+          <a:p>
+            <a:pPr marL="342900" indent="-342900">
+              <a:buFont typeface="Arial" panose="020B0604020202020204" pitchFamily="34" charset="0"/>
+              <a:buChar char="•"/>
+            </a:pPr>
             <a:r>
               <a:rPr lang="en-ID" sz="2400" dirty="0"/>
-              <a:t>+1 allele negative or no correlation with other mutant alleles</a:t>
-            </a:r>
-          </a:p>
-          <a:p>
-            <a:pPr lvl="1"/>
+              <a:t>Same </a:t>
+            </a:r>
+            <a:r>
+              <a:rPr lang="en-ID" sz="2400" dirty="0" err="1"/>
+              <a:t>behavior</a:t>
+            </a:r>
+            <a:r>
+              <a:rPr lang="en-ID" sz="2400" dirty="0"/>
+              <a:t> in </a:t>
+            </a:r>
+            <a:r>
+              <a:rPr lang="en-ID" sz="2400" dirty="0" err="1"/>
+              <a:t>MMRp</a:t>
+            </a:r>
+            <a:r>
+              <a:rPr lang="en-ID" sz="2400" dirty="0"/>
+              <a:t> and </a:t>
+            </a:r>
+            <a:r>
+              <a:rPr lang="en-ID" sz="2400" dirty="0" err="1"/>
+              <a:t>MMRd</a:t>
+            </a:r>
+            <a:endParaRPr lang="en-ID" sz="2400" dirty="0"/>
+          </a:p>
+          <a:p>
+            <a:endParaRPr lang="en-ID" sz="2400" dirty="0"/>
+          </a:p>
+          <a:p>
+            <a:pPr marL="342900" indent="-342900">
+              <a:buFont typeface="Arial" panose="020B0604020202020204" pitchFamily="34" charset="0"/>
+              <a:buChar char="•"/>
+            </a:pPr>
+            <a:endParaRPr lang="en-ID" sz="2400" dirty="0"/>
+          </a:p>
+          <a:p>
+            <a:pPr marL="342900" indent="-342900">
+              <a:buFont typeface="Arial" panose="020B0604020202020204" pitchFamily="34" charset="0"/>
+              <a:buChar char="•"/>
+            </a:pPr>
+            <a:r>
+              <a:rPr lang="en-ID" sz="2400" dirty="0"/>
+              <a:t>Strong negative correlation</a:t>
+            </a:r>
+          </a:p>
+          <a:p>
+            <a:pPr marL="800100" lvl="1" indent="-342900">
+              <a:buFont typeface="Arial" panose="020B0604020202020204" pitchFamily="34" charset="0"/>
+              <a:buChar char="•"/>
+            </a:pPr>
             <a:r>
               <a:rPr lang="en-ID" sz="2000" dirty="0"/>
-              <a:t>negative correlation with -1 allele in </a:t>
-            </a:r>
-            <a:r>
-              <a:rPr lang="en-ID" sz="2000" dirty="0" err="1"/>
+              <a:t>When mutations happen in the reference allele, they are mainly deletions</a:t>
+            </a:r>
+          </a:p>
+          <a:p>
+            <a:pPr marL="800100" lvl="1" indent="-342900">
+              <a:buFont typeface="Arial" panose="020B0604020202020204" pitchFamily="34" charset="0"/>
+              <a:buChar char="•"/>
+            </a:pPr>
+            <a:endParaRPr lang="en-ID" sz="2000" dirty="0"/>
+          </a:p>
+          <a:p>
+            <a:pPr marL="342900" indent="-342900">
+              <a:buFont typeface="Arial" panose="020B0604020202020204" pitchFamily="34" charset="0"/>
+              <a:buChar char="•"/>
+            </a:pPr>
+            <a:endParaRPr lang="en-ID" sz="2000" dirty="0"/>
+          </a:p>
+          <a:p>
+            <a:pPr marL="800100" lvl="1" indent="-342900">
+              <a:buFont typeface="Arial" panose="020B0604020202020204" pitchFamily="34" charset="0"/>
+              <a:buChar char="•"/>
+            </a:pPr>
+            <a:endParaRPr lang="en-ID" sz="2400" dirty="0"/>
+          </a:p>
+        </p:txBody>
+      </p:sp>
+      <p:sp>
+        <p:nvSpPr>
+          <p:cNvPr id="4" name="TextBox 3">
+            <a:extLst>
+              <a:ext uri="{FF2B5EF4-FFF2-40B4-BE49-F238E27FC236}">
+                <a16:creationId xmlns:a16="http://schemas.microsoft.com/office/drawing/2014/main" id="{06250899-72A1-6453-535C-15F314850701}"/>
+              </a:ext>
+            </a:extLst>
+          </p:cNvPr>
+          <p:cNvSpPr txBox="1"/>
+          <p:nvPr/>
+        </p:nvSpPr>
+        <p:spPr>
+          <a:xfrm>
+            <a:off x="6852542" y="4026694"/>
+            <a:ext cx="4992034" cy="923330"/>
+          </a:xfrm>
+          <a:prstGeom prst="rect">
+            <a:avLst/>
+          </a:prstGeom>
+          <a:noFill/>
+        </p:spPr>
+        <p:txBody>
+          <a:bodyPr wrap="square" rtlCol="0">
+            <a:spAutoFit/>
+          </a:bodyPr>
+          <a:lstStyle/>
+          <a:p>
+            <a:r>
+              <a:rPr lang="en-US" dirty="0"/>
+              <a:t>Figure 4. Spearman coefficient (per marker) between 0 and -1 allele frequencies in </a:t>
+            </a:r>
+            <a:r>
+              <a:rPr lang="en-US" dirty="0" err="1"/>
               <a:t>MMRd</a:t>
             </a:r>
-            <a:endParaRPr lang="en-ID" sz="2000" dirty="0"/>
-          </a:p>
-          <a:p>
-            <a:pPr lvl="1"/>
-            <a:r>
-              <a:rPr lang="en-ID" sz="2000" dirty="0"/>
-              <a:t>no correlation with -1 allele in </a:t>
-            </a:r>
-            <a:r>
-              <a:rPr lang="en-ID" sz="2000" dirty="0" err="1"/>
+            <a:r>
+              <a:rPr lang="en-US" dirty="0"/>
+              <a:t> and </a:t>
+            </a:r>
+            <a:r>
+              <a:rPr lang="en-US" dirty="0" err="1"/>
               <a:t>MMRp</a:t>
             </a:r>
-            <a:endParaRPr lang="en-ID" sz="2000" dirty="0"/>
-          </a:p>
-          <a:p>
-            <a:pPr lvl="1"/>
-            <a:r>
-              <a:rPr lang="en-ID" sz="2000" dirty="0"/>
-              <a:t>Evidence for +1 allele not being a genuine mutant ?</a:t>
-            </a:r>
-          </a:p>
-          <a:p>
-            <a:pPr lvl="1"/>
-            <a:endParaRPr lang="en-ID" sz="2000" dirty="0"/>
-          </a:p>
-          <a:p>
-            <a:r>
-              <a:rPr lang="en-ID" sz="2400" dirty="0"/>
-              <a:t>+1 allele’s correlation with reference allele</a:t>
-            </a:r>
-          </a:p>
-          <a:p>
-            <a:pPr lvl="1"/>
-            <a:r>
-              <a:rPr lang="en-ID" sz="2000" dirty="0"/>
-              <a:t>Negative correlation (i.e. “normal” mutant behaviour) in </a:t>
-            </a:r>
-            <a:r>
-              <a:rPr lang="en-ID" sz="2000" dirty="0" err="1"/>
-              <a:t>MMRp</a:t>
-            </a:r>
-            <a:r>
-              <a:rPr lang="en-ID" sz="2000" dirty="0"/>
-              <a:t> </a:t>
-            </a:r>
-          </a:p>
-          <a:p>
-            <a:pPr lvl="1"/>
-            <a:r>
-              <a:rPr lang="en-ID" sz="2000" dirty="0"/>
-              <a:t>Opposite behaviour in </a:t>
-            </a:r>
-            <a:r>
-              <a:rPr lang="en-ID" sz="2000" dirty="0" err="1"/>
-              <a:t>MMRd</a:t>
-            </a:r>
-            <a:r>
-              <a:rPr lang="en-ID" sz="2000" dirty="0"/>
-              <a:t> ? Still unclear why </a:t>
-            </a:r>
-          </a:p>
-          <a:p>
-            <a:pPr lvl="1"/>
+            <a:r>
+              <a:rPr lang="en-US" dirty="0"/>
+              <a:t> samples.</a:t>
+            </a:r>
             <a:endParaRPr lang="en-ID" dirty="0"/>
           </a:p>
-          <a:p>
-            <a:pPr lvl="1"/>
-            <a:endParaRPr lang="en-ID" dirty="0"/>
-          </a:p>
-          <a:p>
-            <a:pPr lvl="1"/>
-            <a:endParaRPr lang="en-ID" dirty="0"/>
-          </a:p>
-        </p:txBody>
-      </p:sp>
+        </p:txBody>
+      </p:sp>
+      <p:pic>
+        <p:nvPicPr>
+          <p:cNvPr id="8" name="Picture 7" descr="A graph of different colored squares&#10;&#10;Description automatically generated">
+            <a:extLst>
+              <a:ext uri="{FF2B5EF4-FFF2-40B4-BE49-F238E27FC236}">
+                <a16:creationId xmlns:a16="http://schemas.microsoft.com/office/drawing/2014/main" id="{1A5E6CAA-AD22-9E03-A8B1-9E00D37D6DEE}"/>
+              </a:ext>
+            </a:extLst>
+          </p:cNvPr>
+          <p:cNvPicPr>
+            <a:picLocks noChangeAspect="1"/>
+          </p:cNvPicPr>
+          <p:nvPr/>
+        </p:nvPicPr>
+        <p:blipFill>
+          <a:blip r:embed="rId3">
+            <a:extLst>
+              <a:ext uri="{28A0092B-C50C-407E-A947-70E740481C1C}">
+                <a14:useLocalDpi xmlns:a14="http://schemas.microsoft.com/office/drawing/2010/main" val="0"/>
+              </a:ext>
+            </a:extLst>
+          </a:blip>
+          <a:stretch>
+            <a:fillRect/>
+          </a:stretch>
+        </p:blipFill>
+        <p:spPr>
+          <a:xfrm>
+            <a:off x="6808768" y="217006"/>
+            <a:ext cx="5079583" cy="3809688"/>
+          </a:xfrm>
+          <a:prstGeom prst="rect">
+            <a:avLst/>
+          </a:prstGeom>
+        </p:spPr>
+      </p:pic>
     </p:spTree>
     <p:extLst>
       <p:ext uri="{BB962C8B-B14F-4D97-AF65-F5344CB8AC3E}">
-        <p14:creationId xmlns:p14="http://schemas.microsoft.com/office/powerpoint/2010/main" val="944629050"/>
+        <p14:creationId xmlns:p14="http://schemas.microsoft.com/office/powerpoint/2010/main" val="577176597"/>
+      </p:ext>
+    </p:extLst>
+  </p:cSld>
+  <p:clrMapOvr>
+    <a:masterClrMapping/>
+  </p:clrMapOvr>
+</p:sld>
+</file>
+
+<file path=ppt/slides/slide8.xml><?xml version="1.0" encoding="utf-8"?>
+<p:sld xmlns:a="http://schemas.openxmlformats.org/drawingml/2006/main" xmlns:r="http://schemas.openxmlformats.org/officeDocument/2006/relationships" xmlns:p="http://schemas.openxmlformats.org/presentationml/2006/main">
+  <p:cSld>
+    <p:spTree>
+      <p:nvGrpSpPr>
+        <p:cNvPr id="1" name=""/>
+        <p:cNvGrpSpPr/>
+        <p:nvPr/>
+      </p:nvGrpSpPr>
+      <p:grpSpPr>
+        <a:xfrm>
+          <a:off x="0" y="0"/>
+          <a:ext cx="0" cy="0"/>
+          <a:chOff x="0" y="0"/>
+          <a:chExt cx="0" cy="0"/>
+        </a:xfrm>
+      </p:grpSpPr>
+      <p:sp>
+        <p:nvSpPr>
+          <p:cNvPr id="2" name="Title 1">
+            <a:extLst>
+              <a:ext uri="{FF2B5EF4-FFF2-40B4-BE49-F238E27FC236}">
+                <a16:creationId xmlns:a16="http://schemas.microsoft.com/office/drawing/2014/main" id="{5709C9F6-CD43-E4F8-16BB-6188EADA7D0E}"/>
+              </a:ext>
+            </a:extLst>
+          </p:cNvPr>
+          <p:cNvSpPr>
+            <a:spLocks noGrp="1"/>
+          </p:cNvSpPr>
+          <p:nvPr>
+            <p:ph type="title"/>
+          </p:nvPr>
+        </p:nvSpPr>
+        <p:spPr>
+          <a:xfrm>
+            <a:off x="677035" y="160037"/>
+            <a:ext cx="10515600" cy="1325563"/>
+          </a:xfrm>
+        </p:spPr>
+        <p:txBody>
+          <a:bodyPr/>
+          <a:lstStyle/>
+          <a:p>
+            <a:r>
+              <a:rPr lang="en-ID" dirty="0"/>
+              <a:t>Result (-1 vs +1)</a:t>
+            </a:r>
+          </a:p>
+        </p:txBody>
+      </p:sp>
+      <p:sp>
+        <p:nvSpPr>
+          <p:cNvPr id="3" name="Content Placeholder 2">
+            <a:extLst>
+              <a:ext uri="{FF2B5EF4-FFF2-40B4-BE49-F238E27FC236}">
+                <a16:creationId xmlns:a16="http://schemas.microsoft.com/office/drawing/2014/main" id="{441C49D0-3606-85E9-72AF-849DA0814AD3}"/>
+              </a:ext>
+            </a:extLst>
+          </p:cNvPr>
+          <p:cNvSpPr>
+            <a:spLocks noGrp="1"/>
+          </p:cNvSpPr>
+          <p:nvPr>
+            <p:ph idx="1"/>
+          </p:nvPr>
+        </p:nvSpPr>
+        <p:spPr/>
+        <p:txBody>
+          <a:bodyPr/>
+          <a:lstStyle/>
+          <a:p>
+            <a:pPr marL="0" indent="0">
+              <a:buNone/>
+            </a:pPr>
+            <a:endParaRPr lang="en-ID" dirty="0"/>
+          </a:p>
+          <a:p>
+            <a:endParaRPr lang="en-ID" dirty="0"/>
+          </a:p>
+        </p:txBody>
+      </p:sp>
+      <p:sp>
+        <p:nvSpPr>
+          <p:cNvPr id="6" name="TextBox 5">
+            <a:extLst>
+              <a:ext uri="{FF2B5EF4-FFF2-40B4-BE49-F238E27FC236}">
+                <a16:creationId xmlns:a16="http://schemas.microsoft.com/office/drawing/2014/main" id="{4BC78215-EC87-78F4-E9BC-D5FDAEE7ACED}"/>
+              </a:ext>
+            </a:extLst>
+          </p:cNvPr>
+          <p:cNvSpPr txBox="1"/>
+          <p:nvPr/>
+        </p:nvSpPr>
+        <p:spPr>
+          <a:xfrm>
+            <a:off x="205519" y="2060862"/>
+            <a:ext cx="6830482" cy="3416320"/>
+          </a:xfrm>
+          <a:prstGeom prst="rect">
+            <a:avLst/>
+          </a:prstGeom>
+          <a:noFill/>
+        </p:spPr>
+        <p:txBody>
+          <a:bodyPr wrap="square" rtlCol="0">
+            <a:spAutoFit/>
+          </a:bodyPr>
+          <a:lstStyle/>
+          <a:p>
+            <a:pPr marL="342900" indent="-342900">
+              <a:buFont typeface="Arial" panose="020B0604020202020204" pitchFamily="34" charset="0"/>
+              <a:buChar char="•"/>
+            </a:pPr>
+            <a:r>
+              <a:rPr lang="en-US" sz="2400" dirty="0"/>
+              <a:t>N</a:t>
+            </a:r>
+            <a:r>
+              <a:rPr lang="en-ID" sz="2400" dirty="0" err="1"/>
+              <a:t>egative</a:t>
+            </a:r>
+            <a:r>
+              <a:rPr lang="en-ID" sz="2400" dirty="0"/>
+              <a:t> correlation in </a:t>
+            </a:r>
+            <a:r>
+              <a:rPr lang="en-ID" sz="2400" dirty="0" err="1"/>
+              <a:t>MMRd</a:t>
+            </a:r>
+            <a:endParaRPr lang="en-ID" sz="2400" dirty="0"/>
+          </a:p>
+          <a:p>
+            <a:pPr marL="800100" lvl="1" indent="-342900">
+              <a:buFont typeface="Arial" panose="020B0604020202020204" pitchFamily="34" charset="0"/>
+              <a:buChar char="•"/>
+            </a:pPr>
+            <a:r>
+              <a:rPr lang="en-ID" sz="2400" dirty="0"/>
+              <a:t>Evidence against hypothesis 1</a:t>
+            </a:r>
+          </a:p>
+          <a:p>
+            <a:pPr marL="800100" lvl="1" indent="-342900">
+              <a:buFont typeface="Arial" panose="020B0604020202020204" pitchFamily="34" charset="0"/>
+              <a:buChar char="•"/>
+            </a:pPr>
+            <a:r>
+              <a:rPr lang="en-ID" sz="2400" dirty="0"/>
+              <a:t>If loss of MMR function contributes to both +1 and -1 allele generation then expected is +1 allele ∝ -1 allele </a:t>
+            </a:r>
+          </a:p>
+          <a:p>
+            <a:pPr marL="800100" lvl="1" indent="-342900">
+              <a:buFont typeface="Arial" panose="020B0604020202020204" pitchFamily="34" charset="0"/>
+              <a:buChar char="•"/>
+            </a:pPr>
+            <a:endParaRPr lang="en-ID" sz="2400" dirty="0"/>
+          </a:p>
+          <a:p>
+            <a:pPr marL="342900" indent="-342900">
+              <a:buFont typeface="Arial" panose="020B0604020202020204" pitchFamily="34" charset="0"/>
+              <a:buChar char="•"/>
+            </a:pPr>
+            <a:r>
+              <a:rPr lang="en-ID" sz="2400" dirty="0"/>
+              <a:t>No correlation in </a:t>
+            </a:r>
+            <a:r>
+              <a:rPr lang="en-ID" sz="2400" dirty="0" err="1"/>
+              <a:t>MMRp</a:t>
+            </a:r>
+            <a:endParaRPr lang="en-ID" sz="2400" dirty="0"/>
+          </a:p>
+          <a:p>
+            <a:pPr marL="800100" lvl="1" indent="-342900">
+              <a:buFont typeface="Arial" panose="020B0604020202020204" pitchFamily="34" charset="0"/>
+              <a:buChar char="•"/>
+            </a:pPr>
+            <a:r>
+              <a:rPr lang="en-ID" sz="2400" dirty="0"/>
+              <a:t>Mechanism for insertion in </a:t>
+            </a:r>
+            <a:r>
+              <a:rPr lang="en-ID" sz="2400" dirty="0" err="1"/>
+              <a:t>MMRp</a:t>
+            </a:r>
+            <a:r>
+              <a:rPr lang="en-ID" sz="2400" dirty="0"/>
+              <a:t> is not related to mechanism for deletion in </a:t>
+            </a:r>
+            <a:r>
+              <a:rPr lang="en-ID" sz="2400" dirty="0" err="1"/>
+              <a:t>MMRp</a:t>
+            </a:r>
+            <a:r>
+              <a:rPr lang="en-ID" sz="2400" dirty="0"/>
+              <a:t> </a:t>
+            </a:r>
+          </a:p>
+        </p:txBody>
+      </p:sp>
+      <p:pic>
+        <p:nvPicPr>
+          <p:cNvPr id="7" name="Picture 6" descr="A chart of different colored squares&#10;&#10;Description automatically generated">
+            <a:extLst>
+              <a:ext uri="{FF2B5EF4-FFF2-40B4-BE49-F238E27FC236}">
+                <a16:creationId xmlns:a16="http://schemas.microsoft.com/office/drawing/2014/main" id="{10D205C9-F119-B448-3FED-BB1A7D044D77}"/>
+              </a:ext>
+            </a:extLst>
+          </p:cNvPr>
+          <p:cNvPicPr>
+            <a:picLocks noChangeAspect="1"/>
+          </p:cNvPicPr>
+          <p:nvPr/>
+        </p:nvPicPr>
+        <p:blipFill>
+          <a:blip r:embed="rId2">
+            <a:extLst>
+              <a:ext uri="{28A0092B-C50C-407E-A947-70E740481C1C}">
+                <a14:useLocalDpi xmlns:a14="http://schemas.microsoft.com/office/drawing/2010/main" val="0"/>
+              </a:ext>
+            </a:extLst>
+          </a:blip>
+          <a:stretch>
+            <a:fillRect/>
+          </a:stretch>
+        </p:blipFill>
+        <p:spPr>
+          <a:xfrm>
+            <a:off x="7405290" y="246583"/>
+            <a:ext cx="4581191" cy="3435893"/>
+          </a:xfrm>
+          <a:prstGeom prst="rect">
+            <a:avLst/>
+          </a:prstGeom>
+        </p:spPr>
+      </p:pic>
+      <p:sp>
+        <p:nvSpPr>
+          <p:cNvPr id="4" name="TextBox 3">
+            <a:extLst>
+              <a:ext uri="{FF2B5EF4-FFF2-40B4-BE49-F238E27FC236}">
+                <a16:creationId xmlns:a16="http://schemas.microsoft.com/office/drawing/2014/main" id="{9EC9EAD8-FEC9-F568-3DEC-52EEA16F938E}"/>
+              </a:ext>
+            </a:extLst>
+          </p:cNvPr>
+          <p:cNvSpPr txBox="1"/>
+          <p:nvPr/>
+        </p:nvSpPr>
+        <p:spPr>
+          <a:xfrm>
+            <a:off x="7199966" y="3769022"/>
+            <a:ext cx="4992034" cy="923330"/>
+          </a:xfrm>
+          <a:prstGeom prst="rect">
+            <a:avLst/>
+          </a:prstGeom>
+          <a:noFill/>
+        </p:spPr>
+        <p:txBody>
+          <a:bodyPr wrap="square" rtlCol="0">
+            <a:spAutoFit/>
+          </a:bodyPr>
+          <a:lstStyle/>
+          <a:p>
+            <a:r>
+              <a:rPr lang="en-US" dirty="0"/>
+              <a:t>Figure 5. Spearman coefficient (per marker) between -1 and +1 allele frequencies in </a:t>
+            </a:r>
+            <a:r>
+              <a:rPr lang="en-US" dirty="0" err="1"/>
+              <a:t>MMRd</a:t>
+            </a:r>
+            <a:r>
+              <a:rPr lang="en-US" dirty="0"/>
+              <a:t> and </a:t>
+            </a:r>
+            <a:r>
+              <a:rPr lang="en-US" dirty="0" err="1"/>
+              <a:t>MMRp</a:t>
+            </a:r>
+            <a:r>
+              <a:rPr lang="en-US" dirty="0"/>
+              <a:t> samples.</a:t>
+            </a:r>
+            <a:endParaRPr lang="en-ID" dirty="0"/>
+          </a:p>
+        </p:txBody>
+      </p:sp>
+    </p:spTree>
+    <p:extLst>
+      <p:ext uri="{BB962C8B-B14F-4D97-AF65-F5344CB8AC3E}">
+        <p14:creationId xmlns:p14="http://schemas.microsoft.com/office/powerpoint/2010/main" val="4112913871"/>
+      </p:ext>
+    </p:extLst>
+  </p:cSld>
+  <p:clrMapOvr>
+    <a:masterClrMapping/>
+  </p:clrMapOvr>
+</p:sld>
+</file>
+
+<file path=ppt/slides/slide9.xml><?xml version="1.0" encoding="utf-8"?>
+<p:sld xmlns:a="http://schemas.openxmlformats.org/drawingml/2006/main" xmlns:r="http://schemas.openxmlformats.org/officeDocument/2006/relationships" xmlns:p="http://schemas.openxmlformats.org/presentationml/2006/main">
+  <p:cSld>
+    <p:spTree>
+      <p:nvGrpSpPr>
+        <p:cNvPr id="1" name=""/>
+        <p:cNvGrpSpPr/>
+        <p:nvPr/>
+      </p:nvGrpSpPr>
+      <p:grpSpPr>
+        <a:xfrm>
+          <a:off x="0" y="0"/>
+          <a:ext cx="0" cy="0"/>
+          <a:chOff x="0" y="0"/>
+          <a:chExt cx="0" cy="0"/>
+        </a:xfrm>
+      </p:grpSpPr>
+      <p:sp>
+        <p:nvSpPr>
+          <p:cNvPr id="3" name="Content Placeholder 2">
+            <a:extLst>
+              <a:ext uri="{FF2B5EF4-FFF2-40B4-BE49-F238E27FC236}">
+                <a16:creationId xmlns:a16="http://schemas.microsoft.com/office/drawing/2014/main" id="{441C49D0-3606-85E9-72AF-849DA0814AD3}"/>
+              </a:ext>
+            </a:extLst>
+          </p:cNvPr>
+          <p:cNvSpPr>
+            <a:spLocks noGrp="1"/>
+          </p:cNvSpPr>
+          <p:nvPr>
+            <p:ph idx="1"/>
+          </p:nvPr>
+        </p:nvSpPr>
+        <p:spPr/>
+        <p:txBody>
+          <a:bodyPr/>
+          <a:lstStyle/>
+          <a:p>
+            <a:pPr marL="0" indent="0">
+              <a:buNone/>
+            </a:pPr>
+            <a:endParaRPr lang="en-ID" dirty="0"/>
+          </a:p>
+          <a:p>
+            <a:endParaRPr lang="en-ID" dirty="0"/>
+          </a:p>
+        </p:txBody>
+      </p:sp>
+      <p:sp>
+        <p:nvSpPr>
+          <p:cNvPr id="6" name="TextBox 5">
+            <a:extLst>
+              <a:ext uri="{FF2B5EF4-FFF2-40B4-BE49-F238E27FC236}">
+                <a16:creationId xmlns:a16="http://schemas.microsoft.com/office/drawing/2014/main" id="{4BC78215-EC87-78F4-E9BC-D5FDAEE7ACED}"/>
+              </a:ext>
+            </a:extLst>
+          </p:cNvPr>
+          <p:cNvSpPr txBox="1"/>
+          <p:nvPr/>
+        </p:nvSpPr>
+        <p:spPr>
+          <a:xfrm>
+            <a:off x="536479" y="2293134"/>
+            <a:ext cx="5559521" cy="3416320"/>
+          </a:xfrm>
+          <a:prstGeom prst="rect">
+            <a:avLst/>
+          </a:prstGeom>
+          <a:noFill/>
+        </p:spPr>
+        <p:txBody>
+          <a:bodyPr wrap="square" rtlCol="0">
+            <a:spAutoFit/>
+          </a:bodyPr>
+          <a:lstStyle/>
+          <a:p>
+            <a:r>
+              <a:rPr lang="en-US" sz="2400" dirty="0"/>
+              <a:t>To Mauro :</a:t>
+            </a:r>
+          </a:p>
+          <a:p>
+            <a:pPr marL="342900" indent="-342900">
+              <a:buFont typeface="Arial" panose="020B0604020202020204" pitchFamily="34" charset="0"/>
+              <a:buChar char="•"/>
+            </a:pPr>
+            <a:endParaRPr lang="en-US" sz="2400" dirty="0"/>
+          </a:p>
+          <a:p>
+            <a:r>
+              <a:rPr lang="en-US" sz="2400" dirty="0"/>
+              <a:t>Since spearman correlation does not measure the sensitivity of a marker (rather it just measures how well a monotonic model fits), would it make more sense to have our data be the gradient of the regression line instead of the spearman correlation coefficient??</a:t>
+            </a:r>
+          </a:p>
+        </p:txBody>
+      </p:sp>
+      <p:pic>
+        <p:nvPicPr>
+          <p:cNvPr id="7" name="Picture 6" descr="A graph with black dots and a blue line&#10;&#10;Description automatically generated">
+            <a:extLst>
+              <a:ext uri="{FF2B5EF4-FFF2-40B4-BE49-F238E27FC236}">
+                <a16:creationId xmlns:a16="http://schemas.microsoft.com/office/drawing/2014/main" id="{A4FE4323-EB22-061A-3F61-D1E75D75C4C5}"/>
+              </a:ext>
+            </a:extLst>
+          </p:cNvPr>
+          <p:cNvPicPr>
+            <a:picLocks noChangeAspect="1"/>
+          </p:cNvPicPr>
+          <p:nvPr/>
+        </p:nvPicPr>
+        <p:blipFill>
+          <a:blip r:embed="rId2">
+            <a:extLst>
+              <a:ext uri="{28A0092B-C50C-407E-A947-70E740481C1C}">
+                <a14:useLocalDpi xmlns:a14="http://schemas.microsoft.com/office/drawing/2010/main" val="0"/>
+              </a:ext>
+            </a:extLst>
+          </a:blip>
+          <a:stretch>
+            <a:fillRect/>
+          </a:stretch>
+        </p:blipFill>
+        <p:spPr>
+          <a:xfrm>
+            <a:off x="6096000" y="483328"/>
+            <a:ext cx="5705270" cy="4278953"/>
+          </a:xfrm>
+          <a:prstGeom prst="rect">
+            <a:avLst/>
+          </a:prstGeom>
+        </p:spPr>
+      </p:pic>
+    </p:spTree>
+    <p:extLst>
+      <p:ext uri="{BB962C8B-B14F-4D97-AF65-F5344CB8AC3E}">
+        <p14:creationId xmlns:p14="http://schemas.microsoft.com/office/powerpoint/2010/main" val="1643746320"/>
       </p:ext>
     </p:extLst>
   </p:cSld>

</xml_diff>